<commit_message>
Added DTN-Pages to Presentation
Signed-off-by: Mario Wozenilek <m.wozenilek@tu-bs.de>
</commit_message>
<xml_diff>
--- a/doc/Android-Lab-TrackMe-Abschlusspraes.pptx
+++ b/doc/Android-Lab-TrackMe-Abschlusspraes.pptx
@@ -5,14 +5,18 @@
     <p:sldMasterId id="2147483648" r:id="rId1"/>
   </p:sldMasterIdLst>
   <p:notesMasterIdLst>
-    <p:notesMasterId r:id="rId7"/>
+    <p:notesMasterId r:id="rId11"/>
   </p:notesMasterIdLst>
   <p:sldIdLst>
     <p:sldId id="256" r:id="rId2"/>
     <p:sldId id="257" r:id="rId3"/>
     <p:sldId id="258" r:id="rId4"/>
     <p:sldId id="262" r:id="rId5"/>
-    <p:sldId id="261" r:id="rId6"/>
+    <p:sldId id="263" r:id="rId6"/>
+    <p:sldId id="264" r:id="rId7"/>
+    <p:sldId id="265" r:id="rId8"/>
+    <p:sldId id="266" r:id="rId9"/>
+    <p:sldId id="261" r:id="rId10"/>
   </p:sldIdLst>
   <p:sldSz cx="9144000" cy="6858000" type="screen4x3"/>
   <p:notesSz cx="7099300" cy="10234613"/>
@@ -1826,11 +1830,7 @@
             </a:r>
             <a:r>
               <a:rPr lang="de-DE" sz="1000" baseline="0" dirty="0" smtClean="0"/>
-              <a:t> Juli </a:t>
-            </a:r>
-            <a:r>
-              <a:rPr lang="de-DE" sz="1000" baseline="0" dirty="0" smtClean="0"/>
-              <a:t>2012 </a:t>
+              <a:t> Juli 2012 </a:t>
             </a:r>
             <a:r>
               <a:rPr lang="de-DE" sz="1000" dirty="0" smtClean="0"/>
@@ -2353,15 +2353,7 @@
             </a:r>
             <a:r>
               <a:rPr lang="de-DE" dirty="0" smtClean="0"/>
-              <a:t>, </a:t>
-            </a:r>
-            <a:r>
-              <a:rPr lang="de-DE" dirty="0" smtClean="0"/>
-              <a:t>24</a:t>
-            </a:r>
-            <a:r>
-              <a:rPr lang="de-DE" dirty="0" smtClean="0"/>
-              <a:t>.07.2012</a:t>
+              <a:t>, 24.07.2012</a:t>
             </a:r>
             <a:endParaRPr lang="de-DE" dirty="0"/>
           </a:p>
@@ -2484,42 +2476,37 @@
               <a:rPr lang="de-DE" sz="2000" dirty="0" smtClean="0"/>
               <a:t>Aufzeichnung aktueller Positionsdaten </a:t>
             </a:r>
+          </a:p>
+          <a:p>
+            <a:pPr lvl="3">
+              <a:buSzPct val="100000"/>
+            </a:pPr>
+            <a:r>
+              <a:rPr lang="de-DE" dirty="0" smtClean="0"/>
+              <a:t>grob: Netzwerkinfos / </a:t>
+            </a:r>
+            <a:r>
+              <a:rPr lang="de-DE" dirty="0" smtClean="0"/>
+              <a:t>fein: </a:t>
+            </a:r>
+            <a:r>
+              <a:rPr lang="de-DE" dirty="0" smtClean="0"/>
+              <a:t>GPS-Ortung</a:t>
+            </a:r>
+          </a:p>
+          <a:p>
+            <a:pPr lvl="1">
+              <a:buSzPct val="100000"/>
+            </a:pPr>
             <a:endParaRPr lang="de-DE" sz="2000" dirty="0" smtClean="0"/>
           </a:p>
           <a:p>
-            <a:pPr lvl="3">
-              <a:buSzPct val="100000"/>
-            </a:pPr>
-            <a:r>
-              <a:rPr lang="de-DE" sz="1800" dirty="0" smtClean="0"/>
-              <a:t>grob</a:t>
-            </a:r>
-            <a:r>
-              <a:rPr lang="de-DE" sz="1800" dirty="0" smtClean="0"/>
-              <a:t>: Netzwerkinfos / fein </a:t>
-            </a:r>
-            <a:r>
-              <a:rPr lang="de-DE" sz="1800" dirty="0" smtClean="0"/>
-              <a:t>GPS-Ortung</a:t>
-            </a:r>
-          </a:p>
-          <a:p>
             <a:pPr lvl="1">
               <a:buSzPct val="100000"/>
             </a:pPr>
-            <a:endParaRPr lang="de-DE" sz="2000" dirty="0" smtClean="0"/>
-          </a:p>
-          <a:p>
-            <a:pPr lvl="1">
-              <a:buSzPct val="100000"/>
-            </a:pPr>
             <a:r>
               <a:rPr lang="de-DE" sz="2000" dirty="0" smtClean="0"/>
-              <a:t>Visualisierung der Routen auf </a:t>
-            </a:r>
-            <a:r>
-              <a:rPr lang="de-DE" sz="2000" dirty="0" smtClean="0"/>
-              <a:t>Google </a:t>
+              <a:t>Visualisierung der Routen auf Google </a:t>
             </a:r>
             <a:r>
               <a:rPr lang="de-DE" sz="2000" dirty="0" err="1" smtClean="0"/>
@@ -2529,25 +2516,20 @@
               <a:rPr lang="de-DE" sz="2000" dirty="0" smtClean="0"/>
               <a:t>™</a:t>
             </a:r>
+          </a:p>
+          <a:p>
+            <a:pPr lvl="1">
+              <a:buSzPct val="100000"/>
+            </a:pPr>
             <a:endParaRPr lang="de-DE" sz="2000" dirty="0" smtClean="0"/>
           </a:p>
           <a:p>
             <a:pPr lvl="1">
               <a:buSzPct val="100000"/>
             </a:pPr>
-            <a:endParaRPr lang="de-DE" sz="2000" dirty="0" smtClean="0"/>
-          </a:p>
-          <a:p>
-            <a:pPr lvl="1">
-              <a:buSzPct val="100000"/>
-            </a:pPr>
             <a:r>
               <a:rPr lang="de-DE" sz="2000" dirty="0" smtClean="0"/>
-              <a:t>Dezentraler Datenaustausch </a:t>
-            </a:r>
-            <a:r>
-              <a:rPr lang="de-DE" sz="2000" dirty="0" smtClean="0"/>
-              <a:t>über DTN</a:t>
+              <a:t>Dezentraler Datenaustausch über DTN</a:t>
             </a:r>
           </a:p>
           <a:p>
@@ -2564,25 +2546,16 @@
               <a:rPr lang="de-DE" sz="2000" dirty="0" smtClean="0"/>
               <a:t>Unterschiedliche Profileinstellungen </a:t>
             </a:r>
-            <a:endParaRPr lang="de-DE" sz="2000" dirty="0" smtClean="0"/>
           </a:p>
           <a:p>
             <a:pPr lvl="3">
               <a:buSzPct val="100000"/>
             </a:pPr>
             <a:r>
-              <a:rPr lang="de-DE" sz="1800" dirty="0" smtClean="0"/>
-              <a:t>zwecks </a:t>
-            </a:r>
-            <a:r>
-              <a:rPr lang="de-DE" sz="1800" dirty="0" smtClean="0"/>
-              <a:t>Übersicht und </a:t>
-            </a:r>
-            <a:r>
-              <a:rPr lang="de-DE" sz="1800" dirty="0" smtClean="0"/>
-              <a:t>Datensicherheit</a:t>
-            </a:r>
-            <a:endParaRPr lang="de-DE" sz="1800" dirty="0"/>
+              <a:rPr lang="de-DE" dirty="0" smtClean="0"/>
+              <a:t>zwecks Übersicht und Datensicherheit</a:t>
+            </a:r>
+            <a:endParaRPr lang="de-DE" dirty="0"/>
           </a:p>
         </p:txBody>
       </p:sp>
@@ -2714,7 +2687,7 @@
       </p:sp>
       <p:pic>
         <p:nvPicPr>
-          <p:cNvPr id="4" name="Grafik 3" descr="Datentausch0.png"/>
+          <p:cNvPr id="8" name="Grafik 7" descr="Uni-Karte1.png"/>
           <p:cNvPicPr>
             <a:picLocks noChangeAspect="1"/>
           </p:cNvPicPr>
@@ -2722,15 +2695,14 @@
         </p:nvPicPr>
         <p:blipFill>
           <a:blip r:embed="rId2"/>
-          <a:srcRect l="3105" b="16311"/>
           <a:stretch>
             <a:fillRect/>
           </a:stretch>
         </p:blipFill>
         <p:spPr>
           <a:xfrm>
-            <a:off x="1018750" y="1292650"/>
-            <a:ext cx="7106500" cy="4272700"/>
+            <a:off x="571500" y="1037079"/>
+            <a:ext cx="8001000" cy="4767082"/>
           </a:xfrm>
           <a:prstGeom prst="rect">
             <a:avLst/>
@@ -2739,7 +2711,7 @@
       </p:pic>
       <p:pic>
         <p:nvPicPr>
-          <p:cNvPr id="5" name="Grafik 4" descr="Datentausch1.png"/>
+          <p:cNvPr id="9" name="Grafik 8" descr="Uni-Karte2.png"/>
           <p:cNvPicPr>
             <a:picLocks noChangeAspect="1"/>
           </p:cNvPicPr>
@@ -2747,15 +2719,14 @@
         </p:nvPicPr>
         <p:blipFill>
           <a:blip r:embed="rId3"/>
-          <a:srcRect l="2424" b="16418"/>
           <a:stretch>
             <a:fillRect/>
           </a:stretch>
         </p:blipFill>
         <p:spPr>
           <a:xfrm>
-            <a:off x="971550" y="1295400"/>
-            <a:ext cx="7156450" cy="4267200"/>
+            <a:off x="571500" y="1037079"/>
+            <a:ext cx="8001000" cy="4767082"/>
           </a:xfrm>
           <a:prstGeom prst="rect">
             <a:avLst/>
@@ -2764,7 +2735,7 @@
       </p:pic>
       <p:pic>
         <p:nvPicPr>
-          <p:cNvPr id="6" name="Grafik 5" descr="Datentausch2.png"/>
+          <p:cNvPr id="10" name="Grafik 9" descr="Uni-Karte3.png"/>
           <p:cNvPicPr>
             <a:picLocks noChangeAspect="1"/>
           </p:cNvPicPr>
@@ -2772,15 +2743,14 @@
         </p:nvPicPr>
         <p:blipFill>
           <a:blip r:embed="rId4"/>
-          <a:srcRect l="2424" b="16418"/>
           <a:stretch>
             <a:fillRect/>
           </a:stretch>
         </p:blipFill>
         <p:spPr>
           <a:xfrm>
-            <a:off x="971550" y="1295400"/>
-            <a:ext cx="7156450" cy="4267200"/>
+            <a:off x="571500" y="1037078"/>
+            <a:ext cx="8001000" cy="4767084"/>
           </a:xfrm>
           <a:prstGeom prst="rect">
             <a:avLst/>
@@ -2789,7 +2759,7 @@
       </p:pic>
       <p:pic>
         <p:nvPicPr>
-          <p:cNvPr id="7" name="Grafik 6" descr="Datentausch3.png"/>
+          <p:cNvPr id="11" name="Grafik 10" descr="Uni-Karte4.png"/>
           <p:cNvPicPr>
             <a:picLocks noChangeAspect="1"/>
           </p:cNvPicPr>
@@ -2797,15 +2767,86 @@
         </p:nvPicPr>
         <p:blipFill>
           <a:blip r:embed="rId5"/>
-          <a:srcRect l="2424" b="16418"/>
           <a:stretch>
             <a:fillRect/>
           </a:stretch>
         </p:blipFill>
         <p:spPr>
           <a:xfrm>
-            <a:off x="971550" y="1295400"/>
-            <a:ext cx="7156450" cy="4267200"/>
+            <a:off x="571500" y="1037079"/>
+            <a:ext cx="8001000" cy="4767082"/>
+          </a:xfrm>
+          <a:prstGeom prst="rect">
+            <a:avLst/>
+          </a:prstGeom>
+        </p:spPr>
+      </p:pic>
+      <p:pic>
+        <p:nvPicPr>
+          <p:cNvPr id="12" name="Grafik 11" descr="Uni-Karte5.png"/>
+          <p:cNvPicPr>
+            <a:picLocks noChangeAspect="1"/>
+          </p:cNvPicPr>
+          <p:nvPr/>
+        </p:nvPicPr>
+        <p:blipFill>
+          <a:blip r:embed="rId6"/>
+          <a:stretch>
+            <a:fillRect/>
+          </a:stretch>
+        </p:blipFill>
+        <p:spPr>
+          <a:xfrm>
+            <a:off x="571500" y="1037079"/>
+            <a:ext cx="8001000" cy="4767082"/>
+          </a:xfrm>
+          <a:prstGeom prst="rect">
+            <a:avLst/>
+          </a:prstGeom>
+        </p:spPr>
+      </p:pic>
+      <p:pic>
+        <p:nvPicPr>
+          <p:cNvPr id="13" name="Grafik 12" descr="Uni-Karte6.png"/>
+          <p:cNvPicPr>
+            <a:picLocks noChangeAspect="1"/>
+          </p:cNvPicPr>
+          <p:nvPr/>
+        </p:nvPicPr>
+        <p:blipFill>
+          <a:blip r:embed="rId7"/>
+          <a:stretch>
+            <a:fillRect/>
+          </a:stretch>
+        </p:blipFill>
+        <p:spPr>
+          <a:xfrm>
+            <a:off x="571500" y="1037079"/>
+            <a:ext cx="8001000" cy="4767082"/>
+          </a:xfrm>
+          <a:prstGeom prst="rect">
+            <a:avLst/>
+          </a:prstGeom>
+        </p:spPr>
+      </p:pic>
+      <p:pic>
+        <p:nvPicPr>
+          <p:cNvPr id="14" name="Grafik 13" descr="Uni-Karte7.png"/>
+          <p:cNvPicPr>
+            <a:picLocks noChangeAspect="1"/>
+          </p:cNvPicPr>
+          <p:nvPr/>
+        </p:nvPicPr>
+        <p:blipFill>
+          <a:blip r:embed="rId8"/>
+          <a:stretch>
+            <a:fillRect/>
+          </a:stretch>
+        </p:blipFill>
+        <p:spPr>
+          <a:xfrm>
+            <a:off x="571500" y="1037078"/>
+            <a:ext cx="8001000" cy="4767084"/>
           </a:xfrm>
           <a:prstGeom prst="rect">
             <a:avLst/>
@@ -2838,7 +2879,7 @@
                             </p:stCondLst>
                             <p:childTnLst>
                               <p:par>
-                                <p:cTn id="5" presetID="3" presetClass="entr" presetSubtype="10" fill="hold" nodeType="clickEffect">
+                                <p:cTn id="5" presetID="1" presetClass="entr" presetSubtype="0" fill="hold" nodeType="clickEffect">
                                   <p:stCondLst>
                                     <p:cond delay="0"/>
                                   </p:stCondLst>
@@ -2851,7 +2892,7 @@
                                           </p:stCondLst>
                                         </p:cTn>
                                         <p:tgtEl>
-                                          <p:spTgt spid="5"/>
+                                          <p:spTgt spid="9"/>
                                         </p:tgtEl>
                                         <p:attrNameLst>
                                           <p:attrName>style.visibility</p:attrName>
@@ -2861,14 +2902,6 @@
                                         <p:strVal val="visible"/>
                                       </p:to>
                                     </p:set>
-                                    <p:animEffect transition="in" filter="blinds(horizontal)">
-                                      <p:cBhvr>
-                                        <p:cTn id="7" dur="500"/>
-                                        <p:tgtEl>
-                                          <p:spTgt spid="5"/>
-                                        </p:tgtEl>
-                                      </p:cBhvr>
-                                    </p:animEffect>
                                   </p:childTnLst>
                                 </p:cTn>
                               </p:par>
@@ -2879,32 +2912,32 @@
                     </p:cTn>
                   </p:par>
                   <p:par>
-                    <p:cTn id="8" fill="hold">
+                    <p:cTn id="7" fill="hold">
                       <p:stCondLst>
                         <p:cond delay="indefinite"/>
                       </p:stCondLst>
                       <p:childTnLst>
                         <p:par>
-                          <p:cTn id="9" fill="hold">
+                          <p:cTn id="8" fill="hold">
                             <p:stCondLst>
                               <p:cond delay="0"/>
                             </p:stCondLst>
                             <p:childTnLst>
                               <p:par>
-                                <p:cTn id="10" presetID="3" presetClass="entr" presetSubtype="10" fill="hold" nodeType="clickEffect">
+                                <p:cTn id="9" presetID="1" presetClass="entr" presetSubtype="0" fill="hold" nodeType="clickEffect">
                                   <p:stCondLst>
                                     <p:cond delay="0"/>
                                   </p:stCondLst>
                                   <p:childTnLst>
                                     <p:set>
                                       <p:cBhvr>
-                                        <p:cTn id="11" dur="1" fill="hold">
+                                        <p:cTn id="10" dur="1" fill="hold">
                                           <p:stCondLst>
                                             <p:cond delay="0"/>
                                           </p:stCondLst>
                                         </p:cTn>
                                         <p:tgtEl>
-                                          <p:spTgt spid="6"/>
+                                          <p:spTgt spid="10"/>
                                         </p:tgtEl>
                                         <p:attrNameLst>
                                           <p:attrName>style.visibility</p:attrName>
@@ -2914,14 +2947,6 @@
                                         <p:strVal val="visible"/>
                                       </p:to>
                                     </p:set>
-                                    <p:animEffect transition="in" filter="blinds(horizontal)">
-                                      <p:cBhvr>
-                                        <p:cTn id="12" dur="500"/>
-                                        <p:tgtEl>
-                                          <p:spTgt spid="6"/>
-                                        </p:tgtEl>
-                                      </p:cBhvr>
-                                    </p:animEffect>
                                   </p:childTnLst>
                                 </p:cTn>
                               </p:par>
@@ -2932,32 +2957,32 @@
                     </p:cTn>
                   </p:par>
                   <p:par>
-                    <p:cTn id="13" fill="hold">
+                    <p:cTn id="11" fill="hold">
                       <p:stCondLst>
                         <p:cond delay="indefinite"/>
                       </p:stCondLst>
                       <p:childTnLst>
                         <p:par>
-                          <p:cTn id="14" fill="hold">
+                          <p:cTn id="12" fill="hold">
                             <p:stCondLst>
                               <p:cond delay="0"/>
                             </p:stCondLst>
                             <p:childTnLst>
                               <p:par>
-                                <p:cTn id="15" presetID="3" presetClass="entr" presetSubtype="10" fill="hold" nodeType="clickEffect">
+                                <p:cTn id="13" presetID="1" presetClass="entr" presetSubtype="0" fill="hold" nodeType="clickEffect">
                                   <p:stCondLst>
                                     <p:cond delay="0"/>
                                   </p:stCondLst>
                                   <p:childTnLst>
                                     <p:set>
                                       <p:cBhvr>
-                                        <p:cTn id="16" dur="1" fill="hold">
+                                        <p:cTn id="14" dur="1" fill="hold">
                                           <p:stCondLst>
                                             <p:cond delay="0"/>
                                           </p:stCondLst>
                                         </p:cTn>
                                         <p:tgtEl>
-                                          <p:spTgt spid="7"/>
+                                          <p:spTgt spid="11"/>
                                         </p:tgtEl>
                                         <p:attrNameLst>
                                           <p:attrName>style.visibility</p:attrName>
@@ -2967,14 +2992,141 @@
                                         <p:strVal val="visible"/>
                                       </p:to>
                                     </p:set>
-                                    <p:animEffect transition="in" filter="blinds(horizontal)">
+                                  </p:childTnLst>
+                                </p:cTn>
+                              </p:par>
+                            </p:childTnLst>
+                          </p:cTn>
+                        </p:par>
+                      </p:childTnLst>
+                    </p:cTn>
+                  </p:par>
+                  <p:par>
+                    <p:cTn id="15" fill="hold">
+                      <p:stCondLst>
+                        <p:cond delay="indefinite"/>
+                      </p:stCondLst>
+                      <p:childTnLst>
+                        <p:par>
+                          <p:cTn id="16" fill="hold">
+                            <p:stCondLst>
+                              <p:cond delay="0"/>
+                            </p:stCondLst>
+                            <p:childTnLst>
+                              <p:par>
+                                <p:cTn id="17" presetID="1" presetClass="entr" presetSubtype="0" fill="hold" nodeType="clickEffect">
+                                  <p:stCondLst>
+                                    <p:cond delay="0"/>
+                                  </p:stCondLst>
+                                  <p:childTnLst>
+                                    <p:set>
                                       <p:cBhvr>
-                                        <p:cTn id="17" dur="500"/>
+                                        <p:cTn id="18" dur="1" fill="hold">
+                                          <p:stCondLst>
+                                            <p:cond delay="0"/>
+                                          </p:stCondLst>
+                                        </p:cTn>
                                         <p:tgtEl>
-                                          <p:spTgt spid="7"/>
+                                          <p:spTgt spid="12"/>
                                         </p:tgtEl>
+                                        <p:attrNameLst>
+                                          <p:attrName>style.visibility</p:attrName>
+                                        </p:attrNameLst>
                                       </p:cBhvr>
-                                    </p:animEffect>
+                                      <p:to>
+                                        <p:strVal val="visible"/>
+                                      </p:to>
+                                    </p:set>
+                                  </p:childTnLst>
+                                </p:cTn>
+                              </p:par>
+                            </p:childTnLst>
+                          </p:cTn>
+                        </p:par>
+                      </p:childTnLst>
+                    </p:cTn>
+                  </p:par>
+                  <p:par>
+                    <p:cTn id="19" fill="hold">
+                      <p:stCondLst>
+                        <p:cond delay="indefinite"/>
+                      </p:stCondLst>
+                      <p:childTnLst>
+                        <p:par>
+                          <p:cTn id="20" fill="hold">
+                            <p:stCondLst>
+                              <p:cond delay="0"/>
+                            </p:stCondLst>
+                            <p:childTnLst>
+                              <p:par>
+                                <p:cTn id="21" presetID="1" presetClass="entr" presetSubtype="0" fill="hold" nodeType="clickEffect">
+                                  <p:stCondLst>
+                                    <p:cond delay="0"/>
+                                  </p:stCondLst>
+                                  <p:childTnLst>
+                                    <p:set>
+                                      <p:cBhvr>
+                                        <p:cTn id="22" dur="1" fill="hold">
+                                          <p:stCondLst>
+                                            <p:cond delay="0"/>
+                                          </p:stCondLst>
+                                        </p:cTn>
+                                        <p:tgtEl>
+                                          <p:spTgt spid="13"/>
+                                        </p:tgtEl>
+                                        <p:attrNameLst>
+                                          <p:attrName>style.visibility</p:attrName>
+                                        </p:attrNameLst>
+                                      </p:cBhvr>
+                                      <p:to>
+                                        <p:strVal val="visible"/>
+                                      </p:to>
+                                    </p:set>
+                                  </p:childTnLst>
+                                </p:cTn>
+                              </p:par>
+                            </p:childTnLst>
+                          </p:cTn>
+                        </p:par>
+                      </p:childTnLst>
+                    </p:cTn>
+                  </p:par>
+                  <p:par>
+                    <p:cTn id="23" fill="hold">
+                      <p:stCondLst>
+                        <p:cond delay="indefinite"/>
+                      </p:stCondLst>
+                      <p:childTnLst>
+                        <p:par>
+                          <p:cTn id="24" fill="hold">
+                            <p:stCondLst>
+                              <p:cond delay="0"/>
+                            </p:stCondLst>
+                            <p:childTnLst>
+                              <p:par>
+                                <p:cTn id="25" presetID="1" presetClass="entr" presetSubtype="0" fill="hold" nodeType="clickEffect">
+                                  <p:stCondLst>
+                                    <p:cond delay="0"/>
+                                  </p:stCondLst>
+                                  <p:childTnLst>
+                                    <p:set>
+                                      <p:cBhvr>
+                                        <p:cTn id="26" dur="1" fill="hold">
+                                          <p:stCondLst>
+                                            <p:cond delay="0"/>
+                                          </p:stCondLst>
+                                        </p:cTn>
+                                        <p:tgtEl>
+                                          <p:spTgt spid="14"/>
+                                        </p:tgtEl>
+                                        <p:attrNameLst>
+                                          <p:attrName>style.visibility</p:attrName>
+                                        </p:attrNameLst>
+                                      </p:cBhvr>
+                                      <p:to>
+                                        <p:strVal val="visible"/>
+                                      </p:to>
+                                    </p:set>
                                   </p:childTnLst>
                                 </p:cTn>
                               </p:par>
@@ -3047,11 +3199,7 @@
             </a:r>
             <a:r>
               <a:rPr lang="de-DE" dirty="0" smtClean="0"/>
-              <a:t>: </a:t>
-            </a:r>
-            <a:r>
-              <a:rPr lang="de-DE" dirty="0" smtClean="0"/>
-              <a:t>Datenspeicherung</a:t>
+              <a:t>: Datenspeicherung</a:t>
             </a:r>
             <a:endParaRPr lang="de-DE" dirty="0"/>
           </a:p>
@@ -3098,7 +3246,7 @@
               <a:buSzPct val="100000"/>
             </a:pPr>
             <a:r>
-              <a:rPr lang="de-DE" sz="1800" dirty="0" smtClean="0"/>
+              <a:rPr lang="de-DE" dirty="0" smtClean="0"/>
               <a:t>eigene Daten und Positionsdaten anderer Nutzer</a:t>
             </a:r>
           </a:p>
@@ -3114,8 +3262,26 @@
             </a:pPr>
             <a:r>
               <a:rPr lang="de-DE" sz="2000" dirty="0" smtClean="0"/>
-              <a:t>Identifikation über Handynummer</a:t>
-            </a:r>
+              <a:t>Identifikation über </a:t>
+            </a:r>
+            <a:r>
+              <a:rPr lang="de-DE" sz="2000" dirty="0" smtClean="0"/>
+              <a:t>Handynummer</a:t>
+            </a:r>
+          </a:p>
+          <a:p>
+            <a:pPr lvl="3">
+              <a:buSzPct val="100000"/>
+            </a:pPr>
+            <a:r>
+              <a:rPr lang="de-DE" dirty="0" smtClean="0"/>
+              <a:t>v</a:t>
+            </a:r>
+            <a:r>
+              <a:rPr lang="de-DE" dirty="0" smtClean="0"/>
+              <a:t>erschlüsselte Speicherung</a:t>
+            </a:r>
+            <a:endParaRPr lang="de-DE" dirty="0" smtClean="0"/>
           </a:p>
           <a:p>
             <a:pPr lvl="1">
@@ -3129,11 +3295,7 @@
             </a:pPr>
             <a:r>
               <a:rPr lang="de-DE" sz="2000" dirty="0" smtClean="0"/>
-              <a:t>Dezentraler Datenaustausch </a:t>
-            </a:r>
-            <a:r>
-              <a:rPr lang="de-DE" sz="2000" dirty="0" smtClean="0"/>
-              <a:t>über DTN</a:t>
+              <a:t>Dezentraler Datenaustausch über DTN</a:t>
             </a:r>
           </a:p>
           <a:p>
@@ -3150,25 +3312,16 @@
               <a:rPr lang="de-DE" sz="2000" dirty="0" smtClean="0"/>
               <a:t>Unterschiedliche Profileinstellungen </a:t>
             </a:r>
-            <a:endParaRPr lang="de-DE" sz="2000" dirty="0" smtClean="0"/>
           </a:p>
           <a:p>
             <a:pPr lvl="3">
               <a:buSzPct val="100000"/>
             </a:pPr>
             <a:r>
-              <a:rPr lang="de-DE" sz="1800" dirty="0" smtClean="0"/>
-              <a:t>zwecks </a:t>
-            </a:r>
-            <a:r>
-              <a:rPr lang="de-DE" sz="1800" dirty="0" smtClean="0"/>
-              <a:t>Übersicht und </a:t>
-            </a:r>
-            <a:r>
-              <a:rPr lang="de-DE" sz="1800" dirty="0" smtClean="0"/>
-              <a:t>Datensicherheit</a:t>
-            </a:r>
-            <a:endParaRPr lang="de-DE" sz="1800" dirty="0"/>
+              <a:rPr lang="de-DE" dirty="0" smtClean="0"/>
+              <a:t>zwecks Übersicht und Datensicherheit</a:t>
+            </a:r>
+            <a:endParaRPr lang="de-DE" dirty="0"/>
           </a:p>
         </p:txBody>
       </p:sp>
@@ -3212,6 +3365,829 @@
 </file>
 
 <file path=ppt/slides/slide5.xml><?xml version="1.0" encoding="utf-8"?>
+<p:sld xmlns:a="http://schemas.openxmlformats.org/drawingml/2006/main" xmlns:r="http://schemas.openxmlformats.org/officeDocument/2006/relationships" xmlns:p="http://schemas.openxmlformats.org/presentationml/2006/main">
+  <p:cSld>
+    <p:spTree>
+      <p:nvGrpSpPr>
+        <p:cNvPr id="1" name=""/>
+        <p:cNvGrpSpPr/>
+        <p:nvPr/>
+      </p:nvGrpSpPr>
+      <p:grpSpPr>
+        <a:xfrm>
+          <a:off x="0" y="0"/>
+          <a:ext cx="0" cy="0"/>
+          <a:chOff x="0" y="0"/>
+          <a:chExt cx="0" cy="0"/>
+        </a:xfrm>
+      </p:grpSpPr>
+      <p:sp>
+        <p:nvSpPr>
+          <p:cNvPr id="2" name="Titel 1"/>
+          <p:cNvSpPr>
+            <a:spLocks noGrp="1"/>
+          </p:cNvSpPr>
+          <p:nvPr>
+            <p:ph type="title"/>
+          </p:nvPr>
+        </p:nvSpPr>
+        <p:spPr/>
+        <p:txBody>
+          <a:bodyPr/>
+          <a:lstStyle/>
+          <a:p>
+            <a:r>
+              <a:rPr lang="de-DE" dirty="0" err="1" smtClean="0"/>
+              <a:t>TrackMe</a:t>
+            </a:r>
+            <a:r>
+              <a:rPr lang="de-DE" dirty="0" smtClean="0"/>
+              <a:t>: </a:t>
+            </a:r>
+            <a:r>
+              <a:rPr lang="de-DE" dirty="0" smtClean="0"/>
+              <a:t>Datenaustausch</a:t>
+            </a:r>
+            <a:endParaRPr lang="de-DE" dirty="0"/>
+          </a:p>
+        </p:txBody>
+      </p:sp>
+      <p:sp>
+        <p:nvSpPr>
+          <p:cNvPr id="3" name="Inhaltsplatzhalter 2"/>
+          <p:cNvSpPr>
+            <a:spLocks noGrp="1"/>
+          </p:cNvSpPr>
+          <p:nvPr>
+            <p:ph idx="1"/>
+          </p:nvPr>
+        </p:nvSpPr>
+        <p:spPr>
+          <a:xfrm>
+            <a:off x="431800" y="1042988"/>
+            <a:ext cx="8229600" cy="4772025"/>
+          </a:xfrm>
+        </p:spPr>
+        <p:txBody>
+          <a:bodyPr anchor="ctr"/>
+          <a:lstStyle/>
+          <a:p>
+            <a:pPr lvl="1">
+              <a:buSzPct val="100000"/>
+            </a:pPr>
+            <a:r>
+              <a:rPr lang="de-DE" sz="2000" dirty="0" smtClean="0"/>
+              <a:t>Optimal</a:t>
+            </a:r>
+            <a:r>
+              <a:rPr lang="de-DE" sz="2000" dirty="0" smtClean="0"/>
+              <a:t>: mobiles Ad-hoc-Netz </a:t>
+            </a:r>
+            <a:endParaRPr lang="de-DE" sz="2000" dirty="0" smtClean="0"/>
+          </a:p>
+          <a:p>
+            <a:pPr lvl="3">
+              <a:buSzPct val="100000"/>
+            </a:pPr>
+            <a:r>
+              <a:rPr lang="de-DE" dirty="0" smtClean="0"/>
+              <a:t>(</a:t>
+            </a:r>
+            <a:r>
+              <a:rPr lang="de-DE" dirty="0" smtClean="0"/>
+              <a:t>lateinisch ad hoc, sinngemäß ‚für diesen Augenblick gemacht</a:t>
+            </a:r>
+            <a:r>
+              <a:rPr lang="de-DE" dirty="0" smtClean="0"/>
+              <a:t>‘)</a:t>
+            </a:r>
+          </a:p>
+          <a:p>
+            <a:pPr lvl="3">
+              <a:buSzPct val="100000"/>
+            </a:pPr>
+            <a:endParaRPr lang="de-DE" dirty="0" smtClean="0"/>
+          </a:p>
+          <a:p>
+            <a:pPr lvl="1">
+              <a:buSzPct val="100000"/>
+            </a:pPr>
+            <a:r>
+              <a:rPr lang="de-DE" sz="2000" dirty="0" smtClean="0"/>
+              <a:t>selbstständige Konfiguration </a:t>
+            </a:r>
+            <a:r>
+              <a:rPr lang="de-DE" sz="2000" dirty="0" smtClean="0"/>
+              <a:t>zwischen mobilen Geräten </a:t>
+            </a:r>
+            <a:br>
+              <a:rPr lang="de-DE" sz="2000" dirty="0" smtClean="0"/>
+            </a:br>
+            <a:endParaRPr lang="de-DE" sz="2000" dirty="0" smtClean="0"/>
+          </a:p>
+          <a:p>
+            <a:pPr lvl="1">
+              <a:buSzPct val="100000"/>
+            </a:pPr>
+            <a:r>
+              <a:rPr lang="de-DE" sz="2000" dirty="0" smtClean="0"/>
+              <a:t>Perfekt</a:t>
+            </a:r>
+            <a:r>
+              <a:rPr lang="de-DE" sz="2000" dirty="0" smtClean="0"/>
+              <a:t>! Aber? </a:t>
+            </a:r>
+            <a:br>
+              <a:rPr lang="de-DE" sz="2000" dirty="0" smtClean="0"/>
+            </a:br>
+            <a:endParaRPr lang="de-DE" sz="2000" dirty="0" smtClean="0"/>
+          </a:p>
+          <a:p>
+            <a:pPr lvl="1">
+              <a:buSzPct val="100000"/>
+            </a:pPr>
+            <a:r>
+              <a:rPr lang="de-DE" sz="2000" dirty="0" smtClean="0"/>
+              <a:t>Ad-hoc </a:t>
+            </a:r>
+            <a:r>
+              <a:rPr lang="de-DE" sz="2000" dirty="0" smtClean="0"/>
+              <a:t>nur von wenigen </a:t>
+            </a:r>
+            <a:r>
+              <a:rPr lang="de-DE" sz="2000" dirty="0" err="1" smtClean="0"/>
+              <a:t>Android</a:t>
+            </a:r>
+            <a:r>
+              <a:rPr lang="de-DE" sz="2000" dirty="0" smtClean="0"/>
+              <a:t>-Geräten unterstützt </a:t>
+            </a:r>
+            <a:endParaRPr lang="de-DE" sz="2000" dirty="0" smtClean="0"/>
+          </a:p>
+          <a:p>
+            <a:pPr lvl="1">
+              <a:buSzPct val="100000"/>
+            </a:pPr>
+            <a:endParaRPr lang="de-DE" sz="2000" dirty="0" smtClean="0"/>
+          </a:p>
+          <a:p>
+            <a:pPr lvl="1">
+              <a:buSzPct val="100000"/>
+            </a:pPr>
+            <a:r>
+              <a:rPr lang="de-DE" sz="2000" dirty="0" err="1" smtClean="0"/>
+              <a:t>wpa_supplicant</a:t>
+            </a:r>
+            <a:r>
+              <a:rPr lang="de-DE" sz="2000" dirty="0" smtClean="0"/>
+              <a:t> </a:t>
+            </a:r>
+            <a:r>
+              <a:rPr lang="de-DE" sz="2000" dirty="0" smtClean="0"/>
+              <a:t>kompatibler </a:t>
+            </a:r>
+            <a:r>
+              <a:rPr lang="de-DE" sz="2000" dirty="0" err="1" smtClean="0"/>
+              <a:t>Wi</a:t>
+            </a:r>
+            <a:r>
+              <a:rPr lang="de-DE" sz="2000" dirty="0" smtClean="0"/>
+              <a:t>-</a:t>
+            </a:r>
+            <a:r>
+              <a:rPr lang="de-DE" sz="2000" dirty="0" err="1" smtClean="0"/>
+              <a:t>Fi</a:t>
+            </a:r>
+            <a:r>
+              <a:rPr lang="de-DE" sz="2000" dirty="0" smtClean="0"/>
+              <a:t>-Treiber nötigt </a:t>
+            </a:r>
+            <a:endParaRPr lang="de-DE" sz="2000" dirty="0" smtClean="0"/>
+          </a:p>
+          <a:p>
+            <a:pPr lvl="3">
+              <a:buSzPct val="100000"/>
+            </a:pPr>
+            <a:r>
+              <a:rPr lang="de-DE" dirty="0" smtClean="0"/>
+              <a:t>=&gt; </a:t>
+            </a:r>
+            <a:r>
+              <a:rPr lang="de-DE" dirty="0" smtClean="0"/>
+              <a:t>vorerst Kommunikation </a:t>
+            </a:r>
+            <a:r>
+              <a:rPr lang="de-DE" dirty="0" err="1" smtClean="0"/>
+              <a:t>infrastruktur</a:t>
+            </a:r>
+            <a:r>
+              <a:rPr lang="de-DE" dirty="0" smtClean="0"/>
+              <a:t> Netzwerk</a:t>
+            </a:r>
+            <a:endParaRPr lang="de-DE" sz="1200" dirty="0"/>
+          </a:p>
+        </p:txBody>
+      </p:sp>
+    </p:spTree>
+  </p:cSld>
+  <p:clrMapOvr>
+    <a:masterClrMapping/>
+  </p:clrMapOvr>
+  <p:timing>
+    <p:tnLst>
+      <p:par>
+        <p:cTn id="1" dur="indefinite" restart="never" nodeType="tmRoot"/>
+      </p:par>
+    </p:tnLst>
+  </p:timing>
+</p:sld>
+</file>
+
+<file path=ppt/slides/slide6.xml><?xml version="1.0" encoding="utf-8"?>
+<p:sld xmlns:a="http://schemas.openxmlformats.org/drawingml/2006/main" xmlns:r="http://schemas.openxmlformats.org/officeDocument/2006/relationships" xmlns:p="http://schemas.openxmlformats.org/presentationml/2006/main">
+  <p:cSld>
+    <p:spTree>
+      <p:nvGrpSpPr>
+        <p:cNvPr id="1" name=""/>
+        <p:cNvGrpSpPr/>
+        <p:nvPr/>
+      </p:nvGrpSpPr>
+      <p:grpSpPr>
+        <a:xfrm>
+          <a:off x="0" y="0"/>
+          <a:ext cx="0" cy="0"/>
+          <a:chOff x="0" y="0"/>
+          <a:chExt cx="0" cy="0"/>
+        </a:xfrm>
+      </p:grpSpPr>
+      <p:sp>
+        <p:nvSpPr>
+          <p:cNvPr id="2" name="Titel 1"/>
+          <p:cNvSpPr>
+            <a:spLocks noGrp="1"/>
+          </p:cNvSpPr>
+          <p:nvPr>
+            <p:ph type="title"/>
+          </p:nvPr>
+        </p:nvSpPr>
+        <p:spPr/>
+        <p:txBody>
+          <a:bodyPr/>
+          <a:lstStyle/>
+          <a:p>
+            <a:r>
+              <a:rPr lang="de-DE" dirty="0" err="1" smtClean="0"/>
+              <a:t>TrackMe</a:t>
+            </a:r>
+            <a:r>
+              <a:rPr lang="de-DE" dirty="0" smtClean="0"/>
+              <a:t>: </a:t>
+            </a:r>
+            <a:r>
+              <a:rPr lang="de-DE" dirty="0" smtClean="0"/>
+              <a:t>DTN-Kommunikation</a:t>
+            </a:r>
+            <a:endParaRPr lang="de-DE" dirty="0"/>
+          </a:p>
+        </p:txBody>
+      </p:sp>
+      <p:sp>
+        <p:nvSpPr>
+          <p:cNvPr id="3" name="Inhaltsplatzhalter 2"/>
+          <p:cNvSpPr>
+            <a:spLocks noGrp="1"/>
+          </p:cNvSpPr>
+          <p:nvPr>
+            <p:ph idx="1"/>
+          </p:nvPr>
+        </p:nvSpPr>
+        <p:spPr>
+          <a:xfrm>
+            <a:off x="431800" y="1042988"/>
+            <a:ext cx="8229600" cy="4772025"/>
+          </a:xfrm>
+        </p:spPr>
+        <p:txBody>
+          <a:bodyPr anchor="ctr"/>
+          <a:lstStyle/>
+          <a:p>
+            <a:pPr lvl="1">
+              <a:buSzPct val="100000"/>
+            </a:pPr>
+            <a:r>
+              <a:rPr lang="de-DE" sz="2000" dirty="0" smtClean="0"/>
+              <a:t>jeder </a:t>
+            </a:r>
+            <a:r>
+              <a:rPr lang="de-DE" sz="2000" dirty="0" err="1" smtClean="0"/>
+              <a:t>TrackMe</a:t>
+            </a:r>
+            <a:r>
+              <a:rPr lang="de-DE" sz="2000" dirty="0" smtClean="0"/>
+              <a:t>-Teilnehmer registriert sich für den Group-</a:t>
+            </a:r>
+            <a:r>
+              <a:rPr lang="de-DE" sz="2000" dirty="0" err="1" smtClean="0"/>
+              <a:t>Endpoint</a:t>
+            </a:r>
+            <a:r>
+              <a:rPr lang="de-DE" sz="2000" dirty="0" smtClean="0"/>
+              <a:t> "dtn://trackme.dtn/presence" </a:t>
+            </a:r>
+            <a:endParaRPr lang="de-DE" sz="2000" dirty="0" smtClean="0"/>
+          </a:p>
+          <a:p>
+            <a:pPr lvl="1">
+              <a:buSzPct val="100000"/>
+            </a:pPr>
+            <a:endParaRPr lang="de-DE" sz="2000" dirty="0" smtClean="0"/>
+          </a:p>
+          <a:p>
+            <a:pPr lvl="1">
+              <a:buSzPct val="100000"/>
+            </a:pPr>
+            <a:r>
+              <a:rPr lang="de-DE" sz="2000" dirty="0" smtClean="0"/>
+              <a:t>Anwesenheit-Ankündigung </a:t>
+            </a:r>
+            <a:r>
+              <a:rPr lang="de-DE" sz="2000" dirty="0" smtClean="0"/>
+              <a:t>über diesen Group-</a:t>
+            </a:r>
+            <a:r>
+              <a:rPr lang="de-DE" sz="2000" dirty="0" err="1" smtClean="0"/>
+              <a:t>Endpoint</a:t>
+            </a:r>
+            <a:r>
+              <a:rPr lang="de-DE" sz="2000" dirty="0" smtClean="0"/>
+              <a:t> in zeitlichem </a:t>
+            </a:r>
+            <a:r>
+              <a:rPr lang="de-DE" sz="2000" dirty="0" smtClean="0"/>
+              <a:t>Intervall</a:t>
+            </a:r>
+          </a:p>
+          <a:p>
+            <a:pPr lvl="3">
+              <a:buSzPct val="100000"/>
+            </a:pPr>
+            <a:r>
+              <a:rPr lang="de-DE" dirty="0" smtClean="0"/>
+              <a:t>(</a:t>
+            </a:r>
+            <a:r>
+              <a:rPr lang="de-DE" dirty="0" smtClean="0"/>
+              <a:t>Konfigurierbar als "Presence-</a:t>
+            </a:r>
+            <a:r>
+              <a:rPr lang="de-DE" dirty="0" err="1" smtClean="0"/>
+              <a:t>Notification</a:t>
+            </a:r>
+            <a:r>
+              <a:rPr lang="de-DE" dirty="0" smtClean="0"/>
+              <a:t>-Delay") </a:t>
+            </a:r>
+            <a:endParaRPr lang="de-DE" sz="2000" dirty="0" smtClean="0"/>
+          </a:p>
+          <a:p>
+            <a:pPr lvl="3">
+              <a:buSzPct val="100000"/>
+            </a:pPr>
+            <a:r>
+              <a:rPr lang="de-DE" dirty="0" smtClean="0"/>
+              <a:t>=&gt; </a:t>
+            </a:r>
+            <a:r>
+              <a:rPr lang="de-DE" dirty="0" smtClean="0"/>
+              <a:t>jeder </a:t>
+            </a:r>
+            <a:r>
+              <a:rPr lang="de-DE" dirty="0" err="1" smtClean="0"/>
+              <a:t>TrackMe</a:t>
+            </a:r>
+            <a:r>
+              <a:rPr lang="de-DE" dirty="0" smtClean="0"/>
+              <a:t> Teilnehmer im Netzwerk bekommt diese </a:t>
+            </a:r>
+            <a:r>
+              <a:rPr lang="de-DE" dirty="0" smtClean="0"/>
+              <a:t>Ankündigung </a:t>
+            </a:r>
+          </a:p>
+          <a:p>
+            <a:pPr lvl="3">
+              <a:buSzPct val="100000"/>
+            </a:pPr>
+            <a:endParaRPr lang="de-DE" sz="2000" dirty="0" smtClean="0"/>
+          </a:p>
+          <a:p>
+            <a:pPr lvl="1">
+              <a:buSzPct val="100000"/>
+            </a:pPr>
+            <a:r>
+              <a:rPr lang="de-DE" sz="2000" dirty="0" smtClean="0"/>
+              <a:t> Daten-Pakete </a:t>
+            </a:r>
+            <a:r>
+              <a:rPr lang="de-DE" sz="2000" dirty="0" smtClean="0"/>
+              <a:t>mit Routen als Antwort auf </a:t>
+            </a:r>
+            <a:r>
+              <a:rPr lang="de-DE" sz="2000" dirty="0" smtClean="0"/>
+              <a:t>Presence-Nachrichten</a:t>
+            </a:r>
+          </a:p>
+        </p:txBody>
+      </p:sp>
+    </p:spTree>
+  </p:cSld>
+  <p:clrMapOvr>
+    <a:masterClrMapping/>
+  </p:clrMapOvr>
+  <p:timing>
+    <p:tnLst>
+      <p:par>
+        <p:cTn id="1" dur="indefinite" restart="never" nodeType="tmRoot"/>
+      </p:par>
+    </p:tnLst>
+  </p:timing>
+</p:sld>
+</file>
+
+<file path=ppt/slides/slide7.xml><?xml version="1.0" encoding="utf-8"?>
+<p:sld xmlns:a="http://schemas.openxmlformats.org/drawingml/2006/main" xmlns:r="http://schemas.openxmlformats.org/officeDocument/2006/relationships" xmlns:p="http://schemas.openxmlformats.org/presentationml/2006/main">
+  <p:cSld>
+    <p:spTree>
+      <p:nvGrpSpPr>
+        <p:cNvPr id="1" name=""/>
+        <p:cNvGrpSpPr/>
+        <p:nvPr/>
+      </p:nvGrpSpPr>
+      <p:grpSpPr>
+        <a:xfrm>
+          <a:off x="0" y="0"/>
+          <a:ext cx="0" cy="0"/>
+          <a:chOff x="0" y="0"/>
+          <a:chExt cx="0" cy="0"/>
+        </a:xfrm>
+      </p:grpSpPr>
+      <p:sp>
+        <p:nvSpPr>
+          <p:cNvPr id="2" name="Titel 1"/>
+          <p:cNvSpPr>
+            <a:spLocks noGrp="1"/>
+          </p:cNvSpPr>
+          <p:nvPr>
+            <p:ph type="title"/>
+          </p:nvPr>
+        </p:nvSpPr>
+        <p:spPr/>
+        <p:txBody>
+          <a:bodyPr/>
+          <a:lstStyle/>
+          <a:p>
+            <a:r>
+              <a:rPr lang="de-DE" dirty="0" err="1" smtClean="0"/>
+              <a:t>TrackMe</a:t>
+            </a:r>
+            <a:r>
+              <a:rPr lang="de-DE" dirty="0" smtClean="0"/>
+              <a:t>: </a:t>
+            </a:r>
+            <a:r>
+              <a:rPr lang="de-DE" dirty="0" smtClean="0"/>
+              <a:t>DTN-Kommunikation</a:t>
+            </a:r>
+            <a:endParaRPr lang="de-DE" dirty="0"/>
+          </a:p>
+        </p:txBody>
+      </p:sp>
+      <p:sp>
+        <p:nvSpPr>
+          <p:cNvPr id="3" name="Inhaltsplatzhalter 2"/>
+          <p:cNvSpPr>
+            <a:spLocks noGrp="1"/>
+          </p:cNvSpPr>
+          <p:nvPr>
+            <p:ph idx="1"/>
+          </p:nvPr>
+        </p:nvSpPr>
+        <p:spPr>
+          <a:xfrm>
+            <a:off x="431800" y="1042988"/>
+            <a:ext cx="8229600" cy="4772025"/>
+          </a:xfrm>
+        </p:spPr>
+        <p:txBody>
+          <a:bodyPr anchor="ctr"/>
+          <a:lstStyle/>
+          <a:p>
+            <a:pPr lvl="1">
+              <a:buSzPct val="100000"/>
+            </a:pPr>
+            <a:r>
+              <a:rPr lang="de-DE" sz="2000" dirty="0" smtClean="0"/>
+              <a:t>Lokaler Zeitstempel für zeitlichen Abstand zu wiederholter Datenübertragung </a:t>
+            </a:r>
+          </a:p>
+          <a:p>
+            <a:pPr lvl="3">
+              <a:buSzPct val="100000"/>
+            </a:pPr>
+            <a:r>
+              <a:rPr lang="de-DE" dirty="0" smtClean="0"/>
+              <a:t>(Konfigurierbar als "Data-</a:t>
+            </a:r>
+            <a:r>
+              <a:rPr lang="de-DE" dirty="0" err="1" smtClean="0"/>
+              <a:t>Retransmission</a:t>
+            </a:r>
+            <a:r>
+              <a:rPr lang="de-DE" dirty="0" smtClean="0"/>
+              <a:t>-Delay") </a:t>
+            </a:r>
+            <a:endParaRPr lang="de-DE" sz="2000" dirty="0" smtClean="0"/>
+          </a:p>
+          <a:p>
+            <a:pPr lvl="3">
+              <a:buSzPct val="100000"/>
+            </a:pPr>
+            <a:r>
+              <a:rPr lang="de-DE" dirty="0" smtClean="0"/>
+              <a:t>=&gt; Einzelner Teilnehmer bekommt Daten-Paket mit </a:t>
+            </a:r>
+            <a:r>
+              <a:rPr lang="de-DE" dirty="0" smtClean="0"/>
+              <a:t>Routen</a:t>
+            </a:r>
+          </a:p>
+          <a:p>
+            <a:pPr lvl="3">
+              <a:buSzPct val="100000"/>
+              <a:buNone/>
+            </a:pPr>
+            <a:r>
+              <a:rPr lang="de-DE" dirty="0" smtClean="0"/>
+              <a:t> </a:t>
+            </a:r>
+            <a:endParaRPr lang="de-DE" sz="2000" dirty="0" smtClean="0"/>
+          </a:p>
+          <a:p>
+            <a:pPr lvl="1">
+              <a:buSzPct val="100000"/>
+            </a:pPr>
+            <a:r>
+              <a:rPr lang="de-DE" sz="2000" dirty="0" smtClean="0"/>
+              <a:t>Die Time-</a:t>
+            </a:r>
+            <a:r>
+              <a:rPr lang="de-DE" sz="2000" dirty="0" err="1" smtClean="0"/>
+              <a:t>to</a:t>
+            </a:r>
+            <a:r>
+              <a:rPr lang="de-DE" sz="2000" dirty="0" smtClean="0"/>
+              <a:t>-live für Presence- und Data-Nachrichten ebenfalls konfigurierbar als Presence-TTL und Data-TTL</a:t>
+            </a:r>
+            <a:endParaRPr lang="de-DE" sz="1200" dirty="0"/>
+          </a:p>
+        </p:txBody>
+      </p:sp>
+    </p:spTree>
+  </p:cSld>
+  <p:clrMapOvr>
+    <a:masterClrMapping/>
+  </p:clrMapOvr>
+  <p:timing>
+    <p:tnLst>
+      <p:par>
+        <p:cTn id="1" dur="indefinite" restart="never" nodeType="tmRoot"/>
+      </p:par>
+    </p:tnLst>
+  </p:timing>
+</p:sld>
+</file>
+
+<file path=ppt/slides/slide8.xml><?xml version="1.0" encoding="utf-8"?>
+<p:sld xmlns:a="http://schemas.openxmlformats.org/drawingml/2006/main" xmlns:r="http://schemas.openxmlformats.org/officeDocument/2006/relationships" xmlns:p="http://schemas.openxmlformats.org/presentationml/2006/main">
+  <p:cSld>
+    <p:spTree>
+      <p:nvGrpSpPr>
+        <p:cNvPr id="1" name=""/>
+        <p:cNvGrpSpPr/>
+        <p:nvPr/>
+      </p:nvGrpSpPr>
+      <p:grpSpPr>
+        <a:xfrm>
+          <a:off x="0" y="0"/>
+          <a:ext cx="0" cy="0"/>
+          <a:chOff x="0" y="0"/>
+          <a:chExt cx="0" cy="0"/>
+        </a:xfrm>
+      </p:grpSpPr>
+      <p:sp>
+        <p:nvSpPr>
+          <p:cNvPr id="2" name="Titel 1"/>
+          <p:cNvSpPr>
+            <a:spLocks noGrp="1"/>
+          </p:cNvSpPr>
+          <p:nvPr>
+            <p:ph type="title"/>
+          </p:nvPr>
+        </p:nvSpPr>
+        <p:spPr/>
+        <p:txBody>
+          <a:bodyPr/>
+          <a:lstStyle/>
+          <a:p>
+            <a:r>
+              <a:rPr lang="de-DE" dirty="0" err="1" smtClean="0"/>
+              <a:t>TrackMe</a:t>
+            </a:r>
+            <a:r>
+              <a:rPr lang="de-DE" dirty="0" smtClean="0"/>
+              <a:t>: </a:t>
+            </a:r>
+            <a:r>
+              <a:rPr lang="de-DE" dirty="0" err="1" smtClean="0"/>
+              <a:t>Bundle</a:t>
+            </a:r>
+            <a:r>
+              <a:rPr lang="de-DE" dirty="0" smtClean="0"/>
+              <a:t>-Erstellung</a:t>
+            </a:r>
+            <a:endParaRPr lang="de-DE" dirty="0"/>
+          </a:p>
+        </p:txBody>
+      </p:sp>
+      <p:sp>
+        <p:nvSpPr>
+          <p:cNvPr id="3" name="Inhaltsplatzhalter 2"/>
+          <p:cNvSpPr>
+            <a:spLocks noGrp="1"/>
+          </p:cNvSpPr>
+          <p:nvPr>
+            <p:ph idx="1"/>
+          </p:nvPr>
+        </p:nvSpPr>
+        <p:spPr>
+          <a:xfrm>
+            <a:off x="431800" y="1042988"/>
+            <a:ext cx="8229600" cy="4772025"/>
+          </a:xfrm>
+        </p:spPr>
+        <p:txBody>
+          <a:bodyPr anchor="ctr"/>
+          <a:lstStyle/>
+          <a:p>
+            <a:pPr lvl="1">
+              <a:buSzPct val="100000"/>
+            </a:pPr>
+            <a:r>
+              <a:rPr lang="de-DE" sz="2000" dirty="0" smtClean="0"/>
+              <a:t>Absender: </a:t>
+            </a:r>
+          </a:p>
+          <a:p>
+            <a:pPr lvl="3">
+              <a:buSzPct val="100000"/>
+            </a:pPr>
+            <a:r>
+              <a:rPr lang="de-DE" sz="1800" dirty="0" smtClean="0"/>
+              <a:t>Daten </a:t>
+            </a:r>
+            <a:r>
+              <a:rPr lang="de-DE" sz="1800" dirty="0" smtClean="0"/>
+              <a:t>werden als Vektor von Strings aus Datenbank </a:t>
+            </a:r>
+            <a:r>
+              <a:rPr lang="de-DE" sz="1800" dirty="0" smtClean="0"/>
+              <a:t>ausgelesen</a:t>
+            </a:r>
+          </a:p>
+          <a:p>
+            <a:pPr lvl="3">
+              <a:buSzPct val="100000"/>
+            </a:pPr>
+            <a:endParaRPr lang="de-DE" sz="1800" dirty="0" smtClean="0"/>
+          </a:p>
+          <a:p>
+            <a:pPr lvl="3">
+              <a:buSzPct val="100000"/>
+            </a:pPr>
+            <a:r>
+              <a:rPr lang="de-DE" sz="1800" dirty="0" smtClean="0"/>
+              <a:t>Strings </a:t>
+            </a:r>
+            <a:r>
+              <a:rPr lang="de-DE" sz="1800" dirty="0" smtClean="0"/>
+              <a:t>werden mit Trennzeichen '$' </a:t>
+            </a:r>
+            <a:r>
+              <a:rPr lang="de-DE" sz="1800" dirty="0" err="1" smtClean="0"/>
+              <a:t>konkateniert</a:t>
+            </a:r>
+            <a:endParaRPr lang="de-DE" sz="1800" dirty="0" smtClean="0"/>
+          </a:p>
+          <a:p>
+            <a:pPr lvl="3">
+              <a:buSzPct val="100000"/>
+              <a:buNone/>
+            </a:pPr>
+            <a:r>
+              <a:rPr lang="de-DE" sz="1800" dirty="0" smtClean="0"/>
+              <a:t> </a:t>
+            </a:r>
+          </a:p>
+          <a:p>
+            <a:pPr lvl="3">
+              <a:buSzPct val="100000"/>
+            </a:pPr>
+            <a:r>
+              <a:rPr lang="de-DE" sz="1800" dirty="0" smtClean="0"/>
+              <a:t>möglich </a:t>
+            </a:r>
+            <a:r>
+              <a:rPr lang="de-DE" sz="1800" dirty="0" smtClean="0"/>
+              <a:t>da weder Hash noch Zeitstempel und Positionsdaten dieses Zeichen enthalten </a:t>
+            </a:r>
+            <a:r>
+              <a:rPr lang="de-DE" sz="2000" dirty="0" smtClean="0"/>
+              <a:t/>
+            </a:r>
+            <a:br>
+              <a:rPr lang="de-DE" sz="2000" dirty="0" smtClean="0"/>
+            </a:br>
+            <a:endParaRPr lang="de-DE" sz="2000" dirty="0" smtClean="0"/>
+          </a:p>
+          <a:p>
+            <a:pPr lvl="1">
+              <a:buSzPct val="100000"/>
+            </a:pPr>
+            <a:r>
+              <a:rPr lang="de-DE" sz="2000" dirty="0" smtClean="0"/>
+              <a:t>Empfänger</a:t>
+            </a:r>
+            <a:r>
+              <a:rPr lang="de-DE" sz="2000" dirty="0" smtClean="0"/>
+              <a:t>: </a:t>
+            </a:r>
+            <a:endParaRPr lang="de-DE" sz="2000" dirty="0" smtClean="0"/>
+          </a:p>
+          <a:p>
+            <a:pPr lvl="3">
+              <a:buSzPct val="100000"/>
+            </a:pPr>
+            <a:r>
+              <a:rPr lang="de-DE" sz="1800" dirty="0" smtClean="0"/>
+              <a:t>Payload </a:t>
+            </a:r>
+            <a:r>
+              <a:rPr lang="de-DE" sz="1800" dirty="0" smtClean="0"/>
+              <a:t>wird über Trennzeichen '$' </a:t>
+            </a:r>
+            <a:r>
+              <a:rPr lang="de-DE" sz="1800" dirty="0" smtClean="0"/>
+              <a:t>auseinandergenommen</a:t>
+            </a:r>
+          </a:p>
+          <a:p>
+            <a:pPr lvl="3">
+              <a:buSzPct val="100000"/>
+            </a:pPr>
+            <a:endParaRPr lang="de-DE" sz="1800" dirty="0" smtClean="0"/>
+          </a:p>
+          <a:p>
+            <a:pPr lvl="3">
+              <a:buSzPct val="100000"/>
+            </a:pPr>
+            <a:r>
+              <a:rPr lang="de-DE" sz="1800" dirty="0" smtClean="0"/>
+              <a:t>Erstellung </a:t>
+            </a:r>
+            <a:r>
+              <a:rPr lang="de-DE" sz="1800" dirty="0" smtClean="0"/>
+              <a:t>eines Vektors aus Strings und Übergabe an Datenbank </a:t>
+            </a:r>
+            <a:endParaRPr lang="de-DE" sz="1100" dirty="0"/>
+          </a:p>
+        </p:txBody>
+      </p:sp>
+    </p:spTree>
+  </p:cSld>
+  <p:clrMapOvr>
+    <a:masterClrMapping/>
+  </p:clrMapOvr>
+  <p:timing>
+    <p:tnLst>
+      <p:par>
+        <p:cTn id="1" dur="indefinite" restart="never" nodeType="tmRoot"/>
+      </p:par>
+    </p:tnLst>
+  </p:timing>
+</p:sld>
+</file>
+
+<file path=ppt/slides/slide9.xml><?xml version="1.0" encoding="utf-8"?>
 <p:sld xmlns:a="http://schemas.openxmlformats.org/drawingml/2006/main" xmlns:r="http://schemas.openxmlformats.org/officeDocument/2006/relationships" xmlns:p="http://schemas.openxmlformats.org/presentationml/2006/main">
   <p:cSld>
     <p:spTree>

</xml_diff>

<commit_message>
Changed order in presentation
Signed-off-by: Mario <m.wozenilek@tu-bs.de>
</commit_message>
<xml_diff>
--- a/doc/Android-Lab-TrackMe-Abschlusspraes.pptx
+++ b/doc/Android-Lab-TrackMe-Abschlusspraes.pptx
@@ -5,18 +5,19 @@
     <p:sldMasterId id="2147483648" r:id="rId1"/>
   </p:sldMasterIdLst>
   <p:notesMasterIdLst>
-    <p:notesMasterId r:id="rId11"/>
+    <p:notesMasterId r:id="rId12"/>
   </p:notesMasterIdLst>
   <p:sldIdLst>
     <p:sldId id="256" r:id="rId2"/>
     <p:sldId id="257" r:id="rId3"/>
     <p:sldId id="258" r:id="rId4"/>
-    <p:sldId id="262" r:id="rId5"/>
-    <p:sldId id="263" r:id="rId6"/>
-    <p:sldId id="264" r:id="rId7"/>
-    <p:sldId id="265" r:id="rId8"/>
-    <p:sldId id="266" r:id="rId9"/>
-    <p:sldId id="261" r:id="rId10"/>
+    <p:sldId id="263" r:id="rId5"/>
+    <p:sldId id="264" r:id="rId6"/>
+    <p:sldId id="265" r:id="rId7"/>
+    <p:sldId id="266" r:id="rId8"/>
+    <p:sldId id="262" r:id="rId9"/>
+    <p:sldId id="267" r:id="rId10"/>
+    <p:sldId id="261" r:id="rId11"/>
   </p:sldIdLst>
   <p:sldSz cx="9144000" cy="6858000" type="screen4x3"/>
   <p:notesSz cx="7099300" cy="10234613"/>
@@ -212,7 +213,7 @@
             </a:lvl1pPr>
           </a:lstStyle>
           <a:p>
-            <a:endParaRPr lang="de-DE"/>
+            <a:endParaRPr lang="de-DE" dirty="0"/>
           </a:p>
         </p:txBody>
       </p:sp>
@@ -255,7 +256,7 @@
             </a:lvl1pPr>
           </a:lstStyle>
           <a:p>
-            <a:endParaRPr lang="de-DE"/>
+            <a:endParaRPr lang="de-DE" dirty="0"/>
           </a:p>
         </p:txBody>
       </p:sp>
@@ -399,7 +400,7 @@
             </a:lvl1pPr>
           </a:lstStyle>
           <a:p>
-            <a:endParaRPr lang="de-DE"/>
+            <a:endParaRPr lang="de-DE" dirty="0"/>
           </a:p>
         </p:txBody>
       </p:sp>
@@ -447,7 +448,7 @@
               <a:pPr/>
               <a:t>‹Nr.›</a:t>
             </a:fld>
-            <a:endParaRPr lang="de-DE"/>
+            <a:endParaRPr lang="de-DE" dirty="0"/>
           </a:p>
         </p:txBody>
       </p:sp>
@@ -629,7 +630,7 @@
           <a:p>
             <a:pPr algn="ctr"/>
             <a:r>
-              <a:rPr lang="de-DE"/>
+              <a:rPr lang="de-DE" dirty="0"/>
               <a:t>Platzhalter für Bild, Bild auf Titelfolie hinter das Logo einsetzen</a:t>
             </a:r>
           </a:p>
@@ -668,7 +669,7 @@
           <a:p>
             <a:pPr algn="ctr"/>
             <a:r>
-              <a:rPr lang="de-DE"/>
+              <a:rPr lang="de-DE" dirty="0"/>
               <a:t>   </a:t>
             </a:r>
           </a:p>
@@ -705,7 +706,7 @@
           <a:bodyPr wrap="none" anchor="ctr"/>
           <a:lstStyle/>
           <a:p>
-            <a:endParaRPr lang="de-DE"/>
+            <a:endParaRPr lang="de-DE" dirty="0"/>
           </a:p>
         </p:txBody>
       </p:sp>
@@ -1080,7 +1081,7 @@
           <a:bodyPr/>
           <a:lstStyle/>
           <a:p>
-            <a:endParaRPr lang="de-DE"/>
+            <a:endParaRPr lang="de-DE" dirty="0"/>
           </a:p>
         </p:txBody>
       </p:sp>
@@ -1141,7 +1142,7 @@
           <a:lstStyle/>
           <a:p>
             <a:pPr algn="ctr"/>
-            <a:endParaRPr lang="de-DE">
+            <a:endParaRPr lang="de-DE" dirty="0">
               <a:solidFill>
                 <a:schemeClr val="accent2"/>
               </a:solidFill>
@@ -1596,7 +1597,7 @@
           <a:lstStyle/>
           <a:p>
             <a:pPr algn="ctr"/>
-            <a:endParaRPr lang="de-DE">
+            <a:endParaRPr lang="de-DE" dirty="0">
               <a:solidFill>
                 <a:schemeClr val="accent2"/>
               </a:solidFill>
@@ -1635,7 +1636,7 @@
           <a:bodyPr/>
           <a:lstStyle/>
           <a:p>
-            <a:endParaRPr lang="de-DE"/>
+            <a:endParaRPr lang="de-DE" dirty="0"/>
           </a:p>
         </p:txBody>
       </p:sp>
@@ -1834,31 +1835,7 @@
             </a:r>
             <a:r>
               <a:rPr lang="de-DE" sz="1000" dirty="0" smtClean="0"/>
-              <a:t>| </a:t>
-            </a:r>
-            <a:r>
-              <a:rPr lang="de-DE" sz="1000" dirty="0" err="1" smtClean="0"/>
-              <a:t>Catgroup</a:t>
-            </a:r>
-            <a:r>
-              <a:rPr lang="de-DE" sz="1000" dirty="0" smtClean="0"/>
-              <a:t> | </a:t>
-            </a:r>
-            <a:r>
-              <a:rPr lang="de-DE" sz="1000" dirty="0" err="1" smtClean="0"/>
-              <a:t>Android</a:t>
-            </a:r>
-            <a:r>
-              <a:rPr lang="de-DE" sz="1000" dirty="0" smtClean="0"/>
-              <a:t>-Lab: </a:t>
-            </a:r>
-            <a:r>
-              <a:rPr lang="de-DE" sz="1000" dirty="0" err="1" smtClean="0"/>
-              <a:t>TrackMe</a:t>
-            </a:r>
-            <a:r>
-              <a:rPr lang="de-DE" sz="1000" dirty="0" smtClean="0"/>
-              <a:t> | Seite</a:t>
+              <a:t>| Catgroup | Android-Lab: TrackMe | Seite</a:t>
             </a:r>
             <a:r>
               <a:rPr lang="de-DE" sz="1000" baseline="0" dirty="0" smtClean="0"/>
@@ -2348,7 +2325,7 @@
           <a:lstStyle/>
           <a:p>
             <a:r>
-              <a:rPr lang="de-DE" dirty="0" err="1" smtClean="0"/>
+              <a:rPr lang="de-DE" dirty="0" smtClean="0"/>
               <a:t>Catgroup</a:t>
             </a:r>
             <a:r>
@@ -2375,16 +2352,97 @@
           <a:lstStyle/>
           <a:p>
             <a:r>
-              <a:rPr lang="de-DE" dirty="0" err="1" smtClean="0"/>
-              <a:t>Android</a:t>
-            </a:r>
-            <a:r>
-              <a:rPr lang="de-DE" dirty="0" smtClean="0"/>
-              <a:t>-Lab: </a:t>
-            </a:r>
-            <a:r>
-              <a:rPr lang="de-DE" dirty="0" err="1" smtClean="0"/>
+              <a:rPr lang="de-DE" dirty="0" smtClean="0"/>
+              <a:t>Android-Lab: </a:t>
+            </a:r>
+            <a:r>
+              <a:rPr lang="de-DE" dirty="0" smtClean="0"/>
               <a:t>TrackMe</a:t>
+            </a:r>
+            <a:endParaRPr lang="de-DE" dirty="0"/>
+          </a:p>
+        </p:txBody>
+      </p:sp>
+    </p:spTree>
+  </p:cSld>
+  <p:clrMapOvr>
+    <a:masterClrMapping/>
+  </p:clrMapOvr>
+  <p:timing>
+    <p:tnLst>
+      <p:par>
+        <p:cTn id="1" dur="indefinite" restart="never" nodeType="tmRoot"/>
+      </p:par>
+    </p:tnLst>
+  </p:timing>
+</p:sld>
+</file>
+
+<file path=ppt/slides/slide10.xml><?xml version="1.0" encoding="utf-8"?>
+<p:sld xmlns:a="http://schemas.openxmlformats.org/drawingml/2006/main" xmlns:r="http://schemas.openxmlformats.org/officeDocument/2006/relationships" xmlns:p="http://schemas.openxmlformats.org/presentationml/2006/main">
+  <p:cSld>
+    <p:spTree>
+      <p:nvGrpSpPr>
+        <p:cNvPr id="1" name=""/>
+        <p:cNvGrpSpPr/>
+        <p:nvPr/>
+      </p:nvGrpSpPr>
+      <p:grpSpPr>
+        <a:xfrm>
+          <a:off x="0" y="0"/>
+          <a:ext cx="0" cy="0"/>
+          <a:chOff x="0" y="0"/>
+          <a:chExt cx="0" cy="0"/>
+        </a:xfrm>
+      </p:grpSpPr>
+      <p:sp>
+        <p:nvSpPr>
+          <p:cNvPr id="2" name="Titel 1"/>
+          <p:cNvSpPr>
+            <a:spLocks noGrp="1"/>
+          </p:cNvSpPr>
+          <p:nvPr>
+            <p:ph type="title"/>
+          </p:nvPr>
+        </p:nvSpPr>
+        <p:spPr/>
+        <p:txBody>
+          <a:bodyPr/>
+          <a:lstStyle/>
+          <a:p>
+            <a:r>
+              <a:rPr lang="de-DE" dirty="0" smtClean="0"/>
+              <a:t>TrackMe</a:t>
+            </a:r>
+            <a:endParaRPr lang="de-DE" dirty="0"/>
+          </a:p>
+        </p:txBody>
+      </p:sp>
+      <p:sp>
+        <p:nvSpPr>
+          <p:cNvPr id="3" name="Textfeld 2"/>
+          <p:cNvSpPr txBox="1"/>
+          <p:nvPr/>
+        </p:nvSpPr>
+        <p:spPr>
+          <a:xfrm>
+            <a:off x="1838325" y="2767281"/>
+            <a:ext cx="5467350" cy="1323439"/>
+          </a:xfrm>
+          <a:prstGeom prst="rect">
+            <a:avLst/>
+          </a:prstGeom>
+          <a:noFill/>
+        </p:spPr>
+        <p:txBody>
+          <a:bodyPr wrap="square" rtlCol="0">
+            <a:spAutoFit/>
+          </a:bodyPr>
+          <a:lstStyle/>
+          <a:p>
+            <a:r>
+              <a:rPr lang="de-DE" sz="8000" dirty="0" smtClean="0"/>
+              <a:t>LIVEDEMO</a:t>
             </a:r>
             <a:endParaRPr lang="de-DE" dirty="0"/>
           </a:p>
@@ -2438,7 +2496,7 @@
           <a:lstStyle/>
           <a:p>
             <a:r>
-              <a:rPr lang="de-DE" dirty="0" err="1" smtClean="0"/>
+              <a:rPr lang="de-DE" dirty="0" smtClean="0"/>
               <a:t>TrackMe</a:t>
             </a:r>
             <a:r>
@@ -2483,15 +2541,7 @@
             </a:pPr>
             <a:r>
               <a:rPr lang="de-DE" dirty="0" smtClean="0"/>
-              <a:t>grob: Netzwerkinfos / </a:t>
-            </a:r>
-            <a:r>
-              <a:rPr lang="de-DE" dirty="0" smtClean="0"/>
-              <a:t>fein: </a:t>
-            </a:r>
-            <a:r>
-              <a:rPr lang="de-DE" dirty="0" smtClean="0"/>
-              <a:t>GPS-Ortung</a:t>
+              <a:t>grob: Netzwerkinfos / fein: GPS-Ortung</a:t>
             </a:r>
           </a:p>
           <a:p>
@@ -2509,7 +2559,7 @@
               <a:t>Visualisierung der Routen auf Google </a:t>
             </a:r>
             <a:r>
-              <a:rPr lang="de-DE" sz="2000" dirty="0" err="1" smtClean="0"/>
+              <a:rPr lang="de-DE" sz="2000" dirty="0" smtClean="0"/>
               <a:t>Maps</a:t>
             </a:r>
             <a:r>
@@ -2674,7 +2724,7 @@
           <a:lstStyle/>
           <a:p>
             <a:r>
-              <a:rPr lang="de-DE" dirty="0" err="1" smtClean="0"/>
+              <a:rPr lang="de-DE" dirty="0" smtClean="0"/>
               <a:t>TrackMe</a:t>
             </a:r>
             <a:r>
@@ -3194,12 +3244,12 @@
           <a:lstStyle/>
           <a:p>
             <a:r>
-              <a:rPr lang="de-DE" dirty="0" err="1" smtClean="0"/>
+              <a:rPr lang="de-DE" dirty="0" smtClean="0"/>
               <a:t>TrackMe</a:t>
             </a:r>
             <a:r>
               <a:rPr lang="de-DE" dirty="0" smtClean="0"/>
-              <a:t>: Datenspeicherung</a:t>
+              <a:t>: Datenaustausch</a:t>
             </a:r>
             <a:endParaRPr lang="de-DE" dirty="0"/>
           </a:p>
@@ -3218,7 +3268,7 @@
         <p:spPr>
           <a:xfrm>
             <a:off x="431800" y="1042988"/>
-            <a:ext cx="6229350" cy="4772025"/>
+            <a:ext cx="8229600" cy="4772025"/>
           </a:xfrm>
         </p:spPr>
         <p:txBody>
@@ -3230,15 +3280,92 @@
             </a:pPr>
             <a:r>
               <a:rPr lang="de-DE" sz="2000" dirty="0" smtClean="0"/>
-              <a:t>Speicherung der Positionsdaten in </a:t>
-            </a:r>
-            <a:r>
-              <a:rPr lang="de-DE" sz="2000" dirty="0" err="1" smtClean="0"/>
-              <a:t>SQLite</a:t>
-            </a:r>
+              <a:t>Optimal: mobiles Ad-hoc-Netz </a:t>
+            </a:r>
+          </a:p>
+          <a:p>
+            <a:pPr lvl="3">
+              <a:buSzPct val="100000"/>
+            </a:pPr>
+            <a:r>
+              <a:rPr lang="de-DE" dirty="0" smtClean="0"/>
+              <a:t>(lateinisch ad hoc, sinngemäß ‚für diesen Augenblick gemacht‘)</a:t>
+            </a:r>
+          </a:p>
+          <a:p>
+            <a:pPr lvl="3">
+              <a:buSzPct val="100000"/>
+            </a:pPr>
+            <a:endParaRPr lang="de-DE" dirty="0" smtClean="0"/>
+          </a:p>
+          <a:p>
+            <a:pPr lvl="1">
+              <a:buSzPct val="100000"/>
+            </a:pPr>
             <a:r>
               <a:rPr lang="de-DE" sz="2000" dirty="0" smtClean="0"/>
-              <a:t> Datenbank</a:t>
+              <a:t>selbstständige Konfiguration zwischen mobilen Geräten </a:t>
+            </a:r>
+            <a:br>
+              <a:rPr lang="de-DE" sz="2000" dirty="0" smtClean="0"/>
+            </a:br>
+            <a:endParaRPr lang="de-DE" sz="2000" dirty="0" smtClean="0"/>
+          </a:p>
+          <a:p>
+            <a:pPr lvl="1">
+              <a:buSzPct val="100000"/>
+            </a:pPr>
+            <a:r>
+              <a:rPr lang="de-DE" sz="2000" dirty="0" smtClean="0"/>
+              <a:t>Perfekt! Aber? </a:t>
+            </a:r>
+            <a:br>
+              <a:rPr lang="de-DE" sz="2000" dirty="0" smtClean="0"/>
+            </a:br>
+            <a:endParaRPr lang="de-DE" sz="2000" dirty="0" smtClean="0"/>
+          </a:p>
+          <a:p>
+            <a:pPr lvl="1">
+              <a:buSzPct val="100000"/>
+            </a:pPr>
+            <a:r>
+              <a:rPr lang="de-DE" sz="2000" dirty="0" smtClean="0"/>
+              <a:t>Ad-hoc nur von wenigen Android-Geräten unterstützt </a:t>
+            </a:r>
+          </a:p>
+          <a:p>
+            <a:pPr lvl="1">
+              <a:buSzPct val="100000"/>
+            </a:pPr>
+            <a:endParaRPr lang="de-DE" sz="2000" dirty="0" smtClean="0"/>
+          </a:p>
+          <a:p>
+            <a:pPr lvl="1">
+              <a:buSzPct val="100000"/>
+            </a:pPr>
+            <a:r>
+              <a:rPr lang="de-DE" sz="2000" dirty="0" smtClean="0"/>
+              <a:t>wpa_supplicant</a:t>
+            </a:r>
+            <a:r>
+              <a:rPr lang="de-DE" sz="2000" dirty="0" smtClean="0"/>
+              <a:t> kompatibler </a:t>
+            </a:r>
+            <a:r>
+              <a:rPr lang="de-DE" sz="2000" dirty="0" smtClean="0"/>
+              <a:t>Wi</a:t>
+            </a:r>
+            <a:r>
+              <a:rPr lang="de-DE" sz="2000" dirty="0" smtClean="0"/>
+              <a:t>-</a:t>
+            </a:r>
+            <a:r>
+              <a:rPr lang="de-DE" sz="2000" dirty="0" smtClean="0"/>
+              <a:t>Fi</a:t>
+            </a:r>
+            <a:r>
+              <a:rPr lang="de-DE" sz="2000" dirty="0" smtClean="0"/>
+              <a:t>-Treiber nötigt </a:t>
             </a:r>
           </a:p>
           <a:p>
@@ -3247,108 +3374,20 @@
             </a:pPr>
             <a:r>
               <a:rPr lang="de-DE" dirty="0" smtClean="0"/>
-              <a:t>eigene Daten und Positionsdaten anderer Nutzer</a:t>
-            </a:r>
-          </a:p>
-          <a:p>
-            <a:pPr lvl="1">
-              <a:buSzPct val="100000"/>
-            </a:pPr>
-            <a:endParaRPr lang="de-DE" sz="2000" dirty="0" smtClean="0"/>
-          </a:p>
-          <a:p>
-            <a:pPr lvl="1">
-              <a:buSzPct val="100000"/>
-            </a:pPr>
-            <a:r>
-              <a:rPr lang="de-DE" sz="2000" dirty="0" smtClean="0"/>
-              <a:t>Identifikation über </a:t>
-            </a:r>
-            <a:r>
-              <a:rPr lang="de-DE" sz="2000" dirty="0" smtClean="0"/>
-              <a:t>Handynummer</a:t>
-            </a:r>
-          </a:p>
-          <a:p>
-            <a:pPr lvl="3">
-              <a:buSzPct val="100000"/>
-            </a:pPr>
-            <a:r>
-              <a:rPr lang="de-DE" dirty="0" smtClean="0"/>
-              <a:t>v</a:t>
-            </a:r>
-            <a:r>
-              <a:rPr lang="de-DE" dirty="0" smtClean="0"/>
-              <a:t>erschlüsselte Speicherung</a:t>
-            </a:r>
-            <a:endParaRPr lang="de-DE" dirty="0" smtClean="0"/>
-          </a:p>
-          <a:p>
-            <a:pPr lvl="1">
-              <a:buSzPct val="100000"/>
-            </a:pPr>
-            <a:endParaRPr lang="de-DE" sz="2000" dirty="0" smtClean="0"/>
-          </a:p>
-          <a:p>
-            <a:pPr lvl="1">
-              <a:buSzPct val="100000"/>
-            </a:pPr>
-            <a:r>
-              <a:rPr lang="de-DE" sz="2000" dirty="0" smtClean="0"/>
-              <a:t>Dezentraler Datenaustausch über DTN</a:t>
-            </a:r>
-          </a:p>
-          <a:p>
-            <a:pPr lvl="1">
-              <a:buSzPct val="100000"/>
-            </a:pPr>
-            <a:endParaRPr lang="de-DE" sz="2000" dirty="0" smtClean="0"/>
-          </a:p>
-          <a:p>
-            <a:pPr lvl="1">
-              <a:buSzPct val="100000"/>
-            </a:pPr>
-            <a:r>
-              <a:rPr lang="de-DE" sz="2000" dirty="0" smtClean="0"/>
-              <a:t>Unterschiedliche Profileinstellungen </a:t>
-            </a:r>
-          </a:p>
-          <a:p>
-            <a:pPr lvl="3">
-              <a:buSzPct val="100000"/>
-            </a:pPr>
-            <a:r>
-              <a:rPr lang="de-DE" dirty="0" smtClean="0"/>
-              <a:t>zwecks Übersicht und Datensicherheit</a:t>
-            </a:r>
-            <a:endParaRPr lang="de-DE" dirty="0"/>
+              <a:t>=&gt; vorerst Kommunikation </a:t>
+            </a:r>
+            <a:r>
+              <a:rPr lang="de-DE" dirty="0" smtClean="0"/>
+              <a:t>Infrastruktur </a:t>
+            </a:r>
+            <a:r>
+              <a:rPr lang="de-DE" dirty="0" smtClean="0"/>
+              <a:t>Netzwerk</a:t>
+            </a:r>
+            <a:endParaRPr lang="de-DE" sz="1200" dirty="0"/>
           </a:p>
         </p:txBody>
       </p:sp>
-      <p:pic>
-        <p:nvPicPr>
-          <p:cNvPr id="7" name="Grafik 6" descr="db.png"/>
-          <p:cNvPicPr>
-            <a:picLocks noChangeAspect="1"/>
-          </p:cNvPicPr>
-          <p:nvPr/>
-        </p:nvPicPr>
-        <p:blipFill>
-          <a:blip r:embed="rId2"/>
-          <a:stretch>
-            <a:fillRect/>
-          </a:stretch>
-        </p:blipFill>
-        <p:spPr>
-          <a:xfrm>
-            <a:off x="6038850" y="2628900"/>
-            <a:ext cx="2832100" cy="3125546"/>
-          </a:xfrm>
-          <a:prstGeom prst="rect">
-            <a:avLst/>
-          </a:prstGeom>
-        </p:spPr>
-      </p:pic>
     </p:spTree>
   </p:cSld>
   <p:clrMapOvr>
@@ -3397,16 +3436,12 @@
           <a:lstStyle/>
           <a:p>
             <a:r>
-              <a:rPr lang="de-DE" dirty="0" err="1" smtClean="0"/>
+              <a:rPr lang="de-DE" dirty="0" smtClean="0"/>
               <a:t>TrackMe</a:t>
             </a:r>
             <a:r>
               <a:rPr lang="de-DE" dirty="0" smtClean="0"/>
-              <a:t>: </a:t>
-            </a:r>
-            <a:r>
-              <a:rPr lang="de-DE" dirty="0" smtClean="0"/>
-              <a:t>Datenaustausch</a:t>
+              <a:t>: DTN-Kommunikation</a:t>
             </a:r>
             <a:endParaRPr lang="de-DE" dirty="0"/>
           </a:p>
@@ -3437,36 +3472,88 @@
             </a:pPr>
             <a:r>
               <a:rPr lang="de-DE" sz="2000" dirty="0" smtClean="0"/>
-              <a:t>Optimal</a:t>
+              <a:t>jeder </a:t>
             </a:r>
             <a:r>
               <a:rPr lang="de-DE" sz="2000" dirty="0" smtClean="0"/>
-              <a:t>: mobiles Ad-hoc-Netz </a:t>
-            </a:r>
+              <a:t>TrackMe</a:t>
+            </a:r>
+            <a:r>
+              <a:rPr lang="de-DE" sz="2000" dirty="0" smtClean="0"/>
+              <a:t>-Teilnehmer registriert sich für den Group-</a:t>
+            </a:r>
+            <a:r>
+              <a:rPr lang="de-DE" sz="2000" dirty="0" smtClean="0"/>
+              <a:t>Endpoint</a:t>
+            </a:r>
+            <a:r>
+              <a:rPr lang="de-DE" sz="2000" dirty="0" smtClean="0"/>
+              <a:t> "dtn://trackme.dtn/presence" </a:t>
+            </a:r>
+          </a:p>
+          <a:p>
+            <a:pPr lvl="1">
+              <a:buSzPct val="100000"/>
+            </a:pPr>
             <a:endParaRPr lang="de-DE" sz="2000" dirty="0" smtClean="0"/>
           </a:p>
           <a:p>
+            <a:pPr lvl="1">
+              <a:buSzPct val="100000"/>
+            </a:pPr>
+            <a:r>
+              <a:rPr lang="de-DE" sz="2000" dirty="0" smtClean="0"/>
+              <a:t>Anwesenheit-Ankündigung über diesen Group-</a:t>
+            </a:r>
+            <a:r>
+              <a:rPr lang="de-DE" sz="2000" dirty="0" smtClean="0"/>
+              <a:t>Endpoint</a:t>
+            </a:r>
+            <a:r>
+              <a:rPr lang="de-DE" sz="2000" dirty="0" smtClean="0"/>
+              <a:t> in zeitlichem Intervall</a:t>
+            </a:r>
+          </a:p>
+          <a:p>
             <a:pPr lvl="3">
               <a:buSzPct val="100000"/>
             </a:pPr>
             <a:r>
               <a:rPr lang="de-DE" dirty="0" smtClean="0"/>
-              <a:t>(</a:t>
-            </a:r>
-            <a:r>
-              <a:rPr lang="de-DE" dirty="0" smtClean="0"/>
-              <a:t>lateinisch ad hoc, sinngemäß ‚für diesen Augenblick gemacht</a:t>
-            </a:r>
-            <a:r>
-              <a:rPr lang="de-DE" dirty="0" smtClean="0"/>
-              <a:t>‘)</a:t>
-            </a:r>
+              <a:t>(Konfigurierbar als "Presence-</a:t>
+            </a:r>
+            <a:r>
+              <a:rPr lang="de-DE" dirty="0" smtClean="0"/>
+              <a:t>Notification</a:t>
+            </a:r>
+            <a:r>
+              <a:rPr lang="de-DE" dirty="0" smtClean="0"/>
+              <a:t>-Delay") </a:t>
+            </a:r>
+            <a:endParaRPr lang="de-DE" sz="2000" dirty="0" smtClean="0"/>
           </a:p>
           <a:p>
             <a:pPr lvl="3">
               <a:buSzPct val="100000"/>
             </a:pPr>
-            <a:endParaRPr lang="de-DE" dirty="0" smtClean="0"/>
+            <a:r>
+              <a:rPr lang="de-DE" dirty="0" smtClean="0"/>
+              <a:t>=&gt; jeder </a:t>
+            </a:r>
+            <a:r>
+              <a:rPr lang="de-DE" dirty="0" smtClean="0"/>
+              <a:t>TrackMe</a:t>
+            </a:r>
+            <a:r>
+              <a:rPr lang="de-DE" dirty="0" smtClean="0"/>
+              <a:t> Teilnehmer im Netzwerk bekommt diese Ankündigung </a:t>
+            </a:r>
+          </a:p>
+          <a:p>
+            <a:pPr lvl="3">
+              <a:buSzPct val="100000"/>
+            </a:pPr>
+            <a:endParaRPr lang="de-DE" sz="2000" dirty="0" smtClean="0"/>
           </a:p>
           <a:p>
             <a:pPr lvl="1">
@@ -3474,117 +3561,8 @@
             </a:pPr>
             <a:r>
               <a:rPr lang="de-DE" sz="2000" dirty="0" smtClean="0"/>
-              <a:t>selbstständige Konfiguration </a:t>
-            </a:r>
-            <a:r>
-              <a:rPr lang="de-DE" sz="2000" dirty="0" smtClean="0"/>
-              <a:t>zwischen mobilen Geräten </a:t>
-            </a:r>
-            <a:br>
-              <a:rPr lang="de-DE" sz="2000" dirty="0" smtClean="0"/>
-            </a:br>
-            <a:endParaRPr lang="de-DE" sz="2000" dirty="0" smtClean="0"/>
-          </a:p>
-          <a:p>
-            <a:pPr lvl="1">
-              <a:buSzPct val="100000"/>
-            </a:pPr>
-            <a:r>
-              <a:rPr lang="de-DE" sz="2000" dirty="0" smtClean="0"/>
-              <a:t>Perfekt</a:t>
-            </a:r>
-            <a:r>
-              <a:rPr lang="de-DE" sz="2000" dirty="0" smtClean="0"/>
-              <a:t>! Aber? </a:t>
-            </a:r>
-            <a:br>
-              <a:rPr lang="de-DE" sz="2000" dirty="0" smtClean="0"/>
-            </a:br>
-            <a:endParaRPr lang="de-DE" sz="2000" dirty="0" smtClean="0"/>
-          </a:p>
-          <a:p>
-            <a:pPr lvl="1">
-              <a:buSzPct val="100000"/>
-            </a:pPr>
-            <a:r>
-              <a:rPr lang="de-DE" sz="2000" dirty="0" smtClean="0"/>
-              <a:t>Ad-hoc </a:t>
-            </a:r>
-            <a:r>
-              <a:rPr lang="de-DE" sz="2000" dirty="0" smtClean="0"/>
-              <a:t>nur von wenigen </a:t>
-            </a:r>
-            <a:r>
-              <a:rPr lang="de-DE" sz="2000" dirty="0" err="1" smtClean="0"/>
-              <a:t>Android</a:t>
-            </a:r>
-            <a:r>
-              <a:rPr lang="de-DE" sz="2000" dirty="0" smtClean="0"/>
-              <a:t>-Geräten unterstützt </a:t>
-            </a:r>
-            <a:endParaRPr lang="de-DE" sz="2000" dirty="0" smtClean="0"/>
-          </a:p>
-          <a:p>
-            <a:pPr lvl="1">
-              <a:buSzPct val="100000"/>
-            </a:pPr>
-            <a:endParaRPr lang="de-DE" sz="2000" dirty="0" smtClean="0"/>
-          </a:p>
-          <a:p>
-            <a:pPr lvl="1">
-              <a:buSzPct val="100000"/>
-            </a:pPr>
-            <a:r>
-              <a:rPr lang="de-DE" sz="2000" dirty="0" err="1" smtClean="0"/>
-              <a:t>wpa_supplicant</a:t>
-            </a:r>
-            <a:r>
-              <a:rPr lang="de-DE" sz="2000" dirty="0" smtClean="0"/>
-              <a:t> </a:t>
-            </a:r>
-            <a:r>
-              <a:rPr lang="de-DE" sz="2000" dirty="0" smtClean="0"/>
-              <a:t>kompatibler </a:t>
-            </a:r>
-            <a:r>
-              <a:rPr lang="de-DE" sz="2000" dirty="0" err="1" smtClean="0"/>
-              <a:t>Wi</a:t>
-            </a:r>
-            <a:r>
-              <a:rPr lang="de-DE" sz="2000" dirty="0" smtClean="0"/>
-              <a:t>-</a:t>
-            </a:r>
-            <a:r>
-              <a:rPr lang="de-DE" sz="2000" dirty="0" err="1" smtClean="0"/>
-              <a:t>Fi</a:t>
-            </a:r>
-            <a:r>
-              <a:rPr lang="de-DE" sz="2000" dirty="0" smtClean="0"/>
-              <a:t>-Treiber nötigt </a:t>
-            </a:r>
-            <a:endParaRPr lang="de-DE" sz="2000" dirty="0" smtClean="0"/>
-          </a:p>
-          <a:p>
-            <a:pPr lvl="3">
-              <a:buSzPct val="100000"/>
-            </a:pPr>
-            <a:r>
-              <a:rPr lang="de-DE" dirty="0" smtClean="0"/>
-              <a:t>=&gt; </a:t>
-            </a:r>
-            <a:r>
-              <a:rPr lang="de-DE" dirty="0" smtClean="0"/>
-              <a:t>vorerst Kommunikation </a:t>
-            </a:r>
-            <a:r>
-              <a:rPr lang="de-DE" dirty="0" err="1" smtClean="0"/>
-              <a:t>infrastruktur</a:t>
-            </a:r>
-            <a:r>
-              <a:rPr lang="de-DE" dirty="0" smtClean="0"/>
-              <a:t> Netzwerk</a:t>
-            </a:r>
-            <a:endParaRPr lang="de-DE" sz="1200" dirty="0"/>
+              <a:t> Daten-Pakete mit Routen als Antwort auf Presence-Nachrichten</a:t>
+            </a:r>
           </a:p>
         </p:txBody>
       </p:sp>
@@ -3636,16 +3614,12 @@
           <a:lstStyle/>
           <a:p>
             <a:r>
-              <a:rPr lang="de-DE" dirty="0" err="1" smtClean="0"/>
+              <a:rPr lang="de-DE" dirty="0" smtClean="0"/>
               <a:t>TrackMe</a:t>
             </a:r>
             <a:r>
               <a:rPr lang="de-DE" dirty="0" smtClean="0"/>
-              <a:t>: </a:t>
-            </a:r>
-            <a:r>
-              <a:rPr lang="de-DE" dirty="0" smtClean="0"/>
-              <a:t>DTN-Kommunikation</a:t>
+              <a:t>: DTN-Kommunikation</a:t>
             </a:r>
             <a:endParaRPr lang="de-DE" dirty="0"/>
           </a:p>
@@ -3676,126 +3650,64 @@
             </a:pPr>
             <a:r>
               <a:rPr lang="de-DE" sz="2000" dirty="0" smtClean="0"/>
-              <a:t>jeder </a:t>
-            </a:r>
-            <a:r>
-              <a:rPr lang="de-DE" sz="2000" dirty="0" err="1" smtClean="0"/>
-              <a:t>TrackMe</a:t>
-            </a:r>
+              <a:t>Lokaler Zeitstempel für zeitlichen Abstand zu wiederholter Datenübertragung </a:t>
+            </a:r>
+          </a:p>
+          <a:p>
+            <a:pPr lvl="3">
+              <a:buSzPct val="100000"/>
+            </a:pPr>
+            <a:r>
+              <a:rPr lang="de-DE" dirty="0" smtClean="0"/>
+              <a:t>(Konfigurierbar als "Data-</a:t>
+            </a:r>
+            <a:r>
+              <a:rPr lang="de-DE" dirty="0" smtClean="0"/>
+              <a:t>Retransmission</a:t>
+            </a:r>
+            <a:r>
+              <a:rPr lang="de-DE" dirty="0" smtClean="0"/>
+              <a:t>-Delay") </a:t>
+            </a:r>
+            <a:endParaRPr lang="de-DE" sz="2000" dirty="0" smtClean="0"/>
+          </a:p>
+          <a:p>
+            <a:pPr lvl="3">
+              <a:buSzPct val="100000"/>
+            </a:pPr>
+            <a:r>
+              <a:rPr lang="de-DE" dirty="0" smtClean="0"/>
+              <a:t>=&gt; Einzelner Teilnehmer bekommt Daten-Paket mit Routen</a:t>
+            </a:r>
+          </a:p>
+          <a:p>
+            <a:pPr lvl="3">
+              <a:buSzPct val="100000"/>
+              <a:buNone/>
+            </a:pPr>
+            <a:r>
+              <a:rPr lang="de-DE" dirty="0" smtClean="0"/>
+              <a:t> </a:t>
+            </a:r>
+            <a:endParaRPr lang="de-DE" sz="2000" dirty="0" smtClean="0"/>
+          </a:p>
+          <a:p>
+            <a:pPr lvl="1">
+              <a:buSzPct val="100000"/>
+            </a:pPr>
             <a:r>
               <a:rPr lang="de-DE" sz="2000" dirty="0" smtClean="0"/>
-              <a:t>-Teilnehmer registriert sich für den Group-</a:t>
-            </a:r>
-            <a:r>
-              <a:rPr lang="de-DE" sz="2000" dirty="0" err="1" smtClean="0"/>
-              <a:t>Endpoint</a:t>
+              <a:t>Die Time-</a:t>
             </a:r>
             <a:r>
               <a:rPr lang="de-DE" sz="2000" dirty="0" smtClean="0"/>
-              <a:t> "dtn://trackme.dtn/presence" </a:t>
-            </a:r>
-            <a:endParaRPr lang="de-DE" sz="2000" dirty="0" smtClean="0"/>
-          </a:p>
-          <a:p>
-            <a:pPr lvl="1">
-              <a:buSzPct val="100000"/>
-            </a:pPr>
-            <a:endParaRPr lang="de-DE" sz="2000" dirty="0" smtClean="0"/>
-          </a:p>
-          <a:p>
-            <a:pPr lvl="1">
-              <a:buSzPct val="100000"/>
-            </a:pPr>
+              <a:t>to</a:t>
+            </a:r>
             <a:r>
               <a:rPr lang="de-DE" sz="2000" dirty="0" smtClean="0"/>
-              <a:t>Anwesenheit-Ankündigung </a:t>
-            </a:r>
-            <a:r>
-              <a:rPr lang="de-DE" sz="2000" dirty="0" smtClean="0"/>
-              <a:t>über diesen Group-</a:t>
-            </a:r>
-            <a:r>
-              <a:rPr lang="de-DE" sz="2000" dirty="0" err="1" smtClean="0"/>
-              <a:t>Endpoint</a:t>
-            </a:r>
-            <a:r>
-              <a:rPr lang="de-DE" sz="2000" dirty="0" smtClean="0"/>
-              <a:t> in zeitlichem </a:t>
-            </a:r>
-            <a:r>
-              <a:rPr lang="de-DE" sz="2000" dirty="0" smtClean="0"/>
-              <a:t>Intervall</a:t>
-            </a:r>
-          </a:p>
-          <a:p>
-            <a:pPr lvl="3">
-              <a:buSzPct val="100000"/>
-            </a:pPr>
-            <a:r>
-              <a:rPr lang="de-DE" dirty="0" smtClean="0"/>
-              <a:t>(</a:t>
-            </a:r>
-            <a:r>
-              <a:rPr lang="de-DE" dirty="0" smtClean="0"/>
-              <a:t>Konfigurierbar als "Presence-</a:t>
-            </a:r>
-            <a:r>
-              <a:rPr lang="de-DE" dirty="0" err="1" smtClean="0"/>
-              <a:t>Notification</a:t>
-            </a:r>
-            <a:r>
-              <a:rPr lang="de-DE" dirty="0" smtClean="0"/>
-              <a:t>-Delay") </a:t>
-            </a:r>
-            <a:endParaRPr lang="de-DE" sz="2000" dirty="0" smtClean="0"/>
-          </a:p>
-          <a:p>
-            <a:pPr lvl="3">
-              <a:buSzPct val="100000"/>
-            </a:pPr>
-            <a:r>
-              <a:rPr lang="de-DE" dirty="0" smtClean="0"/>
-              <a:t>=&gt; </a:t>
-            </a:r>
-            <a:r>
-              <a:rPr lang="de-DE" dirty="0" smtClean="0"/>
-              <a:t>jeder </a:t>
-            </a:r>
-            <a:r>
-              <a:rPr lang="de-DE" dirty="0" err="1" smtClean="0"/>
-              <a:t>TrackMe</a:t>
-            </a:r>
-            <a:r>
-              <a:rPr lang="de-DE" dirty="0" smtClean="0"/>
-              <a:t> Teilnehmer im Netzwerk bekommt diese </a:t>
-            </a:r>
-            <a:r>
-              <a:rPr lang="de-DE" dirty="0" smtClean="0"/>
-              <a:t>Ankündigung </a:t>
-            </a:r>
-          </a:p>
-          <a:p>
-            <a:pPr lvl="3">
-              <a:buSzPct val="100000"/>
-            </a:pPr>
-            <a:endParaRPr lang="de-DE" sz="2000" dirty="0" smtClean="0"/>
-          </a:p>
-          <a:p>
-            <a:pPr lvl="1">
-              <a:buSzPct val="100000"/>
-            </a:pPr>
-            <a:r>
-              <a:rPr lang="de-DE" sz="2000" dirty="0" smtClean="0"/>
-              <a:t> Daten-Pakete </a:t>
-            </a:r>
-            <a:r>
-              <a:rPr lang="de-DE" sz="2000" dirty="0" smtClean="0"/>
-              <a:t>mit Routen als Antwort auf </a:t>
-            </a:r>
-            <a:r>
-              <a:rPr lang="de-DE" sz="2000" dirty="0" smtClean="0"/>
-              <a:t>Presence-Nachrichten</a:t>
-            </a:r>
+              <a:t>-live für Presence- und Data-Nachrichten ebenfalls konfigurierbar als Presence-TTL und Data-TTL</a:t>
+            </a:r>
+            <a:endParaRPr lang="de-DE" sz="1200" dirty="0"/>
           </a:p>
         </p:txBody>
       </p:sp>
@@ -3847,7 +3759,7 @@
           <a:lstStyle/>
           <a:p>
             <a:r>
-              <a:rPr lang="de-DE" dirty="0" err="1" smtClean="0"/>
+              <a:rPr lang="de-DE" dirty="0" smtClean="0"/>
               <a:t>TrackMe</a:t>
             </a:r>
             <a:r>
@@ -3856,7 +3768,11 @@
             </a:r>
             <a:r>
               <a:rPr lang="de-DE" dirty="0" smtClean="0"/>
-              <a:t>DTN-Kommunikation</a:t>
+              <a:t>Bundle</a:t>
+            </a:r>
+            <a:r>
+              <a:rPr lang="de-DE" dirty="0" smtClean="0"/>
+              <a:t>-Erstellung</a:t>
             </a:r>
             <a:endParaRPr lang="de-DE" dirty="0"/>
           </a:p>
@@ -3887,7 +3803,7 @@
             </a:pPr>
             <a:r>
               <a:rPr lang="de-DE" sz="2000" dirty="0" smtClean="0"/>
-              <a:t>Lokaler Zeitstempel für zeitlichen Abstand zu wiederholter Datenübertragung </a:t>
+              <a:t>Absender: </a:t>
             </a:r>
           </a:p>
           <a:p>
@@ -3895,60 +3811,90 @@
               <a:buSzPct val="100000"/>
             </a:pPr>
             <a:r>
-              <a:rPr lang="de-DE" dirty="0" smtClean="0"/>
-              <a:t>(Konfigurierbar als "Data-</a:t>
-            </a:r>
-            <a:r>
-              <a:rPr lang="de-DE" dirty="0" err="1" smtClean="0"/>
-              <a:t>Retransmission</a:t>
-            </a:r>
-            <a:r>
-              <a:rPr lang="de-DE" dirty="0" smtClean="0"/>
-              <a:t>-Delay") </a:t>
-            </a:r>
+              <a:rPr lang="de-DE" sz="1800" dirty="0" smtClean="0"/>
+              <a:t>Daten werden als Vektor von Strings aus Datenbank ausgelesen</a:t>
+            </a:r>
+          </a:p>
+          <a:p>
+            <a:pPr lvl="3">
+              <a:buSzPct val="100000"/>
+            </a:pPr>
+            <a:endParaRPr lang="de-DE" sz="1800" dirty="0" smtClean="0"/>
+          </a:p>
+          <a:p>
+            <a:pPr lvl="3">
+              <a:buSzPct val="100000"/>
+            </a:pPr>
+            <a:r>
+              <a:rPr lang="de-DE" sz="1800" dirty="0" smtClean="0"/>
+              <a:t>Strings werden mit Trennzeichen '$' </a:t>
+            </a:r>
+            <a:r>
+              <a:rPr lang="de-DE" sz="1800" dirty="0" smtClean="0"/>
+              <a:t>konkateniert</a:t>
+            </a:r>
+            <a:endParaRPr lang="de-DE" sz="1800" dirty="0" smtClean="0"/>
+          </a:p>
+          <a:p>
+            <a:pPr lvl="3">
+              <a:buSzPct val="100000"/>
+              <a:buNone/>
+            </a:pPr>
+            <a:r>
+              <a:rPr lang="de-DE" sz="1800" dirty="0" smtClean="0"/>
+              <a:t> </a:t>
+            </a:r>
+          </a:p>
+          <a:p>
+            <a:pPr lvl="3">
+              <a:buSzPct val="100000"/>
+            </a:pPr>
+            <a:r>
+              <a:rPr lang="de-DE" sz="1800" dirty="0" smtClean="0"/>
+              <a:t>möglich da weder Hash noch Zeitstempel und Positionsdaten dieses Zeichen enthalten </a:t>
+            </a:r>
+            <a:r>
+              <a:rPr lang="de-DE" sz="2000" dirty="0" smtClean="0"/>
+              <a:t/>
+            </a:r>
+            <a:br>
+              <a:rPr lang="de-DE" sz="2000" dirty="0" smtClean="0"/>
+            </a:br>
             <a:endParaRPr lang="de-DE" sz="2000" dirty="0" smtClean="0"/>
           </a:p>
           <a:p>
+            <a:pPr lvl="1">
+              <a:buSzPct val="100000"/>
+            </a:pPr>
+            <a:r>
+              <a:rPr lang="de-DE" sz="2000" dirty="0" smtClean="0"/>
+              <a:t>Empfänger: </a:t>
+            </a:r>
+          </a:p>
+          <a:p>
             <a:pPr lvl="3">
               <a:buSzPct val="100000"/>
             </a:pPr>
             <a:r>
-              <a:rPr lang="de-DE" dirty="0" smtClean="0"/>
-              <a:t>=&gt; Einzelner Teilnehmer bekommt Daten-Paket mit </a:t>
-            </a:r>
-            <a:r>
-              <a:rPr lang="de-DE" dirty="0" smtClean="0"/>
-              <a:t>Routen</a:t>
+              <a:rPr lang="de-DE" sz="1800" dirty="0" smtClean="0"/>
+              <a:t>Payload wird über Trennzeichen '$' auseinandergenommen</a:t>
             </a:r>
           </a:p>
           <a:p>
             <a:pPr lvl="3">
               <a:buSzPct val="100000"/>
-              <a:buNone/>
-            </a:pPr>
-            <a:r>
-              <a:rPr lang="de-DE" dirty="0" smtClean="0"/>
-              <a:t> </a:t>
-            </a:r>
-            <a:endParaRPr lang="de-DE" sz="2000" dirty="0" smtClean="0"/>
-          </a:p>
-          <a:p>
-            <a:pPr lvl="1">
-              <a:buSzPct val="100000"/>
-            </a:pPr>
-            <a:r>
-              <a:rPr lang="de-DE" sz="2000" dirty="0" smtClean="0"/>
-              <a:t>Die Time-</a:t>
-            </a:r>
-            <a:r>
-              <a:rPr lang="de-DE" sz="2000" dirty="0" err="1" smtClean="0"/>
-              <a:t>to</a:t>
-            </a:r>
-            <a:r>
-              <a:rPr lang="de-DE" sz="2000" dirty="0" smtClean="0"/>
-              <a:t>-live für Presence- und Data-Nachrichten ebenfalls konfigurierbar als Presence-TTL und Data-TTL</a:t>
-            </a:r>
-            <a:endParaRPr lang="de-DE" sz="1200" dirty="0"/>
+            </a:pPr>
+            <a:endParaRPr lang="de-DE" sz="1800" dirty="0" smtClean="0"/>
+          </a:p>
+          <a:p>
+            <a:pPr lvl="3">
+              <a:buSzPct val="100000"/>
+            </a:pPr>
+            <a:r>
+              <a:rPr lang="de-DE" sz="1800" dirty="0" smtClean="0"/>
+              <a:t>Erstellung eines Vektors aus Strings und Übergabe an Datenbank </a:t>
+            </a:r>
+            <a:endParaRPr lang="de-DE" sz="1100" dirty="0"/>
           </a:p>
         </p:txBody>
       </p:sp>
@@ -4000,7 +3946,7 @@
           <a:lstStyle/>
           <a:p>
             <a:r>
-              <a:rPr lang="de-DE" dirty="0" err="1" smtClean="0"/>
+              <a:rPr lang="de-DE" dirty="0" smtClean="0"/>
               <a:t>TrackMe</a:t>
             </a:r>
             <a:r>
@@ -4008,12 +3954,8 @@
               <a:t>: </a:t>
             </a:r>
             <a:r>
-              <a:rPr lang="de-DE" dirty="0" err="1" smtClean="0"/>
-              <a:t>Bundle</a:t>
-            </a:r>
-            <a:r>
-              <a:rPr lang="de-DE" dirty="0" smtClean="0"/>
-              <a:t>-Erstellung</a:t>
+              <a:rPr lang="de-DE" dirty="0" smtClean="0"/>
+              <a:t>Positionsbestimmung</a:t>
             </a:r>
             <a:endParaRPr lang="de-DE" dirty="0"/>
           </a:p>
@@ -4032,7 +3974,7 @@
         <p:spPr>
           <a:xfrm>
             <a:off x="431800" y="1042988"/>
-            <a:ext cx="8229600" cy="4772025"/>
+            <a:ext cx="5918200" cy="4772025"/>
           </a:xfrm>
         </p:spPr>
         <p:txBody>
@@ -4044,7 +3986,39 @@
             </a:pPr>
             <a:r>
               <a:rPr lang="de-DE" sz="2000" dirty="0" smtClean="0"/>
-              <a:t>Absender: </a:t>
+              <a:t>Positionsbestimmung über GPS-Empfänger und erreichbare Funknetze</a:t>
+            </a:r>
+            <a:endParaRPr lang="de-DE" dirty="0" smtClean="0"/>
+          </a:p>
+          <a:p>
+            <a:pPr lvl="1">
+              <a:buSzPct val="100000"/>
+            </a:pPr>
+            <a:endParaRPr lang="de-DE" sz="2000" dirty="0" smtClean="0"/>
+          </a:p>
+          <a:p>
+            <a:pPr lvl="1">
+              <a:buSzPct val="100000"/>
+            </a:pPr>
+            <a:r>
+              <a:rPr lang="de-DE" sz="2000" dirty="0" smtClean="0"/>
+              <a:t>Mindestentfernung und Mindestzeit für nächstes Positionsupdate einstellbar</a:t>
+            </a:r>
+            <a:endParaRPr lang="de-DE" sz="2000" dirty="0" smtClean="0"/>
+          </a:p>
+          <a:p>
+            <a:pPr lvl="1">
+              <a:buSzPct val="100000"/>
+            </a:pPr>
+            <a:endParaRPr lang="de-DE" sz="2000" dirty="0" smtClean="0"/>
+          </a:p>
+          <a:p>
+            <a:pPr lvl="1">
+              <a:buSzPct val="100000"/>
+            </a:pPr>
+            <a:r>
+              <a:rPr lang="de-DE" sz="2000" dirty="0" smtClean="0"/>
+              <a:t>Entscheidung wann neue Position übernommen wird anhand (Priorität absteigend):</a:t>
             </a:r>
           </a:p>
           <a:p>
@@ -4052,126 +4026,64 @@
               <a:buSzPct val="100000"/>
             </a:pPr>
             <a:r>
-              <a:rPr lang="de-DE" sz="1800" dirty="0" smtClean="0"/>
-              <a:t>Daten </a:t>
-            </a:r>
-            <a:r>
-              <a:rPr lang="de-DE" sz="1800" dirty="0" smtClean="0"/>
-              <a:t>werden als Vektor von Strings aus Datenbank </a:t>
-            </a:r>
-            <a:r>
-              <a:rPr lang="de-DE" sz="1800" dirty="0" smtClean="0"/>
-              <a:t>ausgelesen</a:t>
+              <a:rPr lang="de-DE" dirty="0" smtClean="0"/>
+              <a:t>Benutzereinstellungen,</a:t>
             </a:r>
           </a:p>
           <a:p>
             <a:pPr lvl="3">
               <a:buSzPct val="100000"/>
             </a:pPr>
-            <a:endParaRPr lang="de-DE" sz="1800" dirty="0" smtClean="0"/>
+            <a:r>
+              <a:rPr lang="de-DE" dirty="0" smtClean="0"/>
+              <a:t>Genauigkeit,</a:t>
+            </a:r>
           </a:p>
           <a:p>
             <a:pPr lvl="3">
               <a:buSzPct val="100000"/>
             </a:pPr>
             <a:r>
-              <a:rPr lang="de-DE" sz="1800" dirty="0" smtClean="0"/>
-              <a:t>Strings </a:t>
-            </a:r>
-            <a:r>
-              <a:rPr lang="de-DE" sz="1800" dirty="0" smtClean="0"/>
-              <a:t>werden mit Trennzeichen '$' </a:t>
-            </a:r>
-            <a:r>
-              <a:rPr lang="de-DE" sz="1800" dirty="0" err="1" smtClean="0"/>
-              <a:t>konkateniert</a:t>
-            </a:r>
-            <a:endParaRPr lang="de-DE" sz="1800" dirty="0" smtClean="0"/>
+              <a:rPr lang="de-DE" dirty="0" smtClean="0"/>
+              <a:t>Zeit,</a:t>
+            </a:r>
           </a:p>
           <a:p>
             <a:pPr lvl="3">
               <a:buSzPct val="100000"/>
-              <a:buNone/>
-            </a:pPr>
-            <a:r>
-              <a:rPr lang="de-DE" sz="1800" dirty="0" smtClean="0"/>
-              <a:t> </a:t>
-            </a:r>
-          </a:p>
-          <a:p>
-            <a:pPr lvl="3">
-              <a:buSzPct val="100000"/>
-            </a:pPr>
-            <a:r>
-              <a:rPr lang="de-DE" sz="1800" dirty="0" smtClean="0"/>
-              <a:t>möglich </a:t>
-            </a:r>
-            <a:r>
-              <a:rPr lang="de-DE" sz="1800" dirty="0" smtClean="0"/>
-              <a:t>da weder Hash noch Zeitstempel und Positionsdaten dieses Zeichen enthalten </a:t>
-            </a:r>
-            <a:r>
-              <a:rPr lang="de-DE" sz="2000" dirty="0" smtClean="0"/>
-              <a:t/>
-            </a:r>
-            <a:br>
-              <a:rPr lang="de-DE" sz="2000" dirty="0" smtClean="0"/>
-            </a:br>
-            <a:endParaRPr lang="de-DE" sz="2000" dirty="0" smtClean="0"/>
-          </a:p>
-          <a:p>
-            <a:pPr lvl="1">
-              <a:buSzPct val="100000"/>
-            </a:pPr>
-            <a:r>
-              <a:rPr lang="de-DE" sz="2000" dirty="0" smtClean="0"/>
-              <a:t>Empfänger</a:t>
-            </a:r>
-            <a:r>
-              <a:rPr lang="de-DE" sz="2000" dirty="0" smtClean="0"/>
-              <a:t>: </a:t>
-            </a:r>
-            <a:endParaRPr lang="de-DE" sz="2000" dirty="0" smtClean="0"/>
-          </a:p>
-          <a:p>
-            <a:pPr lvl="3">
-              <a:buSzPct val="100000"/>
-            </a:pPr>
-            <a:r>
-              <a:rPr lang="de-DE" sz="1800" dirty="0" smtClean="0"/>
-              <a:t>Payload </a:t>
-            </a:r>
-            <a:r>
-              <a:rPr lang="de-DE" sz="1800" dirty="0" smtClean="0"/>
-              <a:t>wird über Trennzeichen '$' </a:t>
-            </a:r>
-            <a:r>
-              <a:rPr lang="de-DE" sz="1800" dirty="0" smtClean="0"/>
-              <a:t>auseinandergenommen</a:t>
-            </a:r>
-          </a:p>
-          <a:p>
-            <a:pPr lvl="3">
-              <a:buSzPct val="100000"/>
-            </a:pPr>
-            <a:endParaRPr lang="de-DE" sz="1800" dirty="0" smtClean="0"/>
-          </a:p>
-          <a:p>
-            <a:pPr lvl="3">
-              <a:buSzPct val="100000"/>
-            </a:pPr>
-            <a:r>
-              <a:rPr lang="de-DE" sz="1800" dirty="0" smtClean="0"/>
-              <a:t>Erstellung </a:t>
-            </a:r>
-            <a:r>
-              <a:rPr lang="de-DE" sz="1800" dirty="0" smtClean="0"/>
-              <a:t>eines Vektors aus Strings und Übergabe an Datenbank </a:t>
-            </a:r>
-            <a:endParaRPr lang="de-DE" sz="1100" dirty="0"/>
+            </a:pPr>
+            <a:r>
+              <a:rPr lang="de-DE" dirty="0" smtClean="0"/>
+              <a:t>Art des Anbieters (GPS / Network)</a:t>
+            </a:r>
+            <a:endParaRPr lang="de-DE" dirty="0" smtClean="0"/>
           </a:p>
         </p:txBody>
       </p:sp>
+      <p:pic>
+        <p:nvPicPr>
+          <p:cNvPr id="5" name="Grafik 4" descr="midkiffaries_Ruffled_Map.png"/>
+          <p:cNvPicPr>
+            <a:picLocks noChangeAspect="1"/>
+          </p:cNvPicPr>
+          <p:nvPr/>
+        </p:nvPicPr>
+        <p:blipFill>
+          <a:blip r:embed="rId2"/>
+          <a:stretch>
+            <a:fillRect/>
+          </a:stretch>
+        </p:blipFill>
+        <p:spPr>
+          <a:xfrm>
+            <a:off x="6305550" y="2362200"/>
+            <a:ext cx="2638425" cy="2649021"/>
+          </a:xfrm>
+          <a:prstGeom prst="rect">
+            <a:avLst/>
+          </a:prstGeom>
+        </p:spPr>
+      </p:pic>
     </p:spTree>
   </p:cSld>
   <p:clrMapOvr>
@@ -4220,8 +4132,12 @@
           <a:lstStyle/>
           <a:p>
             <a:r>
-              <a:rPr lang="de-DE" dirty="0" err="1" smtClean="0"/>
+              <a:rPr lang="de-DE" dirty="0" smtClean="0"/>
               <a:t>TrackMe</a:t>
+            </a:r>
+            <a:r>
+              <a:rPr lang="de-DE" dirty="0" smtClean="0"/>
+              <a:t>: Datenspeicherung</a:t>
             </a:r>
             <a:endParaRPr lang="de-DE" dirty="0"/>
           </a:p>
@@ -4229,34 +4145,140 @@
       </p:sp>
       <p:sp>
         <p:nvSpPr>
-          <p:cNvPr id="3" name="Textfeld 2"/>
-          <p:cNvSpPr txBox="1"/>
-          <p:nvPr/>
+          <p:cNvPr id="3" name="Inhaltsplatzhalter 2"/>
+          <p:cNvSpPr>
+            <a:spLocks noGrp="1"/>
+          </p:cNvSpPr>
+          <p:nvPr>
+            <p:ph idx="1"/>
+          </p:nvPr>
         </p:nvSpPr>
         <p:spPr>
           <a:xfrm>
-            <a:off x="1838325" y="2767281"/>
-            <a:ext cx="5467350" cy="1323439"/>
+            <a:off x="431800" y="1042988"/>
+            <a:ext cx="6229350" cy="4772025"/>
+          </a:xfrm>
+        </p:spPr>
+        <p:txBody>
+          <a:bodyPr anchor="ctr"/>
+          <a:lstStyle/>
+          <a:p>
+            <a:pPr lvl="1">
+              <a:buSzPct val="100000"/>
+            </a:pPr>
+            <a:r>
+              <a:rPr lang="de-DE" sz="2000" dirty="0" smtClean="0"/>
+              <a:t>Speicherung der Positionsdaten in </a:t>
+            </a:r>
+            <a:r>
+              <a:rPr lang="de-DE" sz="2000" dirty="0" smtClean="0"/>
+              <a:t>SQLite</a:t>
+            </a:r>
+            <a:r>
+              <a:rPr lang="de-DE" sz="2000" dirty="0" smtClean="0"/>
+              <a:t> Datenbank</a:t>
+            </a:r>
+          </a:p>
+          <a:p>
+            <a:pPr lvl="3">
+              <a:buSzPct val="100000"/>
+            </a:pPr>
+            <a:r>
+              <a:rPr lang="de-DE" dirty="0" smtClean="0"/>
+              <a:t>eigene Daten und Positionsdaten anderer Nutzer</a:t>
+            </a:r>
+          </a:p>
+          <a:p>
+            <a:pPr lvl="1">
+              <a:buSzPct val="100000"/>
+            </a:pPr>
+            <a:endParaRPr lang="de-DE" sz="2000" dirty="0" smtClean="0"/>
+          </a:p>
+          <a:p>
+            <a:pPr lvl="1">
+              <a:buSzPct val="100000"/>
+            </a:pPr>
+            <a:r>
+              <a:rPr lang="de-DE" sz="2000" dirty="0" smtClean="0"/>
+              <a:t>Identifikation über Handynummer</a:t>
+            </a:r>
+          </a:p>
+          <a:p>
+            <a:pPr lvl="3">
+              <a:buSzPct val="100000"/>
+            </a:pPr>
+            <a:r>
+              <a:rPr lang="de-DE" dirty="0" smtClean="0"/>
+              <a:t>verschlüsselte Speicherung</a:t>
+            </a:r>
+          </a:p>
+          <a:p>
+            <a:pPr lvl="1">
+              <a:buSzPct val="100000"/>
+            </a:pPr>
+            <a:endParaRPr lang="de-DE" sz="2000" dirty="0" smtClean="0"/>
+          </a:p>
+          <a:p>
+            <a:pPr lvl="1">
+              <a:buSzPct val="100000"/>
+            </a:pPr>
+            <a:r>
+              <a:rPr lang="de-DE" sz="2000" dirty="0" smtClean="0"/>
+              <a:t>Nach Ablauf der (einstellbaren) TTL werden die Routendaten gelöscht und nicht mehr weiterverbreitet.</a:t>
+            </a:r>
+            <a:endParaRPr lang="de-DE" sz="2000" dirty="0" smtClean="0"/>
+          </a:p>
+          <a:p>
+            <a:pPr lvl="1">
+              <a:buSzPct val="100000"/>
+            </a:pPr>
+            <a:endParaRPr lang="de-DE" sz="2000" dirty="0" smtClean="0"/>
+          </a:p>
+          <a:p>
+            <a:pPr lvl="1">
+              <a:buSzPct val="100000"/>
+            </a:pPr>
+            <a:r>
+              <a:rPr lang="de-DE" sz="2000" dirty="0" smtClean="0"/>
+              <a:t>Unterschiedliche Profileinstellungen </a:t>
+            </a:r>
+          </a:p>
+          <a:p>
+            <a:pPr lvl="3">
+              <a:buSzPct val="100000"/>
+            </a:pPr>
+            <a:r>
+              <a:rPr lang="de-DE" dirty="0" smtClean="0"/>
+              <a:t>zwecks Übersicht und Datensicherheit</a:t>
+            </a:r>
+            <a:endParaRPr lang="de-DE" dirty="0"/>
+          </a:p>
+        </p:txBody>
+      </p:sp>
+      <p:pic>
+        <p:nvPicPr>
+          <p:cNvPr id="7" name="Grafik 6" descr="db.png"/>
+          <p:cNvPicPr>
+            <a:picLocks noChangeAspect="1"/>
+          </p:cNvPicPr>
+          <p:nvPr/>
+        </p:nvPicPr>
+        <p:blipFill>
+          <a:blip r:embed="rId2"/>
+          <a:stretch>
+            <a:fillRect/>
+          </a:stretch>
+        </p:blipFill>
+        <p:spPr>
+          <a:xfrm>
+            <a:off x="6127750" y="2628900"/>
+            <a:ext cx="2832100" cy="3125546"/>
           </a:xfrm>
           <a:prstGeom prst="rect">
             <a:avLst/>
           </a:prstGeom>
-          <a:noFill/>
         </p:spPr>
-        <p:txBody>
-          <a:bodyPr wrap="square" rtlCol="0">
-            <a:spAutoFit/>
-          </a:bodyPr>
-          <a:lstStyle/>
-          <a:p>
-            <a:r>
-              <a:rPr lang="de-DE" sz="8000" dirty="0" smtClean="0"/>
-              <a:t>LIVEDEMO</a:t>
-            </a:r>
-            <a:endParaRPr lang="de-DE" dirty="0"/>
-          </a:p>
-        </p:txBody>
-      </p:sp>
+      </p:pic>
     </p:spTree>
   </p:cSld>
   <p:clrMapOvr>

</xml_diff>

<commit_message>
Finished DATABASE and LOCATION Part of presentation
</commit_message>
<xml_diff>
--- a/doc/Android-Lab-TrackMe-Abschlusspraes.pptx
+++ b/doc/Android-Lab-TrackMe-Abschlusspraes.pptx
@@ -4027,7 +4027,7 @@
             </a:pPr>
             <a:r>
               <a:rPr lang="de-DE" dirty="0" smtClean="0"/>
-              <a:t>Benutzereinstellungen,</a:t>
+              <a:t>Benutzereinstellungen (Zeit),</a:t>
             </a:r>
           </a:p>
           <a:p>
@@ -4036,8 +4036,18 @@
             </a:pPr>
             <a:r>
               <a:rPr lang="de-DE" dirty="0" smtClean="0"/>
+              <a:t>Zeit,</a:t>
+            </a:r>
+          </a:p>
+          <a:p>
+            <a:pPr lvl="3">
+              <a:buSzPct val="100000"/>
+            </a:pPr>
+            <a:r>
+              <a:rPr lang="de-DE" smtClean="0"/>
               <a:t>Genauigkeit,</a:t>
             </a:r>
+            <a:endParaRPr lang="de-DE" dirty="0" smtClean="0"/>
           </a:p>
           <a:p>
             <a:pPr lvl="3">
@@ -4045,16 +4055,7 @@
             </a:pPr>
             <a:r>
               <a:rPr lang="de-DE" dirty="0" smtClean="0"/>
-              <a:t>Zeit,</a:t>
-            </a:r>
-          </a:p>
-          <a:p>
-            <a:pPr lvl="3">
-              <a:buSzPct val="100000"/>
-            </a:pPr>
-            <a:r>
-              <a:rPr lang="de-DE" dirty="0" smtClean="0"/>
-              <a:t>Art des Anbieters (GPS / Network)</a:t>
+              <a:t>Art der Positionsbestimmung (GPS / Network)</a:t>
             </a:r>
             <a:endParaRPr lang="de-DE" dirty="0" smtClean="0"/>
           </a:p>
@@ -4227,31 +4228,6 @@
               <a:t>Nach Ablauf der (einstellbaren) TTL werden die Routendaten gelöscht und nicht mehr weiterverbreitet.</a:t>
             </a:r>
             <a:endParaRPr lang="de-DE" sz="2000" dirty="0" smtClean="0"/>
-          </a:p>
-          <a:p>
-            <a:pPr lvl="1">
-              <a:buSzPct val="100000"/>
-            </a:pPr>
-            <a:endParaRPr lang="de-DE" sz="2000" dirty="0" smtClean="0"/>
-          </a:p>
-          <a:p>
-            <a:pPr lvl="1">
-              <a:buSzPct val="100000"/>
-            </a:pPr>
-            <a:r>
-              <a:rPr lang="de-DE" sz="2000" dirty="0" smtClean="0"/>
-              <a:t>Unterschiedliche Profileinstellungen </a:t>
-            </a:r>
-          </a:p>
-          <a:p>
-            <a:pPr lvl="3">
-              <a:buSzPct val="100000"/>
-            </a:pPr>
-            <a:r>
-              <a:rPr lang="de-DE" dirty="0" smtClean="0"/>
-              <a:t>zwecks Übersicht und Datensicherheit</a:t>
-            </a:r>
-            <a:endParaRPr lang="de-DE" dirty="0"/>
           </a:p>
         </p:txBody>
       </p:sp>

</xml_diff>

<commit_message>
- Update Präsentation - Sequenzdiagramm DTN Kommunikation
Signed-off-by: butzemannbiber <itf-freak@gmx.de>
</commit_message>
<xml_diff>
--- a/doc/Android-Lab-TrackMe-Abschlusspraes.pptx
+++ b/doc/Android-Lab-TrackMe-Abschlusspraes.pptx
@@ -5,7 +5,7 @@
     <p:sldMasterId id="2147483648" r:id="rId1"/>
   </p:sldMasterIdLst>
   <p:notesMasterIdLst>
-    <p:notesMasterId r:id="rId12"/>
+    <p:notesMasterId r:id="rId17"/>
   </p:notesMasterIdLst>
   <p:sldIdLst>
     <p:sldId id="256" r:id="rId2"/>
@@ -15,9 +15,14 @@
     <p:sldId id="264" r:id="rId6"/>
     <p:sldId id="265" r:id="rId7"/>
     <p:sldId id="266" r:id="rId8"/>
-    <p:sldId id="262" r:id="rId9"/>
-    <p:sldId id="267" r:id="rId10"/>
-    <p:sldId id="261" r:id="rId11"/>
+    <p:sldId id="268" r:id="rId9"/>
+    <p:sldId id="269" r:id="rId10"/>
+    <p:sldId id="270" r:id="rId11"/>
+    <p:sldId id="271" r:id="rId12"/>
+    <p:sldId id="272" r:id="rId13"/>
+    <p:sldId id="262" r:id="rId14"/>
+    <p:sldId id="267" r:id="rId15"/>
+    <p:sldId id="261" r:id="rId16"/>
   </p:sldIdLst>
   <p:sldSz cx="9144000" cy="6858000" type="screen4x3"/>
   <p:notesSz cx="7099300" cy="10234613"/>
@@ -446,13 +451,18 @@
             <a:fld id="{E4AA6088-1FF0-4E53-845C-EFEDD1C948F8}" type="slidenum">
               <a:rPr lang="de-DE"/>
               <a:pPr/>
-              <a:t>‹Nr.›</a:t>
+              <a:t>‹#›</a:t>
             </a:fld>
             <a:endParaRPr lang="de-DE" dirty="0"/>
           </a:p>
         </p:txBody>
       </p:sp>
     </p:spTree>
+    <p:extLst>
+      <p:ext uri="{BB962C8B-B14F-4D97-AF65-F5344CB8AC3E}">
+        <p14:creationId xmlns:p14="http://schemas.microsoft.com/office/powerpoint/2010/main" val="3706856128"/>
+      </p:ext>
+    </p:extLst>
   </p:cSld>
   <p:clrMap bg1="lt1" tx1="dk1" bg2="lt2" tx2="dk2" accent1="accent1" accent2="accent2" accent3="accent3" accent4="accent4" accent5="accent5" accent6="accent6" hlink="hlink" folHlink="folHlink"/>
   <p:notesStyle>
@@ -1860,7 +1870,7 @@
                 <a:tabLst/>
                 <a:defRPr/>
               </a:pPr>
-              <a:t>‹Nr.›</a:t>
+              <a:t>‹#›</a:t>
             </a:fld>
             <a:endParaRPr lang="de-DE" sz="1000" dirty="0" smtClean="0"/>
           </a:p>
@@ -2326,11 +2336,7 @@
           <a:p>
             <a:r>
               <a:rPr lang="de-DE" dirty="0" smtClean="0"/>
-              <a:t>Catgroup</a:t>
-            </a:r>
-            <a:r>
-              <a:rPr lang="de-DE" dirty="0" smtClean="0"/>
-              <a:t>, 24.07.2012</a:t>
+              <a:t>Catgroup, 24.07.2012</a:t>
             </a:r>
             <a:endParaRPr lang="de-DE" dirty="0"/>
           </a:p>
@@ -2353,11 +2359,7 @@
           <a:p>
             <a:r>
               <a:rPr lang="de-DE" dirty="0" smtClean="0"/>
-              <a:t>Android-Lab: </a:t>
-            </a:r>
-            <a:r>
-              <a:rPr lang="de-DE" dirty="0" smtClean="0"/>
-              <a:t>TrackMe</a:t>
+              <a:t>Android-Lab: TrackMe</a:t>
             </a:r>
             <a:endParaRPr lang="de-DE" dirty="0"/>
           </a:p>
@@ -2379,6 +2381,772 @@
 </file>
 
 <file path=ppt/slides/slide10.xml><?xml version="1.0" encoding="utf-8"?>
+<p:sld xmlns:a="http://schemas.openxmlformats.org/drawingml/2006/main" xmlns:r="http://schemas.openxmlformats.org/officeDocument/2006/relationships" xmlns:p="http://schemas.openxmlformats.org/presentationml/2006/main">
+  <p:cSld>
+    <p:spTree>
+      <p:nvGrpSpPr>
+        <p:cNvPr id="1" name=""/>
+        <p:cNvGrpSpPr/>
+        <p:nvPr/>
+      </p:nvGrpSpPr>
+      <p:grpSpPr>
+        <a:xfrm>
+          <a:off x="0" y="0"/>
+          <a:ext cx="0" cy="0"/>
+          <a:chOff x="0" y="0"/>
+          <a:chExt cx="0" cy="0"/>
+        </a:xfrm>
+      </p:grpSpPr>
+      <p:sp>
+        <p:nvSpPr>
+          <p:cNvPr id="2" name="Title 1"/>
+          <p:cNvSpPr>
+            <a:spLocks noGrp="1"/>
+          </p:cNvSpPr>
+          <p:nvPr>
+            <p:ph type="title"/>
+          </p:nvPr>
+        </p:nvSpPr>
+        <p:spPr/>
+        <p:txBody>
+          <a:bodyPr/>
+          <a:lstStyle/>
+          <a:p>
+            <a:r>
+              <a:rPr lang="de-DE" dirty="0" smtClean="0"/>
+              <a:t>Sequenzdiagramm Datenaustausch</a:t>
+            </a:r>
+            <a:endParaRPr lang="de-DE" dirty="0"/>
+          </a:p>
+        </p:txBody>
+      </p:sp>
+      <p:pic>
+        <p:nvPicPr>
+          <p:cNvPr id="1026" name="Picture 2"/>
+          <p:cNvPicPr>
+            <a:picLocks noChangeAspect="1" noChangeArrowheads="1"/>
+          </p:cNvPicPr>
+          <p:nvPr/>
+        </p:nvPicPr>
+        <p:blipFill>
+          <a:blip r:embed="rId2" cstate="print">
+            <a:extLst>
+              <a:ext uri="{28A0092B-C50C-407E-A947-70E740481C1C}">
+                <a14:useLocalDpi xmlns:a14="http://schemas.microsoft.com/office/drawing/2010/main" val="0"/>
+              </a:ext>
+            </a:extLst>
+          </a:blip>
+          <a:stretch>
+            <a:fillRect/>
+          </a:stretch>
+        </p:blipFill>
+        <p:spPr bwMode="auto">
+          <a:xfrm>
+            <a:off x="506045" y="905475"/>
+            <a:ext cx="8100900" cy="4998734"/>
+          </a:xfrm>
+          <a:prstGeom prst="rect">
+            <a:avLst/>
+          </a:prstGeom>
+          <a:noFill/>
+          <a:extLst>
+            <a:ext uri="{909E8E84-426E-40DD-AFC4-6F175D3DCCD1}">
+              <a14:hiddenFill xmlns:a14="http://schemas.microsoft.com/office/drawing/2010/main">
+                <a:solidFill>
+                  <a:srgbClr val="FFFFFF"/>
+                </a:solidFill>
+              </a14:hiddenFill>
+            </a:ext>
+          </a:extLst>
+        </p:spPr>
+      </p:pic>
+      <p:sp>
+        <p:nvSpPr>
+          <p:cNvPr id="4" name="Rectangle 3"/>
+          <p:cNvSpPr/>
+          <p:nvPr/>
+        </p:nvSpPr>
+        <p:spPr>
+          <a:xfrm>
+            <a:off x="161510" y="3699030"/>
+            <a:ext cx="8640960" cy="2205245"/>
+          </a:xfrm>
+          <a:prstGeom prst="rect">
+            <a:avLst/>
+          </a:prstGeom>
+          <a:solidFill>
+            <a:schemeClr val="bg1"/>
+          </a:solidFill>
+          <a:ln w="19050">
+            <a:solidFill>
+              <a:schemeClr val="bg1"/>
+            </a:solidFill>
+          </a:ln>
+        </p:spPr>
+        <p:style>
+          <a:lnRef idx="2">
+            <a:schemeClr val="accent5">
+              <a:shade val="50000"/>
+            </a:schemeClr>
+          </a:lnRef>
+          <a:fillRef idx="1">
+            <a:schemeClr val="accent5"/>
+          </a:fillRef>
+          <a:effectRef idx="0">
+            <a:schemeClr val="accent5"/>
+          </a:effectRef>
+          <a:fontRef idx="minor">
+            <a:schemeClr val="lt1"/>
+          </a:fontRef>
+        </p:style>
+        <p:txBody>
+          <a:bodyPr rtlCol="0" anchor="ctr"/>
+          <a:lstStyle/>
+          <a:p>
+            <a:pPr algn="ctr"/>
+            <a:endParaRPr lang="de-DE" dirty="0" smtClean="0"/>
+          </a:p>
+        </p:txBody>
+      </p:sp>
+    </p:spTree>
+    <p:extLst>
+      <p:ext uri="{BB962C8B-B14F-4D97-AF65-F5344CB8AC3E}">
+        <p14:creationId xmlns:p14="http://schemas.microsoft.com/office/powerpoint/2010/main" val="1618051733"/>
+      </p:ext>
+    </p:extLst>
+  </p:cSld>
+  <p:clrMapOvr>
+    <a:masterClrMapping/>
+  </p:clrMapOvr>
+  <mc:AlternateContent xmlns:mc="http://schemas.openxmlformats.org/markup-compatibility/2006">
+    <mc:Choice xmlns:p14="http://schemas.microsoft.com/office/powerpoint/2010/main" Requires="p14">
+      <p:transition spd="med" p14:dur="700">
+        <p:fade/>
+      </p:transition>
+    </mc:Choice>
+    <mc:Fallback>
+      <p:transition spd="med">
+        <p:fade/>
+      </p:transition>
+    </mc:Fallback>
+  </mc:AlternateContent>
+  <p:timing>
+    <p:tnLst>
+      <p:par>
+        <p:cTn id="1" dur="indefinite" restart="never" nodeType="tmRoot"/>
+      </p:par>
+    </p:tnLst>
+  </p:timing>
+</p:sld>
+</file>
+
+<file path=ppt/slides/slide11.xml><?xml version="1.0" encoding="utf-8"?>
+<p:sld xmlns:a="http://schemas.openxmlformats.org/drawingml/2006/main" xmlns:r="http://schemas.openxmlformats.org/officeDocument/2006/relationships" xmlns:p="http://schemas.openxmlformats.org/presentationml/2006/main">
+  <p:cSld>
+    <p:spTree>
+      <p:nvGrpSpPr>
+        <p:cNvPr id="1" name=""/>
+        <p:cNvGrpSpPr/>
+        <p:nvPr/>
+      </p:nvGrpSpPr>
+      <p:grpSpPr>
+        <a:xfrm>
+          <a:off x="0" y="0"/>
+          <a:ext cx="0" cy="0"/>
+          <a:chOff x="0" y="0"/>
+          <a:chExt cx="0" cy="0"/>
+        </a:xfrm>
+      </p:grpSpPr>
+      <p:sp>
+        <p:nvSpPr>
+          <p:cNvPr id="2" name="Title 1"/>
+          <p:cNvSpPr>
+            <a:spLocks noGrp="1"/>
+          </p:cNvSpPr>
+          <p:nvPr>
+            <p:ph type="title"/>
+          </p:nvPr>
+        </p:nvSpPr>
+        <p:spPr/>
+        <p:txBody>
+          <a:bodyPr/>
+          <a:lstStyle/>
+          <a:p>
+            <a:r>
+              <a:rPr lang="de-DE" dirty="0" smtClean="0"/>
+              <a:t>Sequenzdiagramm Datenaustausch</a:t>
+            </a:r>
+            <a:endParaRPr lang="de-DE" dirty="0"/>
+          </a:p>
+        </p:txBody>
+      </p:sp>
+      <p:pic>
+        <p:nvPicPr>
+          <p:cNvPr id="1026" name="Picture 2"/>
+          <p:cNvPicPr>
+            <a:picLocks noChangeAspect="1" noChangeArrowheads="1"/>
+          </p:cNvPicPr>
+          <p:nvPr/>
+        </p:nvPicPr>
+        <p:blipFill>
+          <a:blip r:embed="rId2" cstate="print">
+            <a:extLst>
+              <a:ext uri="{28A0092B-C50C-407E-A947-70E740481C1C}">
+                <a14:useLocalDpi xmlns:a14="http://schemas.microsoft.com/office/drawing/2010/main" val="0"/>
+              </a:ext>
+            </a:extLst>
+          </a:blip>
+          <a:stretch>
+            <a:fillRect/>
+          </a:stretch>
+        </p:blipFill>
+        <p:spPr bwMode="auto">
+          <a:xfrm>
+            <a:off x="506045" y="905475"/>
+            <a:ext cx="8100900" cy="4998734"/>
+          </a:xfrm>
+          <a:prstGeom prst="rect">
+            <a:avLst/>
+          </a:prstGeom>
+          <a:noFill/>
+          <a:extLst>
+            <a:ext uri="{909E8E84-426E-40DD-AFC4-6F175D3DCCD1}">
+              <a14:hiddenFill xmlns:a14="http://schemas.microsoft.com/office/drawing/2010/main">
+                <a:solidFill>
+                  <a:srgbClr val="FFFFFF"/>
+                </a:solidFill>
+              </a14:hiddenFill>
+            </a:ext>
+          </a:extLst>
+        </p:spPr>
+      </p:pic>
+      <p:sp>
+        <p:nvSpPr>
+          <p:cNvPr id="4" name="Rectangle 3"/>
+          <p:cNvSpPr/>
+          <p:nvPr/>
+        </p:nvSpPr>
+        <p:spPr>
+          <a:xfrm>
+            <a:off x="161510" y="4554125"/>
+            <a:ext cx="8640960" cy="1350150"/>
+          </a:xfrm>
+          <a:prstGeom prst="rect">
+            <a:avLst/>
+          </a:prstGeom>
+          <a:solidFill>
+            <a:schemeClr val="bg1"/>
+          </a:solidFill>
+          <a:ln w="19050">
+            <a:solidFill>
+              <a:schemeClr val="bg1"/>
+            </a:solidFill>
+          </a:ln>
+        </p:spPr>
+        <p:style>
+          <a:lnRef idx="2">
+            <a:schemeClr val="accent5">
+              <a:shade val="50000"/>
+            </a:schemeClr>
+          </a:lnRef>
+          <a:fillRef idx="1">
+            <a:schemeClr val="accent5"/>
+          </a:fillRef>
+          <a:effectRef idx="0">
+            <a:schemeClr val="accent5"/>
+          </a:effectRef>
+          <a:fontRef idx="minor">
+            <a:schemeClr val="lt1"/>
+          </a:fontRef>
+        </p:style>
+        <p:txBody>
+          <a:bodyPr rtlCol="0" anchor="ctr"/>
+          <a:lstStyle/>
+          <a:p>
+            <a:pPr algn="ctr"/>
+            <a:endParaRPr lang="de-DE" dirty="0" smtClean="0"/>
+          </a:p>
+        </p:txBody>
+      </p:sp>
+    </p:spTree>
+    <p:extLst>
+      <p:ext uri="{BB962C8B-B14F-4D97-AF65-F5344CB8AC3E}">
+        <p14:creationId xmlns:p14="http://schemas.microsoft.com/office/powerpoint/2010/main" val="1618051733"/>
+      </p:ext>
+    </p:extLst>
+  </p:cSld>
+  <p:clrMapOvr>
+    <a:masterClrMapping/>
+  </p:clrMapOvr>
+  <mc:AlternateContent xmlns:mc="http://schemas.openxmlformats.org/markup-compatibility/2006">
+    <mc:Choice xmlns:p14="http://schemas.microsoft.com/office/powerpoint/2010/main" Requires="p14">
+      <p:transition spd="med" p14:dur="700">
+        <p:fade/>
+      </p:transition>
+    </mc:Choice>
+    <mc:Fallback>
+      <p:transition spd="med">
+        <p:fade/>
+      </p:transition>
+    </mc:Fallback>
+  </mc:AlternateContent>
+  <p:timing>
+    <p:tnLst>
+      <p:par>
+        <p:cTn id="1" dur="indefinite" restart="never" nodeType="tmRoot"/>
+      </p:par>
+    </p:tnLst>
+  </p:timing>
+</p:sld>
+</file>
+
+<file path=ppt/slides/slide12.xml><?xml version="1.0" encoding="utf-8"?>
+<p:sld xmlns:a="http://schemas.openxmlformats.org/drawingml/2006/main" xmlns:r="http://schemas.openxmlformats.org/officeDocument/2006/relationships" xmlns:p="http://schemas.openxmlformats.org/presentationml/2006/main">
+  <p:cSld>
+    <p:spTree>
+      <p:nvGrpSpPr>
+        <p:cNvPr id="1" name=""/>
+        <p:cNvGrpSpPr/>
+        <p:nvPr/>
+      </p:nvGrpSpPr>
+      <p:grpSpPr>
+        <a:xfrm>
+          <a:off x="0" y="0"/>
+          <a:ext cx="0" cy="0"/>
+          <a:chOff x="0" y="0"/>
+          <a:chExt cx="0" cy="0"/>
+        </a:xfrm>
+      </p:grpSpPr>
+      <p:sp>
+        <p:nvSpPr>
+          <p:cNvPr id="2" name="Title 1"/>
+          <p:cNvSpPr>
+            <a:spLocks noGrp="1"/>
+          </p:cNvSpPr>
+          <p:nvPr>
+            <p:ph type="title"/>
+          </p:nvPr>
+        </p:nvSpPr>
+        <p:spPr/>
+        <p:txBody>
+          <a:bodyPr/>
+          <a:lstStyle/>
+          <a:p>
+            <a:r>
+              <a:rPr lang="de-DE" dirty="0" smtClean="0"/>
+              <a:t>Sequenzdiagramm Datenaustausch</a:t>
+            </a:r>
+            <a:endParaRPr lang="de-DE" dirty="0"/>
+          </a:p>
+        </p:txBody>
+      </p:sp>
+      <p:pic>
+        <p:nvPicPr>
+          <p:cNvPr id="1026" name="Picture 2"/>
+          <p:cNvPicPr>
+            <a:picLocks noChangeAspect="1" noChangeArrowheads="1"/>
+          </p:cNvPicPr>
+          <p:nvPr/>
+        </p:nvPicPr>
+        <p:blipFill>
+          <a:blip r:embed="rId2" cstate="print">
+            <a:extLst>
+              <a:ext uri="{28A0092B-C50C-407E-A947-70E740481C1C}">
+                <a14:useLocalDpi xmlns:a14="http://schemas.microsoft.com/office/drawing/2010/main" val="0"/>
+              </a:ext>
+            </a:extLst>
+          </a:blip>
+          <a:stretch>
+            <a:fillRect/>
+          </a:stretch>
+        </p:blipFill>
+        <p:spPr bwMode="auto">
+          <a:xfrm>
+            <a:off x="506045" y="905475"/>
+            <a:ext cx="8100900" cy="4998734"/>
+          </a:xfrm>
+          <a:prstGeom prst="rect">
+            <a:avLst/>
+          </a:prstGeom>
+          <a:noFill/>
+          <a:extLst>
+            <a:ext uri="{909E8E84-426E-40DD-AFC4-6F175D3DCCD1}">
+              <a14:hiddenFill xmlns:a14="http://schemas.microsoft.com/office/drawing/2010/main">
+                <a:solidFill>
+                  <a:srgbClr val="FFFFFF"/>
+                </a:solidFill>
+              </a14:hiddenFill>
+            </a:ext>
+          </a:extLst>
+        </p:spPr>
+      </p:pic>
+    </p:spTree>
+    <p:extLst>
+      <p:ext uri="{BB962C8B-B14F-4D97-AF65-F5344CB8AC3E}">
+        <p14:creationId xmlns:p14="http://schemas.microsoft.com/office/powerpoint/2010/main" val="1618051733"/>
+      </p:ext>
+    </p:extLst>
+  </p:cSld>
+  <p:clrMapOvr>
+    <a:masterClrMapping/>
+  </p:clrMapOvr>
+  <mc:AlternateContent xmlns:mc="http://schemas.openxmlformats.org/markup-compatibility/2006">
+    <mc:Choice xmlns:p14="http://schemas.microsoft.com/office/powerpoint/2010/main" Requires="p14">
+      <p:transition spd="med" p14:dur="700">
+        <p:fade/>
+      </p:transition>
+    </mc:Choice>
+    <mc:Fallback>
+      <p:transition spd="med">
+        <p:fade/>
+      </p:transition>
+    </mc:Fallback>
+  </mc:AlternateContent>
+  <p:timing>
+    <p:tnLst>
+      <p:par>
+        <p:cTn id="1" dur="indefinite" restart="never" nodeType="tmRoot"/>
+      </p:par>
+    </p:tnLst>
+  </p:timing>
+</p:sld>
+</file>
+
+<file path=ppt/slides/slide13.xml><?xml version="1.0" encoding="utf-8"?>
+<p:sld xmlns:a="http://schemas.openxmlformats.org/drawingml/2006/main" xmlns:r="http://schemas.openxmlformats.org/officeDocument/2006/relationships" xmlns:p="http://schemas.openxmlformats.org/presentationml/2006/main">
+  <p:cSld>
+    <p:spTree>
+      <p:nvGrpSpPr>
+        <p:cNvPr id="1" name=""/>
+        <p:cNvGrpSpPr/>
+        <p:nvPr/>
+      </p:nvGrpSpPr>
+      <p:grpSpPr>
+        <a:xfrm>
+          <a:off x="0" y="0"/>
+          <a:ext cx="0" cy="0"/>
+          <a:chOff x="0" y="0"/>
+          <a:chExt cx="0" cy="0"/>
+        </a:xfrm>
+      </p:grpSpPr>
+      <p:sp>
+        <p:nvSpPr>
+          <p:cNvPr id="2" name="Titel 1"/>
+          <p:cNvSpPr>
+            <a:spLocks noGrp="1"/>
+          </p:cNvSpPr>
+          <p:nvPr>
+            <p:ph type="title"/>
+          </p:nvPr>
+        </p:nvSpPr>
+        <p:spPr/>
+        <p:txBody>
+          <a:bodyPr/>
+          <a:lstStyle/>
+          <a:p>
+            <a:r>
+              <a:rPr lang="de-DE" dirty="0" smtClean="0"/>
+              <a:t>TrackMe: Positionsbestimmung</a:t>
+            </a:r>
+            <a:endParaRPr lang="de-DE" dirty="0"/>
+          </a:p>
+        </p:txBody>
+      </p:sp>
+      <p:sp>
+        <p:nvSpPr>
+          <p:cNvPr id="3" name="Inhaltsplatzhalter 2"/>
+          <p:cNvSpPr>
+            <a:spLocks noGrp="1"/>
+          </p:cNvSpPr>
+          <p:nvPr>
+            <p:ph idx="1"/>
+          </p:nvPr>
+        </p:nvSpPr>
+        <p:spPr>
+          <a:xfrm>
+            <a:off x="431800" y="1042988"/>
+            <a:ext cx="5918200" cy="4772025"/>
+          </a:xfrm>
+        </p:spPr>
+        <p:txBody>
+          <a:bodyPr anchor="ctr"/>
+          <a:lstStyle/>
+          <a:p>
+            <a:pPr lvl="1">
+              <a:buSzPct val="100000"/>
+            </a:pPr>
+            <a:r>
+              <a:rPr lang="de-DE" sz="2000" dirty="0" smtClean="0"/>
+              <a:t>Positionsbestimmung über GPS-Empfänger und erreichbare Funknetze</a:t>
+            </a:r>
+            <a:endParaRPr lang="de-DE" dirty="0" smtClean="0"/>
+          </a:p>
+          <a:p>
+            <a:pPr lvl="1">
+              <a:buSzPct val="100000"/>
+            </a:pPr>
+            <a:endParaRPr lang="de-DE" sz="2000" dirty="0" smtClean="0"/>
+          </a:p>
+          <a:p>
+            <a:pPr lvl="1">
+              <a:buSzPct val="100000"/>
+            </a:pPr>
+            <a:r>
+              <a:rPr lang="de-DE" sz="2000" dirty="0" smtClean="0"/>
+              <a:t>Mindestentfernung und Mindestzeit für nächstes Positionsupdate einstellbar</a:t>
+            </a:r>
+          </a:p>
+          <a:p>
+            <a:pPr lvl="1">
+              <a:buSzPct val="100000"/>
+            </a:pPr>
+            <a:endParaRPr lang="de-DE" sz="2000" dirty="0" smtClean="0"/>
+          </a:p>
+          <a:p>
+            <a:pPr lvl="1">
+              <a:buSzPct val="100000"/>
+            </a:pPr>
+            <a:r>
+              <a:rPr lang="de-DE" sz="2000" dirty="0" smtClean="0"/>
+              <a:t>Entscheidung wann neue Position übernommen wird anhand (Priorität absteigend):</a:t>
+            </a:r>
+          </a:p>
+          <a:p>
+            <a:pPr lvl="3">
+              <a:buSzPct val="100000"/>
+            </a:pPr>
+            <a:r>
+              <a:rPr lang="de-DE" dirty="0" smtClean="0"/>
+              <a:t>Benutzereinstellungen (Zeit),</a:t>
+            </a:r>
+          </a:p>
+          <a:p>
+            <a:pPr lvl="3">
+              <a:buSzPct val="100000"/>
+            </a:pPr>
+            <a:r>
+              <a:rPr lang="de-DE" dirty="0" smtClean="0"/>
+              <a:t>Zeit,</a:t>
+            </a:r>
+          </a:p>
+          <a:p>
+            <a:pPr lvl="3">
+              <a:buSzPct val="100000"/>
+            </a:pPr>
+            <a:r>
+              <a:rPr lang="de-DE" smtClean="0"/>
+              <a:t>Genauigkeit,</a:t>
+            </a:r>
+            <a:endParaRPr lang="de-DE" dirty="0" smtClean="0"/>
+          </a:p>
+          <a:p>
+            <a:pPr lvl="3">
+              <a:buSzPct val="100000"/>
+            </a:pPr>
+            <a:r>
+              <a:rPr lang="de-DE" dirty="0" smtClean="0"/>
+              <a:t>Art der Positionsbestimmung (GPS / Network)</a:t>
+            </a:r>
+          </a:p>
+        </p:txBody>
+      </p:sp>
+      <p:pic>
+        <p:nvPicPr>
+          <p:cNvPr id="5" name="Grafik 4" descr="midkiffaries_Ruffled_Map.png"/>
+          <p:cNvPicPr>
+            <a:picLocks noChangeAspect="1"/>
+          </p:cNvPicPr>
+          <p:nvPr/>
+        </p:nvPicPr>
+        <p:blipFill>
+          <a:blip r:embed="rId2"/>
+          <a:stretch>
+            <a:fillRect/>
+          </a:stretch>
+        </p:blipFill>
+        <p:spPr>
+          <a:xfrm>
+            <a:off x="6305550" y="2362200"/>
+            <a:ext cx="2638425" cy="2649021"/>
+          </a:xfrm>
+          <a:prstGeom prst="rect">
+            <a:avLst/>
+          </a:prstGeom>
+        </p:spPr>
+      </p:pic>
+    </p:spTree>
+  </p:cSld>
+  <p:clrMapOvr>
+    <a:masterClrMapping/>
+  </p:clrMapOvr>
+  <p:timing>
+    <p:tnLst>
+      <p:par>
+        <p:cTn id="1" dur="indefinite" restart="never" nodeType="tmRoot"/>
+      </p:par>
+    </p:tnLst>
+  </p:timing>
+</p:sld>
+</file>
+
+<file path=ppt/slides/slide14.xml><?xml version="1.0" encoding="utf-8"?>
+<p:sld xmlns:a="http://schemas.openxmlformats.org/drawingml/2006/main" xmlns:r="http://schemas.openxmlformats.org/officeDocument/2006/relationships" xmlns:p="http://schemas.openxmlformats.org/presentationml/2006/main">
+  <p:cSld>
+    <p:spTree>
+      <p:nvGrpSpPr>
+        <p:cNvPr id="1" name=""/>
+        <p:cNvGrpSpPr/>
+        <p:nvPr/>
+      </p:nvGrpSpPr>
+      <p:grpSpPr>
+        <a:xfrm>
+          <a:off x="0" y="0"/>
+          <a:ext cx="0" cy="0"/>
+          <a:chOff x="0" y="0"/>
+          <a:chExt cx="0" cy="0"/>
+        </a:xfrm>
+      </p:grpSpPr>
+      <p:sp>
+        <p:nvSpPr>
+          <p:cNvPr id="2" name="Titel 1"/>
+          <p:cNvSpPr>
+            <a:spLocks noGrp="1"/>
+          </p:cNvSpPr>
+          <p:nvPr>
+            <p:ph type="title"/>
+          </p:nvPr>
+        </p:nvSpPr>
+        <p:spPr/>
+        <p:txBody>
+          <a:bodyPr/>
+          <a:lstStyle/>
+          <a:p>
+            <a:r>
+              <a:rPr lang="de-DE" dirty="0" smtClean="0"/>
+              <a:t>TrackMe: Datenspeicherung</a:t>
+            </a:r>
+            <a:endParaRPr lang="de-DE" dirty="0"/>
+          </a:p>
+        </p:txBody>
+      </p:sp>
+      <p:sp>
+        <p:nvSpPr>
+          <p:cNvPr id="3" name="Inhaltsplatzhalter 2"/>
+          <p:cNvSpPr>
+            <a:spLocks noGrp="1"/>
+          </p:cNvSpPr>
+          <p:nvPr>
+            <p:ph idx="1"/>
+          </p:nvPr>
+        </p:nvSpPr>
+        <p:spPr>
+          <a:xfrm>
+            <a:off x="431800" y="1042988"/>
+            <a:ext cx="6229350" cy="4772025"/>
+          </a:xfrm>
+        </p:spPr>
+        <p:txBody>
+          <a:bodyPr anchor="ctr"/>
+          <a:lstStyle/>
+          <a:p>
+            <a:pPr lvl="1">
+              <a:buSzPct val="100000"/>
+            </a:pPr>
+            <a:r>
+              <a:rPr lang="de-DE" sz="2000" dirty="0" smtClean="0"/>
+              <a:t>Speicherung der Positionsdaten in SQLite Datenbank</a:t>
+            </a:r>
+          </a:p>
+          <a:p>
+            <a:pPr lvl="3">
+              <a:buSzPct val="100000"/>
+            </a:pPr>
+            <a:r>
+              <a:rPr lang="de-DE" dirty="0" smtClean="0"/>
+              <a:t>eigene Daten und Positionsdaten anderer Nutzer</a:t>
+            </a:r>
+          </a:p>
+          <a:p>
+            <a:pPr lvl="1">
+              <a:buSzPct val="100000"/>
+            </a:pPr>
+            <a:endParaRPr lang="de-DE" sz="2000" dirty="0" smtClean="0"/>
+          </a:p>
+          <a:p>
+            <a:pPr lvl="1">
+              <a:buSzPct val="100000"/>
+            </a:pPr>
+            <a:r>
+              <a:rPr lang="de-DE" sz="2000" dirty="0" smtClean="0"/>
+              <a:t>Identifikation über Handynummer</a:t>
+            </a:r>
+          </a:p>
+          <a:p>
+            <a:pPr lvl="3">
+              <a:buSzPct val="100000"/>
+            </a:pPr>
+            <a:r>
+              <a:rPr lang="de-DE" dirty="0" smtClean="0"/>
+              <a:t>verschlüsselte Speicherung</a:t>
+            </a:r>
+          </a:p>
+          <a:p>
+            <a:pPr lvl="1">
+              <a:buSzPct val="100000"/>
+            </a:pPr>
+            <a:endParaRPr lang="de-DE" sz="2000" dirty="0" smtClean="0"/>
+          </a:p>
+          <a:p>
+            <a:pPr lvl="1">
+              <a:buSzPct val="100000"/>
+            </a:pPr>
+            <a:r>
+              <a:rPr lang="de-DE" sz="2000" dirty="0" smtClean="0"/>
+              <a:t>Nach Ablauf der (einstellbaren) TTL werden die Routendaten gelöscht und nicht mehr weiterverbreitet.</a:t>
+            </a:r>
+          </a:p>
+        </p:txBody>
+      </p:sp>
+      <p:pic>
+        <p:nvPicPr>
+          <p:cNvPr id="7" name="Grafik 6" descr="db.png"/>
+          <p:cNvPicPr>
+            <a:picLocks noChangeAspect="1"/>
+          </p:cNvPicPr>
+          <p:nvPr/>
+        </p:nvPicPr>
+        <p:blipFill>
+          <a:blip r:embed="rId2"/>
+          <a:stretch>
+            <a:fillRect/>
+          </a:stretch>
+        </p:blipFill>
+        <p:spPr>
+          <a:xfrm>
+            <a:off x="6127750" y="2628900"/>
+            <a:ext cx="2832100" cy="3125546"/>
+          </a:xfrm>
+          <a:prstGeom prst="rect">
+            <a:avLst/>
+          </a:prstGeom>
+        </p:spPr>
+      </p:pic>
+    </p:spTree>
+  </p:cSld>
+  <p:clrMapOvr>
+    <a:masterClrMapping/>
+  </p:clrMapOvr>
+  <p:timing>
+    <p:tnLst>
+      <p:par>
+        <p:cTn id="1" dur="indefinite" restart="never" nodeType="tmRoot"/>
+      </p:par>
+    </p:tnLst>
+  </p:timing>
+</p:sld>
+</file>
+
+<file path=ppt/slides/slide15.xml><?xml version="1.0" encoding="utf-8"?>
 <p:sld xmlns:a="http://schemas.openxmlformats.org/drawingml/2006/main" xmlns:r="http://schemas.openxmlformats.org/officeDocument/2006/relationships" xmlns:p="http://schemas.openxmlformats.org/presentationml/2006/main">
   <p:cSld>
     <p:spTree>
@@ -2497,11 +3265,7 @@
           <a:p>
             <a:r>
               <a:rPr lang="de-DE" dirty="0" smtClean="0"/>
-              <a:t>TrackMe</a:t>
-            </a:r>
-            <a:r>
-              <a:rPr lang="de-DE" dirty="0" smtClean="0"/>
-              <a:t>: Zielsetzung</a:t>
+              <a:t>TrackMe: Zielsetzung</a:t>
             </a:r>
             <a:endParaRPr lang="de-DE" dirty="0"/>
           </a:p>
@@ -2556,15 +3320,7 @@
             </a:pPr>
             <a:r>
               <a:rPr lang="de-DE" sz="2000" dirty="0" smtClean="0"/>
-              <a:t>Visualisierung der Routen auf Google </a:t>
-            </a:r>
-            <a:r>
-              <a:rPr lang="de-DE" sz="2000" dirty="0" smtClean="0"/>
-              <a:t>Maps</a:t>
-            </a:r>
-            <a:r>
-              <a:rPr lang="de-DE" sz="2000" dirty="0" smtClean="0"/>
-              <a:t>™</a:t>
+              <a:t>Visualisierung der Routen auf Google Maps™</a:t>
             </a:r>
           </a:p>
           <a:p>
@@ -2725,11 +3481,7 @@
           <a:p>
             <a:r>
               <a:rPr lang="de-DE" dirty="0" smtClean="0"/>
-              <a:t>TrackMe</a:t>
-            </a:r>
-            <a:r>
-              <a:rPr lang="de-DE" dirty="0" smtClean="0"/>
-              <a:t>: Zielsetzung</a:t>
+              <a:t>TrackMe: Zielsetzung</a:t>
             </a:r>
             <a:endParaRPr lang="de-DE" dirty="0"/>
           </a:p>
@@ -3245,11 +3997,7 @@
           <a:p>
             <a:r>
               <a:rPr lang="de-DE" dirty="0" smtClean="0"/>
-              <a:t>TrackMe</a:t>
-            </a:r>
-            <a:r>
-              <a:rPr lang="de-DE" dirty="0" smtClean="0"/>
-              <a:t>: Datenaustausch</a:t>
+              <a:t>TrackMe: Datenaustausch</a:t>
             </a:r>
             <a:endParaRPr lang="de-DE" dirty="0"/>
           </a:p>
@@ -3303,8 +4051,16 @@
               <a:buSzPct val="100000"/>
             </a:pPr>
             <a:r>
+              <a:rPr lang="de-DE" sz="2000" dirty="0"/>
+              <a:t>S</a:t>
+            </a:r>
+            <a:r>
               <a:rPr lang="de-DE" sz="2000" dirty="0" smtClean="0"/>
-              <a:t>selbstständige Konfiguration zwischen mobilen Geräten </a:t>
+              <a:t>elbstständige </a:t>
+            </a:r>
+            <a:r>
+              <a:rPr lang="de-DE" sz="2000" dirty="0" smtClean="0"/>
+              <a:t>Konfiguration zwischen mobilen Geräten </a:t>
             </a:r>
             <a:br>
               <a:rPr lang="de-DE" sz="2000" dirty="0" smtClean="0"/>
@@ -3317,7 +4073,11 @@
             </a:pPr>
             <a:r>
               <a:rPr lang="de-DE" sz="2000" dirty="0" smtClean="0"/>
-              <a:t>Perfekt! Aber? </a:t>
+              <a:t>Perfekt</a:t>
+            </a:r>
+            <a:r>
+              <a:rPr lang="de-DE" sz="2000" dirty="0" smtClean="0"/>
+              <a:t>! Aber? </a:t>
             </a:r>
             <a:br>
               <a:rPr lang="de-DE" sz="2000" dirty="0" smtClean="0"/>
@@ -3330,7 +4090,15 @@
             </a:pPr>
             <a:r>
               <a:rPr lang="de-DE" sz="2000" dirty="0" smtClean="0"/>
-              <a:t>Ad-hoc nur von wenigen Android-Geräten unterstützt </a:t>
+              <a:t>Ad-hoc </a:t>
+            </a:r>
+            <a:r>
+              <a:rPr lang="de-DE" sz="2000" dirty="0" smtClean="0"/>
+              <a:t>wird nur </a:t>
+            </a:r>
+            <a:r>
+              <a:rPr lang="de-DE" sz="2000" dirty="0" smtClean="0"/>
+              <a:t>von wenigen Android-Geräten unterstützt </a:t>
             </a:r>
           </a:p>
           <a:p>
@@ -3344,47 +4112,51 @@
               <a:buSzPct val="100000"/>
             </a:pPr>
             <a:r>
+              <a:rPr lang="de-DE" sz="2000" dirty="0" err="1" smtClean="0"/>
+              <a:t>Wpa_supplicant</a:t>
+            </a:r>
+            <a:r>
               <a:rPr lang="de-DE" sz="2000" dirty="0" smtClean="0"/>
-              <a:t>wpa_supplicant</a:t>
+              <a:t> </a:t>
             </a:r>
             <a:r>
               <a:rPr lang="de-DE" sz="2000" dirty="0" smtClean="0"/>
-              <a:t> kompatibler </a:t>
-            </a:r>
-            <a:r>
-              <a:rPr lang="de-DE" sz="2000" dirty="0" smtClean="0"/>
-              <a:t>Wi</a:t>
-            </a:r>
-            <a:r>
-              <a:rPr lang="de-DE" sz="2000" dirty="0" smtClean="0"/>
-              <a:t>-</a:t>
-            </a:r>
-            <a:r>
-              <a:rPr lang="de-DE" sz="2000" dirty="0" smtClean="0"/>
-              <a:t>Fi</a:t>
-            </a:r>
-            <a:r>
-              <a:rPr lang="de-DE" sz="2000" dirty="0" smtClean="0"/>
-              <a:t>-Treiber nötigt </a:t>
-            </a:r>
-          </a:p>
-          <a:p>
-            <a:pPr lvl="3">
+              <a:t>kompatibler Wi-Fi-Treiber nötigt </a:t>
+            </a:r>
+            <a:endParaRPr lang="de-DE" sz="2000" dirty="0" smtClean="0"/>
+          </a:p>
+          <a:p>
+            <a:pPr lvl="1">
               <a:buSzPct val="100000"/>
             </a:pPr>
-            <a:r>
-              <a:rPr lang="de-DE" dirty="0" smtClean="0"/>
-              <a:t>=&gt; vorerst Kommunikation </a:t>
-            </a:r>
-            <a:r>
-              <a:rPr lang="de-DE" dirty="0" smtClean="0"/>
-              <a:t>Infrastruktur </a:t>
-            </a:r>
-            <a:r>
-              <a:rPr lang="de-DE" dirty="0" smtClean="0"/>
+            <a:endParaRPr lang="de-DE" sz="2000" dirty="0"/>
+          </a:p>
+          <a:p>
+            <a:pPr marL="1587" lvl="1" indent="0">
+              <a:buSzPct val="100000"/>
+              <a:buNone/>
+            </a:pPr>
+            <a:r>
+              <a:rPr lang="de-DE" sz="2000" dirty="0" smtClean="0"/>
+              <a:t>	=&gt;</a:t>
+            </a:r>
+            <a:r>
+              <a:rPr lang="de-DE" sz="2000" dirty="0" smtClean="0"/>
+              <a:t> </a:t>
+            </a:r>
+            <a:r>
+              <a:rPr lang="de-DE" sz="2000" dirty="0" smtClean="0"/>
+              <a:t>vorerst Kommunikation </a:t>
+            </a:r>
+            <a:r>
+              <a:rPr lang="de-DE" sz="2000" dirty="0" smtClean="0"/>
+              <a:t>über Infrastruktur </a:t>
+            </a:r>
+            <a:r>
+              <a:rPr lang="de-DE" sz="2000" dirty="0" smtClean="0"/>
               <a:t>Netzwerk</a:t>
             </a:r>
-            <a:endParaRPr lang="de-DE" sz="1200" dirty="0"/>
+            <a:endParaRPr lang="de-DE" sz="2000" dirty="0"/>
           </a:p>
         </p:txBody>
       </p:sp>
@@ -3437,11 +4209,7 @@
           <a:p>
             <a:r>
               <a:rPr lang="de-DE" dirty="0" smtClean="0"/>
-              <a:t>TrackMe</a:t>
-            </a:r>
-            <a:r>
-              <a:rPr lang="de-DE" dirty="0" smtClean="0"/>
-              <a:t>: DTN-Kommunikation</a:t>
+              <a:t>TrackMe: DTN-Kommunikation</a:t>
             </a:r>
             <a:endParaRPr lang="de-DE" dirty="0"/>
           </a:p>
@@ -3471,24 +4239,16 @@
               <a:buSzPct val="100000"/>
             </a:pPr>
             <a:r>
+              <a:rPr lang="de-DE" sz="2000" dirty="0"/>
+              <a:t>J</a:t>
+            </a:r>
+            <a:r>
               <a:rPr lang="de-DE" sz="2000" dirty="0" smtClean="0"/>
-              <a:t>jeder </a:t>
+              <a:t>eder </a:t>
             </a:r>
             <a:r>
               <a:rPr lang="de-DE" sz="2000" dirty="0" smtClean="0"/>
-              <a:t>TrackMe</a:t>
-            </a:r>
-            <a:r>
-              <a:rPr lang="de-DE" sz="2000" dirty="0" smtClean="0"/>
-              <a:t>-Teilnehmer registriert sich für den Group-</a:t>
-            </a:r>
-            <a:r>
-              <a:rPr lang="de-DE" sz="2000" dirty="0" smtClean="0"/>
-              <a:t>Endpoint</a:t>
-            </a:r>
-            <a:r>
-              <a:rPr lang="de-DE" sz="2000" dirty="0" smtClean="0"/>
-              <a:t> "dtn://trackme.dtn/presence" </a:t>
+              <a:t>TrackMe-Teilnehmer registriert sich für den Group-Endpoint "dtn://trackme.dtn/presence" </a:t>
             </a:r>
           </a:p>
           <a:p>
@@ -3506,13 +4266,18 @@
               <a:t>Anwesenheit-Ankündigung über diesen Group-</a:t>
             </a:r>
             <a:r>
+              <a:rPr lang="de-DE" sz="2000" dirty="0" err="1" smtClean="0"/>
+              <a:t>Endpoint</a:t>
+            </a:r>
+            <a:r>
               <a:rPr lang="de-DE" sz="2000" dirty="0" smtClean="0"/>
-              <a:t>Endpoint</a:t>
+              <a:t> </a:t>
             </a:r>
             <a:r>
               <a:rPr lang="de-DE" sz="2000" dirty="0" smtClean="0"/>
-              <a:t> in zeitlichem Intervall</a:t>
-            </a:r>
+              <a:t>in zeitl. Intervall</a:t>
+            </a:r>
+            <a:endParaRPr lang="de-DE" sz="2000" dirty="0" smtClean="0"/>
           </a:p>
           <a:p>
             <a:pPr lvl="3">
@@ -3520,33 +4285,42 @@
             </a:pPr>
             <a:r>
               <a:rPr lang="de-DE" dirty="0" smtClean="0"/>
-              <a:t>(Konfigurierbar als "Presence-</a:t>
+              <a:t>Konfigurierbar </a:t>
             </a:r>
             <a:r>
               <a:rPr lang="de-DE" dirty="0" smtClean="0"/>
+              <a:t>als "Presence-</a:t>
+            </a:r>
+            <a:r>
+              <a:rPr lang="de-DE" dirty="0" err="1" smtClean="0"/>
               <a:t>Notification</a:t>
             </a:r>
             <a:r>
               <a:rPr lang="de-DE" dirty="0" smtClean="0"/>
-              <a:t>-Delay") </a:t>
+              <a:t>-Delay</a:t>
+            </a:r>
+            <a:r>
+              <a:rPr lang="de-DE" dirty="0" smtClean="0"/>
+              <a:t>"</a:t>
             </a:r>
             <a:endParaRPr lang="de-DE" sz="2000" dirty="0" smtClean="0"/>
           </a:p>
           <a:p>
-            <a:pPr lvl="3">
+            <a:pPr marL="363537" lvl="3" indent="0">
               <a:buSzPct val="100000"/>
+              <a:buNone/>
             </a:pPr>
             <a:r>
               <a:rPr lang="de-DE" dirty="0" smtClean="0"/>
-              <a:t>=&gt; jeder </a:t>
+              <a:t>=&gt; </a:t>
             </a:r>
             <a:r>
               <a:rPr lang="de-DE" dirty="0" smtClean="0"/>
-              <a:t>TrackMe</a:t>
+              <a:t>Jeder </a:t>
             </a:r>
             <a:r>
               <a:rPr lang="de-DE" dirty="0" smtClean="0"/>
-              <a:t> Teilnehmer im Netzwerk bekommt diese Ankündigung </a:t>
+              <a:t>TrackMe Teilnehmer im Netzwerk bekommt diese Ankündigung </a:t>
             </a:r>
           </a:p>
           <a:p>
@@ -3615,11 +4389,7 @@
           <a:p>
             <a:r>
               <a:rPr lang="de-DE" dirty="0" smtClean="0"/>
-              <a:t>TrackMe</a:t>
-            </a:r>
-            <a:r>
-              <a:rPr lang="de-DE" dirty="0" smtClean="0"/>
-              <a:t>: DTN-Kommunikation</a:t>
+              <a:t>TrackMe: DTN-Kommunikation</a:t>
             </a:r>
             <a:endParaRPr lang="de-DE" dirty="0"/>
           </a:p>
@@ -3659,21 +4429,30 @@
             </a:pPr>
             <a:r>
               <a:rPr lang="de-DE" dirty="0" smtClean="0"/>
-              <a:t>(Konfigurierbar als "Data-</a:t>
+              <a:t>Konfigurierbar </a:t>
             </a:r>
             <a:r>
               <a:rPr lang="de-DE" dirty="0" smtClean="0"/>
+              <a:t>als "Data-</a:t>
+            </a:r>
+            <a:r>
+              <a:rPr lang="de-DE" dirty="0" err="1" smtClean="0"/>
               <a:t>Retransmission</a:t>
             </a:r>
             <a:r>
               <a:rPr lang="de-DE" dirty="0" smtClean="0"/>
-              <a:t>-Delay") </a:t>
+              <a:t>-Delay</a:t>
+            </a:r>
+            <a:r>
+              <a:rPr lang="de-DE" dirty="0" smtClean="0"/>
+              <a:t>"</a:t>
             </a:r>
             <a:endParaRPr lang="de-DE" sz="2000" dirty="0" smtClean="0"/>
           </a:p>
           <a:p>
-            <a:pPr lvl="3">
+            <a:pPr marL="363537" lvl="3" indent="0">
               <a:buSzPct val="100000"/>
+              <a:buNone/>
             </a:pPr>
             <a:r>
               <a:rPr lang="de-DE" dirty="0" smtClean="0"/>
@@ -3697,15 +4476,23 @@
             </a:pPr>
             <a:r>
               <a:rPr lang="de-DE" sz="2000" dirty="0" smtClean="0"/>
-              <a:t>Die Time-</a:t>
+              <a:t>Die </a:t>
             </a:r>
             <a:r>
               <a:rPr lang="de-DE" sz="2000" dirty="0" smtClean="0"/>
-              <a:t>to</a:t>
+              <a:t>Time-</a:t>
+            </a:r>
+            <a:r>
+              <a:rPr lang="de-DE" sz="2000" dirty="0" err="1" smtClean="0"/>
+              <a:t>To</a:t>
             </a:r>
             <a:r>
               <a:rPr lang="de-DE" sz="2000" dirty="0" smtClean="0"/>
-              <a:t>-live für Presence- und Data-Nachrichten ebenfalls konfigurierbar als Presence-TTL und Data-TTL</a:t>
+              <a:t>-Live </a:t>
+            </a:r>
+            <a:r>
+              <a:rPr lang="de-DE" sz="2000" dirty="0" smtClean="0"/>
+              <a:t>für Presence- und Data-Nachrichten ebenfalls konfigurierbar als Presence-TTL und Data-TTL</a:t>
             </a:r>
             <a:endParaRPr lang="de-DE" sz="1200" dirty="0"/>
           </a:p>
@@ -3760,144 +4547,239 @@
           <a:p>
             <a:r>
               <a:rPr lang="de-DE" dirty="0" smtClean="0"/>
-              <a:t>TrackMe</a:t>
-            </a:r>
-            <a:r>
-              <a:rPr lang="de-DE" dirty="0" smtClean="0"/>
-              <a:t>: </a:t>
-            </a:r>
-            <a:r>
-              <a:rPr lang="de-DE" dirty="0" smtClean="0"/>
-              <a:t>Bundle</a:t>
-            </a:r>
-            <a:r>
-              <a:rPr lang="de-DE" dirty="0" smtClean="0"/>
-              <a:t>-Erstellung</a:t>
+              <a:t>TrackMe: Bundle-Erstellung</a:t>
             </a:r>
             <a:endParaRPr lang="de-DE" dirty="0"/>
           </a:p>
         </p:txBody>
       </p:sp>
-      <p:sp>
-        <p:nvSpPr>
-          <p:cNvPr id="3" name="Inhaltsplatzhalter 2"/>
-          <p:cNvSpPr>
-            <a:spLocks noGrp="1"/>
-          </p:cNvSpPr>
-          <p:nvPr>
-            <p:ph idx="1"/>
-          </p:nvPr>
-        </p:nvSpPr>
-        <p:spPr>
-          <a:xfrm>
-            <a:off x="431800" y="1042988"/>
-            <a:ext cx="8229600" cy="4772025"/>
-          </a:xfrm>
-        </p:spPr>
-        <p:txBody>
-          <a:bodyPr anchor="ctr"/>
-          <a:lstStyle/>
-          <a:p>
-            <a:pPr lvl="1">
-              <a:buSzPct val="100000"/>
-            </a:pPr>
-            <a:r>
-              <a:rPr lang="de-DE" sz="2000" dirty="0" smtClean="0"/>
-              <a:t>Absender: </a:t>
-            </a:r>
-          </a:p>
-          <a:p>
-            <a:pPr lvl="3">
-              <a:buSzPct val="100000"/>
-            </a:pPr>
-            <a:r>
-              <a:rPr lang="de-DE" sz="1800" dirty="0" smtClean="0"/>
-              <a:t>Daten werden als Vektor von Strings aus Datenbank ausgelesen</a:t>
-            </a:r>
-          </a:p>
-          <a:p>
-            <a:pPr lvl="3">
-              <a:buSzPct val="100000"/>
-            </a:pPr>
-            <a:endParaRPr lang="de-DE" sz="1800" dirty="0" smtClean="0"/>
-          </a:p>
-          <a:p>
-            <a:pPr lvl="3">
-              <a:buSzPct val="100000"/>
-            </a:pPr>
-            <a:r>
-              <a:rPr lang="de-DE" sz="1800" dirty="0" smtClean="0"/>
-              <a:t>Strings werden mit Trennzeichen '$' </a:t>
-            </a:r>
-            <a:r>
-              <a:rPr lang="de-DE" sz="1800" dirty="0" smtClean="0"/>
-              <a:t>konkateniert</a:t>
-            </a:r>
-            <a:endParaRPr lang="de-DE" sz="1800" dirty="0" smtClean="0"/>
-          </a:p>
-          <a:p>
-            <a:pPr lvl="3">
-              <a:buSzPct val="100000"/>
-              <a:buNone/>
-            </a:pPr>
-            <a:r>
-              <a:rPr lang="de-DE" sz="1800" dirty="0" smtClean="0"/>
-              <a:t> </a:t>
-            </a:r>
-          </a:p>
-          <a:p>
-            <a:pPr lvl="3">
-              <a:buSzPct val="100000"/>
-            </a:pPr>
-            <a:r>
-              <a:rPr lang="de-DE" sz="1800" dirty="0" smtClean="0"/>
-              <a:t>möglich da weder Hash noch Zeitstempel und Positionsdaten dieses Zeichen enthalten </a:t>
-            </a:r>
-            <a:r>
-              <a:rPr lang="de-DE" sz="2000" dirty="0" smtClean="0"/>
-              <a:t/>
-            </a:r>
-            <a:br>
-              <a:rPr lang="de-DE" sz="2000" dirty="0" smtClean="0"/>
-            </a:br>
-            <a:endParaRPr lang="de-DE" sz="2000" dirty="0" smtClean="0"/>
-          </a:p>
-          <a:p>
-            <a:pPr lvl="1">
-              <a:buSzPct val="100000"/>
-            </a:pPr>
-            <a:r>
-              <a:rPr lang="de-DE" sz="2000" dirty="0" smtClean="0"/>
-              <a:t>Empfänger: </a:t>
-            </a:r>
-          </a:p>
-          <a:p>
-            <a:pPr lvl="3">
-              <a:buSzPct val="100000"/>
-            </a:pPr>
-            <a:r>
-              <a:rPr lang="de-DE" sz="1800" dirty="0" smtClean="0"/>
-              <a:t>Payload wird über Trennzeichen '$' auseinandergenommen</a:t>
-            </a:r>
-          </a:p>
-          <a:p>
-            <a:pPr lvl="3">
-              <a:buSzPct val="100000"/>
-            </a:pPr>
-            <a:endParaRPr lang="de-DE" sz="1800" dirty="0" smtClean="0"/>
-          </a:p>
-          <a:p>
-            <a:pPr lvl="3">
-              <a:buSzPct val="100000"/>
-            </a:pPr>
-            <a:r>
-              <a:rPr lang="de-DE" sz="1800" dirty="0" smtClean="0"/>
-              <a:t>Erstellung eines Vektors aus Strings und Übergabe an Datenbank </a:t>
-            </a:r>
-            <a:endParaRPr lang="de-DE" sz="1100" dirty="0"/>
-          </a:p>
-        </p:txBody>
-      </p:sp>
+      <mc:AlternateContent xmlns:mc="http://schemas.openxmlformats.org/markup-compatibility/2006">
+        <mc:Choice xmlns:a14="http://schemas.microsoft.com/office/drawing/2010/main" Requires="a14">
+          <p:sp>
+            <p:nvSpPr>
+              <p:cNvPr id="3" name="Inhaltsplatzhalter 2"/>
+              <p:cNvSpPr>
+                <a:spLocks noGrp="1"/>
+              </p:cNvSpPr>
+              <p:nvPr>
+                <p:ph idx="1"/>
+              </p:nvPr>
+            </p:nvSpPr>
+            <p:spPr>
+              <a:xfrm>
+                <a:off x="431800" y="1042988"/>
+                <a:ext cx="8229600" cy="4772025"/>
+              </a:xfrm>
+            </p:spPr>
+            <p:txBody>
+              <a:bodyPr anchor="ctr"/>
+              <a:lstStyle/>
+              <a:p>
+                <a:pPr lvl="1">
+                  <a:buSzPct val="100000"/>
+                </a:pPr>
+                <a:r>
+                  <a:rPr lang="de-DE" sz="2000" dirty="0" smtClean="0"/>
+                  <a:t>Header 4 Bytes</a:t>
+                </a:r>
+              </a:p>
+              <a:p>
+                <a:pPr lvl="2">
+                  <a:buSzPct val="100000"/>
+                </a:pPr>
+                <a:r>
+                  <a:rPr lang="de-DE" dirty="0" smtClean="0"/>
+                  <a:t>Kodiert den Typ des Bundles (0 – Presence, Data – 1, </a:t>
+                </a:r>
+                <a14:m>
+                  <m:oMath xmlns:m="http://schemas.openxmlformats.org/officeDocument/2006/math">
+                    <m:sSup>
+                      <m:sSupPr>
+                        <m:ctrlPr>
+                          <a:rPr lang="de-DE" i="1" dirty="0" smtClean="0">
+                            <a:latin typeface="Cambria Math"/>
+                          </a:rPr>
+                        </m:ctrlPr>
+                      </m:sSupPr>
+                      <m:e>
+                        <m:r>
+                          <a:rPr lang="de-DE" b="0" i="1" dirty="0" smtClean="0">
+                            <a:latin typeface="Cambria Math"/>
+                          </a:rPr>
+                          <m:t>2</m:t>
+                        </m:r>
+                      </m:e>
+                      <m:sup>
+                        <m:r>
+                          <a:rPr lang="de-DE" b="0" i="1" dirty="0" smtClean="0">
+                            <a:latin typeface="Cambria Math"/>
+                          </a:rPr>
+                          <m:t>32</m:t>
+                        </m:r>
+                      </m:sup>
+                    </m:sSup>
+                  </m:oMath>
+                </a14:m>
+                <a:r>
+                  <a:rPr lang="de-DE" dirty="0" smtClean="0"/>
+                  <a:t>-2 weitere möglich ..)</a:t>
+                </a:r>
+              </a:p>
+              <a:p>
+                <a:pPr marL="192087" lvl="2" indent="0">
+                  <a:buSzPct val="100000"/>
+                  <a:buNone/>
+                </a:pPr>
+                <a:endParaRPr lang="de-DE" sz="1800" dirty="0" smtClean="0"/>
+              </a:p>
+              <a:p>
+                <a:pPr lvl="1">
+                  <a:buSzPct val="100000"/>
+                </a:pPr>
+                <a:r>
+                  <a:rPr lang="de-DE" sz="2000" dirty="0" smtClean="0"/>
+                  <a:t>Payload </a:t>
+                </a:r>
+                <a:endParaRPr lang="de-DE" sz="2000" dirty="0" smtClean="0"/>
+              </a:p>
+              <a:p>
+                <a:pPr lvl="3">
+                  <a:buSzPct val="100000"/>
+                </a:pPr>
+                <a:r>
+                  <a:rPr lang="de-DE" sz="1800" dirty="0" smtClean="0"/>
+                  <a:t>Sender</a:t>
+                </a:r>
+                <a:endParaRPr lang="de-DE" sz="1800" dirty="0" smtClean="0"/>
+              </a:p>
+              <a:p>
+                <a:pPr lvl="4">
+                  <a:buSzPct val="100000"/>
+                </a:pPr>
+                <a:r>
+                  <a:rPr lang="de-DE" sz="1800" dirty="0" smtClean="0"/>
+                  <a:t>Daten </a:t>
+                </a:r>
+                <a:r>
+                  <a:rPr lang="de-DE" sz="1800" dirty="0" smtClean="0"/>
+                  <a:t>werden </a:t>
+                </a:r>
+                <a:r>
+                  <a:rPr lang="de-DE" sz="1800" dirty="0" smtClean="0"/>
+                  <a:t>als Zeichenketten von</a:t>
+                </a:r>
+                <a:r>
+                  <a:rPr lang="de-DE" sz="1800" dirty="0" smtClean="0"/>
+                  <a:t> Komponente Datenbank übergeben</a:t>
+                </a:r>
+                <a:endParaRPr lang="de-DE" sz="1800" dirty="0" smtClean="0"/>
+              </a:p>
+              <a:p>
+                <a:pPr lvl="4">
+                  <a:buSzPct val="100000"/>
+                </a:pPr>
+                <a:r>
+                  <a:rPr lang="de-DE" sz="1800" dirty="0" smtClean="0"/>
+                  <a:t>Einzelne Strings </a:t>
+                </a:r>
+                <a:r>
+                  <a:rPr lang="de-DE" sz="1800" dirty="0" smtClean="0"/>
+                  <a:t>werden </a:t>
+                </a:r>
+                <a:r>
+                  <a:rPr lang="de-DE" sz="1800" dirty="0" smtClean="0"/>
+                  <a:t>mit Trennzeichen '$' konkateniert</a:t>
+                </a:r>
+              </a:p>
+              <a:p>
+                <a:pPr lvl="4">
+                  <a:buSzPct val="100000"/>
+                </a:pPr>
+                <a:r>
+                  <a:rPr lang="de-DE" sz="1800" dirty="0" smtClean="0"/>
+                  <a:t>möglich </a:t>
+                </a:r>
+                <a:r>
+                  <a:rPr lang="de-DE" sz="1800" dirty="0" smtClean="0"/>
+                  <a:t>da weder Hash noch Zeitstempel und Positionsdaten dieses Zeichen enthalten </a:t>
+                </a:r>
+                <a:endParaRPr lang="de-DE" sz="1800" dirty="0"/>
+              </a:p>
+              <a:p>
+                <a:pPr lvl="3">
+                  <a:buSzPct val="100000"/>
+                </a:pPr>
+                <a:r>
+                  <a:rPr lang="de-DE" sz="1800" dirty="0" smtClean="0"/>
+                  <a:t>Empfänger</a:t>
+                </a:r>
+                <a:endParaRPr lang="de-DE" sz="1800" dirty="0" smtClean="0"/>
+              </a:p>
+              <a:p>
+                <a:pPr lvl="4">
+                  <a:buSzPct val="100000"/>
+                </a:pPr>
+                <a:r>
+                  <a:rPr lang="de-DE" sz="1800" dirty="0" smtClean="0"/>
+                  <a:t>Payload wird über Trennzeichen '$' </a:t>
+                </a:r>
+                <a:r>
+                  <a:rPr lang="de-DE" sz="1800" dirty="0" smtClean="0"/>
+                  <a:t>auseinandergenommen</a:t>
+                </a:r>
+                <a:endParaRPr lang="de-DE" sz="1800" dirty="0" smtClean="0"/>
+              </a:p>
+              <a:p>
+                <a:pPr lvl="4">
+                  <a:buSzPct val="100000"/>
+                </a:pPr>
+                <a:r>
+                  <a:rPr lang="de-DE" sz="1800" dirty="0" smtClean="0"/>
+                  <a:t>Aufteilung in ursprüngliche Zeichenketten und Übergabe an Datenbank</a:t>
+                </a:r>
+                <a:endParaRPr lang="de-DE" sz="1800" dirty="0" smtClean="0"/>
+              </a:p>
+            </p:txBody>
+          </p:sp>
+        </mc:Choice>
+        <mc:Fallback>
+          <p:sp>
+            <p:nvSpPr>
+              <p:cNvPr id="3" name="Inhaltsplatzhalter 2"/>
+              <p:cNvSpPr>
+                <a:spLocks noGrp="1" noRot="1" noChangeAspect="1" noMove="1" noResize="1" noEditPoints="1" noAdjustHandles="1" noChangeArrowheads="1" noChangeShapeType="1" noTextEdit="1"/>
+              </p:cNvSpPr>
+              <p:nvPr>
+                <p:ph idx="1"/>
+              </p:nvPr>
+            </p:nvSpPr>
+            <p:spPr>
+              <a:xfrm>
+                <a:off x="431800" y="1042988"/>
+                <a:ext cx="8229600" cy="4772025"/>
+              </a:xfrm>
+              <a:blipFill rotWithShape="1">
+                <a:blip r:embed="rId2"/>
+                <a:stretch>
+                  <a:fillRect l="-1778" r="-444"/>
+                </a:stretch>
+              </a:blipFill>
+            </p:spPr>
+            <p:txBody>
+              <a:bodyPr/>
+              <a:lstStyle/>
+              <a:p>
+                <a:r>
+                  <a:rPr lang="de-DE">
+                    <a:noFill/>
+                  </a:rPr>
+                  <a:t> </a:t>
+                </a:r>
+              </a:p>
+            </p:txBody>
+          </p:sp>
+        </mc:Fallback>
+      </mc:AlternateContent>
     </p:spTree>
   </p:cSld>
   <p:clrMapOvr>
@@ -3932,7 +4814,7 @@
       </p:grpSpPr>
       <p:sp>
         <p:nvSpPr>
-          <p:cNvPr id="2" name="Titel 1"/>
+          <p:cNvPr id="2" name="Title 1"/>
           <p:cNvSpPr>
             <a:spLocks noGrp="1"/>
           </p:cNvSpPr>
@@ -3947,149 +4829,118 @@
           <a:p>
             <a:r>
               <a:rPr lang="de-DE" dirty="0" smtClean="0"/>
-              <a:t>TrackMe</a:t>
-            </a:r>
-            <a:r>
-              <a:rPr lang="de-DE" dirty="0" smtClean="0"/>
-              <a:t>: </a:t>
-            </a:r>
-            <a:r>
-              <a:rPr lang="de-DE" dirty="0" smtClean="0"/>
-              <a:t>Positionsbestimmung</a:t>
+              <a:t>Sequenzdiagramm Datenaustausch</a:t>
             </a:r>
             <a:endParaRPr lang="de-DE" dirty="0"/>
-          </a:p>
-        </p:txBody>
-      </p:sp>
-      <p:sp>
-        <p:nvSpPr>
-          <p:cNvPr id="3" name="Inhaltsplatzhalter 2"/>
-          <p:cNvSpPr>
-            <a:spLocks noGrp="1"/>
-          </p:cNvSpPr>
-          <p:nvPr>
-            <p:ph idx="1"/>
-          </p:nvPr>
-        </p:nvSpPr>
-        <p:spPr>
-          <a:xfrm>
-            <a:off x="431800" y="1042988"/>
-            <a:ext cx="5918200" cy="4772025"/>
-          </a:xfrm>
-        </p:spPr>
-        <p:txBody>
-          <a:bodyPr anchor="ctr"/>
-          <a:lstStyle/>
-          <a:p>
-            <a:pPr lvl="1">
-              <a:buSzPct val="100000"/>
-            </a:pPr>
-            <a:r>
-              <a:rPr lang="de-DE" sz="2000" dirty="0" smtClean="0"/>
-              <a:t>Positionsbestimmung über GPS-Empfänger und erreichbare Funknetze</a:t>
-            </a:r>
-            <a:endParaRPr lang="de-DE" dirty="0" smtClean="0"/>
-          </a:p>
-          <a:p>
-            <a:pPr lvl="1">
-              <a:buSzPct val="100000"/>
-            </a:pPr>
-            <a:endParaRPr lang="de-DE" sz="2000" dirty="0" smtClean="0"/>
-          </a:p>
-          <a:p>
-            <a:pPr lvl="1">
-              <a:buSzPct val="100000"/>
-            </a:pPr>
-            <a:r>
-              <a:rPr lang="de-DE" sz="2000" dirty="0" smtClean="0"/>
-              <a:t>Mindestentfernung und Mindestzeit für nächstes Positionsupdate einstellbar</a:t>
-            </a:r>
-            <a:endParaRPr lang="de-DE" sz="2000" dirty="0" smtClean="0"/>
-          </a:p>
-          <a:p>
-            <a:pPr lvl="1">
-              <a:buSzPct val="100000"/>
-            </a:pPr>
-            <a:endParaRPr lang="de-DE" sz="2000" dirty="0" smtClean="0"/>
-          </a:p>
-          <a:p>
-            <a:pPr lvl="1">
-              <a:buSzPct val="100000"/>
-            </a:pPr>
-            <a:r>
-              <a:rPr lang="de-DE" sz="2000" dirty="0" smtClean="0"/>
-              <a:t>Entscheidung wann neue Position übernommen wird anhand (Priorität absteigend):</a:t>
-            </a:r>
-          </a:p>
-          <a:p>
-            <a:pPr lvl="3">
-              <a:buSzPct val="100000"/>
-            </a:pPr>
-            <a:r>
-              <a:rPr lang="de-DE" dirty="0" smtClean="0"/>
-              <a:t>Benutzereinstellungen (Zeit),</a:t>
-            </a:r>
-          </a:p>
-          <a:p>
-            <a:pPr lvl="3">
-              <a:buSzPct val="100000"/>
-            </a:pPr>
-            <a:r>
-              <a:rPr lang="de-DE" dirty="0" smtClean="0"/>
-              <a:t>Zeit,</a:t>
-            </a:r>
-          </a:p>
-          <a:p>
-            <a:pPr lvl="3">
-              <a:buSzPct val="100000"/>
-            </a:pPr>
-            <a:r>
-              <a:rPr lang="de-DE" smtClean="0"/>
-              <a:t>Genauigkeit,</a:t>
-            </a:r>
-            <a:endParaRPr lang="de-DE" dirty="0" smtClean="0"/>
-          </a:p>
-          <a:p>
-            <a:pPr lvl="3">
-              <a:buSzPct val="100000"/>
-            </a:pPr>
-            <a:r>
-              <a:rPr lang="de-DE" dirty="0" smtClean="0"/>
-              <a:t>Art der Positionsbestimmung (GPS / Network)</a:t>
-            </a:r>
-            <a:endParaRPr lang="de-DE" dirty="0" smtClean="0"/>
           </a:p>
         </p:txBody>
       </p:sp>
       <p:pic>
         <p:nvPicPr>
-          <p:cNvPr id="5" name="Grafik 4" descr="midkiffaries_Ruffled_Map.png"/>
+          <p:cNvPr id="1026" name="Picture 2"/>
           <p:cNvPicPr>
-            <a:picLocks noChangeAspect="1"/>
+            <a:picLocks noChangeAspect="1" noChangeArrowheads="1"/>
           </p:cNvPicPr>
           <p:nvPr/>
         </p:nvPicPr>
         <p:blipFill>
-          <a:blip r:embed="rId2"/>
+          <a:blip r:embed="rId2" cstate="print">
+            <a:extLst>
+              <a:ext uri="{28A0092B-C50C-407E-A947-70E740481C1C}">
+                <a14:useLocalDpi xmlns:a14="http://schemas.microsoft.com/office/drawing/2010/main" val="0"/>
+              </a:ext>
+            </a:extLst>
+          </a:blip>
           <a:stretch>
             <a:fillRect/>
           </a:stretch>
         </p:blipFill>
-        <p:spPr>
+        <p:spPr bwMode="auto">
           <a:xfrm>
-            <a:off x="6305550" y="2362200"/>
-            <a:ext cx="2638425" cy="2649021"/>
+            <a:off x="506045" y="905475"/>
+            <a:ext cx="8100900" cy="4998734"/>
           </a:xfrm>
           <a:prstGeom prst="rect">
             <a:avLst/>
           </a:prstGeom>
+          <a:noFill/>
+          <a:extLst>
+            <a:ext uri="{909E8E84-426E-40DD-AFC4-6F175D3DCCD1}">
+              <a14:hiddenFill xmlns:a14="http://schemas.microsoft.com/office/drawing/2010/main">
+                <a:solidFill>
+                  <a:srgbClr val="FFFFFF"/>
+                </a:solidFill>
+              </a14:hiddenFill>
+            </a:ext>
+          </a:extLst>
         </p:spPr>
       </p:pic>
+      <p:sp>
+        <p:nvSpPr>
+          <p:cNvPr id="4" name="Rectangle 3"/>
+          <p:cNvSpPr/>
+          <p:nvPr/>
+        </p:nvSpPr>
+        <p:spPr>
+          <a:xfrm>
+            <a:off x="161510" y="1763816"/>
+            <a:ext cx="8640960" cy="4140460"/>
+          </a:xfrm>
+          <a:prstGeom prst="rect">
+            <a:avLst/>
+          </a:prstGeom>
+          <a:solidFill>
+            <a:schemeClr val="bg1"/>
+          </a:solidFill>
+          <a:ln w="19050">
+            <a:solidFill>
+              <a:schemeClr val="bg1"/>
+            </a:solidFill>
+          </a:ln>
+        </p:spPr>
+        <p:style>
+          <a:lnRef idx="2">
+            <a:schemeClr val="accent5">
+              <a:shade val="50000"/>
+            </a:schemeClr>
+          </a:lnRef>
+          <a:fillRef idx="1">
+            <a:schemeClr val="accent5"/>
+          </a:fillRef>
+          <a:effectRef idx="0">
+            <a:schemeClr val="accent5"/>
+          </a:effectRef>
+          <a:fontRef idx="minor">
+            <a:schemeClr val="lt1"/>
+          </a:fontRef>
+        </p:style>
+        <p:txBody>
+          <a:bodyPr rtlCol="0" anchor="ctr"/>
+          <a:lstStyle/>
+          <a:p>
+            <a:pPr algn="ctr"/>
+            <a:endParaRPr lang="de-DE" dirty="0" smtClean="0"/>
+          </a:p>
+        </p:txBody>
+      </p:sp>
     </p:spTree>
+    <p:extLst>
+      <p:ext uri="{BB962C8B-B14F-4D97-AF65-F5344CB8AC3E}">
+        <p14:creationId xmlns:p14="http://schemas.microsoft.com/office/powerpoint/2010/main" val="1119031326"/>
+      </p:ext>
+    </p:extLst>
   </p:cSld>
   <p:clrMapOvr>
     <a:masterClrMapping/>
   </p:clrMapOvr>
+  <mc:AlternateContent xmlns:mc="http://schemas.openxmlformats.org/markup-compatibility/2006">
+    <mc:Choice xmlns:p14="http://schemas.microsoft.com/office/powerpoint/2010/main" Requires="p14">
+      <p:transition p14:dur="0"/>
+    </mc:Choice>
+    <mc:Fallback>
+      <p:transition/>
+    </mc:Fallback>
+  </mc:AlternateContent>
   <p:timing>
     <p:tnLst>
       <p:par>
@@ -4119,7 +4970,7 @@
       </p:grpSpPr>
       <p:sp>
         <p:nvSpPr>
-          <p:cNvPr id="2" name="Titel 1"/>
+          <p:cNvPr id="2" name="Title 1"/>
           <p:cNvSpPr>
             <a:spLocks noGrp="1"/>
           </p:cNvSpPr>
@@ -4134,132 +4985,122 @@
           <a:p>
             <a:r>
               <a:rPr lang="de-DE" dirty="0" smtClean="0"/>
-              <a:t>TrackMe</a:t>
-            </a:r>
-            <a:r>
-              <a:rPr lang="de-DE" dirty="0" smtClean="0"/>
-              <a:t>: Datenspeicherung</a:t>
+              <a:t>Sequenzdiagramm Datenaustausch</a:t>
             </a:r>
             <a:endParaRPr lang="de-DE" dirty="0"/>
-          </a:p>
-        </p:txBody>
-      </p:sp>
-      <p:sp>
-        <p:nvSpPr>
-          <p:cNvPr id="3" name="Inhaltsplatzhalter 2"/>
-          <p:cNvSpPr>
-            <a:spLocks noGrp="1"/>
-          </p:cNvSpPr>
-          <p:nvPr>
-            <p:ph idx="1"/>
-          </p:nvPr>
-        </p:nvSpPr>
-        <p:spPr>
-          <a:xfrm>
-            <a:off x="431800" y="1042988"/>
-            <a:ext cx="6229350" cy="4772025"/>
-          </a:xfrm>
-        </p:spPr>
-        <p:txBody>
-          <a:bodyPr anchor="ctr"/>
-          <a:lstStyle/>
-          <a:p>
-            <a:pPr lvl="1">
-              <a:buSzPct val="100000"/>
-            </a:pPr>
-            <a:r>
-              <a:rPr lang="de-DE" sz="2000" dirty="0" smtClean="0"/>
-              <a:t>Speicherung der Positionsdaten in </a:t>
-            </a:r>
-            <a:r>
-              <a:rPr lang="de-DE" sz="2000" dirty="0" smtClean="0"/>
-              <a:t>SQLite</a:t>
-            </a:r>
-            <a:r>
-              <a:rPr lang="de-DE" sz="2000" dirty="0" smtClean="0"/>
-              <a:t> Datenbank</a:t>
-            </a:r>
-          </a:p>
-          <a:p>
-            <a:pPr lvl="3">
-              <a:buSzPct val="100000"/>
-            </a:pPr>
-            <a:r>
-              <a:rPr lang="de-DE" dirty="0" smtClean="0"/>
-              <a:t>eigene Daten und Positionsdaten anderer Nutzer</a:t>
-            </a:r>
-          </a:p>
-          <a:p>
-            <a:pPr lvl="1">
-              <a:buSzPct val="100000"/>
-            </a:pPr>
-            <a:endParaRPr lang="de-DE" sz="2000" dirty="0" smtClean="0"/>
-          </a:p>
-          <a:p>
-            <a:pPr lvl="1">
-              <a:buSzPct val="100000"/>
-            </a:pPr>
-            <a:r>
-              <a:rPr lang="de-DE" sz="2000" dirty="0" smtClean="0"/>
-              <a:t>Identifikation über Handynummer</a:t>
-            </a:r>
-          </a:p>
-          <a:p>
-            <a:pPr lvl="3">
-              <a:buSzPct val="100000"/>
-            </a:pPr>
-            <a:r>
-              <a:rPr lang="de-DE" dirty="0" smtClean="0"/>
-              <a:t>verschlüsselte Speicherung</a:t>
-            </a:r>
-          </a:p>
-          <a:p>
-            <a:pPr lvl="1">
-              <a:buSzPct val="100000"/>
-            </a:pPr>
-            <a:endParaRPr lang="de-DE" sz="2000" dirty="0" smtClean="0"/>
-          </a:p>
-          <a:p>
-            <a:pPr lvl="1">
-              <a:buSzPct val="100000"/>
-            </a:pPr>
-            <a:r>
-              <a:rPr lang="de-DE" sz="2000" dirty="0" smtClean="0"/>
-              <a:t>Nach Ablauf der (einstellbaren) TTL werden die Routendaten gelöscht und nicht mehr weiterverbreitet.</a:t>
-            </a:r>
-            <a:endParaRPr lang="de-DE" sz="2000" dirty="0" smtClean="0"/>
           </a:p>
         </p:txBody>
       </p:sp>
       <p:pic>
         <p:nvPicPr>
-          <p:cNvPr id="7" name="Grafik 6" descr="db.png"/>
+          <p:cNvPr id="1026" name="Picture 2"/>
           <p:cNvPicPr>
-            <a:picLocks noChangeAspect="1"/>
+            <a:picLocks noChangeAspect="1" noChangeArrowheads="1"/>
           </p:cNvPicPr>
           <p:nvPr/>
         </p:nvPicPr>
         <p:blipFill>
-          <a:blip r:embed="rId2"/>
+          <a:blip r:embed="rId2" cstate="print">
+            <a:extLst>
+              <a:ext uri="{28A0092B-C50C-407E-A947-70E740481C1C}">
+                <a14:useLocalDpi xmlns:a14="http://schemas.microsoft.com/office/drawing/2010/main" val="0"/>
+              </a:ext>
+            </a:extLst>
+          </a:blip>
           <a:stretch>
             <a:fillRect/>
           </a:stretch>
         </p:blipFill>
-        <p:spPr>
+        <p:spPr bwMode="auto">
           <a:xfrm>
-            <a:off x="6127750" y="2628900"/>
-            <a:ext cx="2832100" cy="3125546"/>
+            <a:off x="506045" y="905475"/>
+            <a:ext cx="8100900" cy="4998734"/>
           </a:xfrm>
           <a:prstGeom prst="rect">
             <a:avLst/>
           </a:prstGeom>
+          <a:noFill/>
+          <a:extLst>
+            <a:ext uri="{909E8E84-426E-40DD-AFC4-6F175D3DCCD1}">
+              <a14:hiddenFill xmlns:a14="http://schemas.microsoft.com/office/drawing/2010/main">
+                <a:solidFill>
+                  <a:srgbClr val="FFFFFF"/>
+                </a:solidFill>
+              </a14:hiddenFill>
+            </a:ext>
+          </a:extLst>
         </p:spPr>
       </p:pic>
+      <p:sp>
+        <p:nvSpPr>
+          <p:cNvPr id="4" name="Rectangle 3"/>
+          <p:cNvSpPr/>
+          <p:nvPr/>
+        </p:nvSpPr>
+        <p:spPr>
+          <a:xfrm>
+            <a:off x="161510" y="2888940"/>
+            <a:ext cx="8640960" cy="3015335"/>
+          </a:xfrm>
+          <a:prstGeom prst="rect">
+            <a:avLst/>
+          </a:prstGeom>
+          <a:solidFill>
+            <a:schemeClr val="bg1"/>
+          </a:solidFill>
+          <a:ln w="19050">
+            <a:solidFill>
+              <a:schemeClr val="bg1"/>
+            </a:solidFill>
+          </a:ln>
+        </p:spPr>
+        <p:style>
+          <a:lnRef idx="2">
+            <a:schemeClr val="accent5">
+              <a:shade val="50000"/>
+            </a:schemeClr>
+          </a:lnRef>
+          <a:fillRef idx="1">
+            <a:schemeClr val="accent5"/>
+          </a:fillRef>
+          <a:effectRef idx="0">
+            <a:schemeClr val="accent5"/>
+          </a:effectRef>
+          <a:fontRef idx="minor">
+            <a:schemeClr val="lt1"/>
+          </a:fontRef>
+        </p:style>
+        <p:txBody>
+          <a:bodyPr rtlCol="0" anchor="ctr"/>
+          <a:lstStyle/>
+          <a:p>
+            <a:pPr algn="ctr"/>
+            <a:endParaRPr lang="de-DE" dirty="0" smtClean="0"/>
+          </a:p>
+        </p:txBody>
+      </p:sp>
     </p:spTree>
+    <p:extLst>
+      <p:ext uri="{BB962C8B-B14F-4D97-AF65-F5344CB8AC3E}">
+        <p14:creationId xmlns:p14="http://schemas.microsoft.com/office/powerpoint/2010/main" val="1618051733"/>
+      </p:ext>
+    </p:extLst>
   </p:cSld>
   <p:clrMapOvr>
     <a:masterClrMapping/>
   </p:clrMapOvr>
+  <mc:AlternateContent xmlns:mc="http://schemas.openxmlformats.org/markup-compatibility/2006">
+    <mc:Choice xmlns:p14="http://schemas.microsoft.com/office/powerpoint/2010/main" Requires="p14">
+      <p:transition spd="med" p14:dur="700">
+        <p:fade/>
+      </p:transition>
+    </mc:Choice>
+    <mc:Fallback>
+      <p:transition spd="med">
+        <p:fade/>
+      </p:transition>
+    </mc:Fallback>
+  </mc:AlternateContent>
   <p:timing>
     <p:tnLst>
       <p:par>

</xml_diff>

<commit_message>
Added link for apk
</commit_message>
<xml_diff>
--- a/doc/Android-Lab-TrackMe-Abschlusspraes.pptx
+++ b/doc/Android-Lab-TrackMe-Abschlusspraes.pptx
@@ -451,7 +451,7 @@
             <a:fld id="{E4AA6088-1FF0-4E53-845C-EFEDD1C948F8}" type="slidenum">
               <a:rPr lang="de-DE"/>
               <a:pPr/>
-              <a:t>‹#›</a:t>
+              <a:t>‹Nr.›</a:t>
             </a:fld>
             <a:endParaRPr lang="de-DE" dirty="0"/>
           </a:p>
@@ -460,7 +460,7 @@
     </p:spTree>
     <p:extLst>
       <p:ext uri="{BB962C8B-B14F-4D97-AF65-F5344CB8AC3E}">
-        <p14:creationId xmlns:p14="http://schemas.microsoft.com/office/powerpoint/2010/main" val="3706856128"/>
+        <p14:creationId xmlns:p14="http://schemas.microsoft.com/office/powerpoint/2010/main" xmlns="" val="3706856128"/>
       </p:ext>
     </p:extLst>
   </p:cSld>
@@ -1870,7 +1870,7 @@
                 <a:tabLst/>
                 <a:defRPr/>
               </a:pPr>
-              <a:t>‹#›</a:t>
+              <a:t>‹Nr.›</a:t>
             </a:fld>
             <a:endParaRPr lang="de-DE" sz="1000" dirty="0" smtClean="0"/>
           </a:p>
@@ -2432,7 +2432,7 @@
           <a:blip r:embed="rId2" cstate="print">
             <a:extLst>
               <a:ext uri="{28A0092B-C50C-407E-A947-70E740481C1C}">
-                <a14:useLocalDpi xmlns:a14="http://schemas.microsoft.com/office/drawing/2010/main" val="0"/>
+                <a14:useLocalDpi xmlns:a14="http://schemas.microsoft.com/office/drawing/2010/main" xmlns="" val="0"/>
               </a:ext>
             </a:extLst>
           </a:blip>
@@ -2451,7 +2451,7 @@
           <a:noFill/>
           <a:extLst>
             <a:ext uri="{909E8E84-426E-40DD-AFC4-6F175D3DCCD1}">
-              <a14:hiddenFill xmlns:a14="http://schemas.microsoft.com/office/drawing/2010/main">
+              <a14:hiddenFill xmlns:a14="http://schemas.microsoft.com/office/drawing/2010/main" xmlns="">
                 <a:solidFill>
                   <a:srgbClr val="FFFFFF"/>
                 </a:solidFill>
@@ -2511,7 +2511,7 @@
     </p:spTree>
     <p:extLst>
       <p:ext uri="{BB962C8B-B14F-4D97-AF65-F5344CB8AC3E}">
-        <p14:creationId xmlns:p14="http://schemas.microsoft.com/office/powerpoint/2010/main" val="1618051733"/>
+        <p14:creationId xmlns:p14="http://schemas.microsoft.com/office/powerpoint/2010/main" xmlns="" val="1618051733"/>
       </p:ext>
     </p:extLst>
   </p:cSld>
@@ -2519,7 +2519,7 @@
     <a:masterClrMapping/>
   </p:clrMapOvr>
   <mc:AlternateContent xmlns:mc="http://schemas.openxmlformats.org/markup-compatibility/2006">
-    <mc:Choice xmlns:p14="http://schemas.microsoft.com/office/powerpoint/2010/main" Requires="p14">
+    <mc:Choice xmlns:p14="http://schemas.microsoft.com/office/powerpoint/2010/main" xmlns="" Requires="p14">
       <p:transition spd="med" p14:dur="700">
         <p:fade/>
       </p:transition>
@@ -2592,7 +2592,7 @@
           <a:blip r:embed="rId2" cstate="print">
             <a:extLst>
               <a:ext uri="{28A0092B-C50C-407E-A947-70E740481C1C}">
-                <a14:useLocalDpi xmlns:a14="http://schemas.microsoft.com/office/drawing/2010/main" val="0"/>
+                <a14:useLocalDpi xmlns:a14="http://schemas.microsoft.com/office/drawing/2010/main" xmlns="" val="0"/>
               </a:ext>
             </a:extLst>
           </a:blip>
@@ -2611,7 +2611,7 @@
           <a:noFill/>
           <a:extLst>
             <a:ext uri="{909E8E84-426E-40DD-AFC4-6F175D3DCCD1}">
-              <a14:hiddenFill xmlns:a14="http://schemas.microsoft.com/office/drawing/2010/main">
+              <a14:hiddenFill xmlns:a14="http://schemas.microsoft.com/office/drawing/2010/main" xmlns="">
                 <a:solidFill>
                   <a:srgbClr val="FFFFFF"/>
                 </a:solidFill>
@@ -2671,7 +2671,7 @@
     </p:spTree>
     <p:extLst>
       <p:ext uri="{BB962C8B-B14F-4D97-AF65-F5344CB8AC3E}">
-        <p14:creationId xmlns:p14="http://schemas.microsoft.com/office/powerpoint/2010/main" val="1618051733"/>
+        <p14:creationId xmlns:p14="http://schemas.microsoft.com/office/powerpoint/2010/main" xmlns="" val="1618051733"/>
       </p:ext>
     </p:extLst>
   </p:cSld>
@@ -2679,7 +2679,7 @@
     <a:masterClrMapping/>
   </p:clrMapOvr>
   <mc:AlternateContent xmlns:mc="http://schemas.openxmlformats.org/markup-compatibility/2006">
-    <mc:Choice xmlns:p14="http://schemas.microsoft.com/office/powerpoint/2010/main" Requires="p14">
+    <mc:Choice xmlns:p14="http://schemas.microsoft.com/office/powerpoint/2010/main" xmlns="" Requires="p14">
       <p:transition spd="med" p14:dur="700">
         <p:fade/>
       </p:transition>
@@ -2752,7 +2752,7 @@
           <a:blip r:embed="rId2" cstate="print">
             <a:extLst>
               <a:ext uri="{28A0092B-C50C-407E-A947-70E740481C1C}">
-                <a14:useLocalDpi xmlns:a14="http://schemas.microsoft.com/office/drawing/2010/main" val="0"/>
+                <a14:useLocalDpi xmlns:a14="http://schemas.microsoft.com/office/drawing/2010/main" xmlns="" val="0"/>
               </a:ext>
             </a:extLst>
           </a:blip>
@@ -2771,7 +2771,7 @@
           <a:noFill/>
           <a:extLst>
             <a:ext uri="{909E8E84-426E-40DD-AFC4-6F175D3DCCD1}">
-              <a14:hiddenFill xmlns:a14="http://schemas.microsoft.com/office/drawing/2010/main">
+              <a14:hiddenFill xmlns:a14="http://schemas.microsoft.com/office/drawing/2010/main" xmlns="">
                 <a:solidFill>
                   <a:srgbClr val="FFFFFF"/>
                 </a:solidFill>
@@ -2783,7 +2783,7 @@
     </p:spTree>
     <p:extLst>
       <p:ext uri="{BB962C8B-B14F-4D97-AF65-F5344CB8AC3E}">
-        <p14:creationId xmlns:p14="http://schemas.microsoft.com/office/powerpoint/2010/main" val="1618051733"/>
+        <p14:creationId xmlns:p14="http://schemas.microsoft.com/office/powerpoint/2010/main" xmlns="" val="1618051733"/>
       </p:ext>
     </p:extLst>
   </p:cSld>
@@ -2791,7 +2791,7 @@
     <a:masterClrMapping/>
   </p:clrMapOvr>
   <mc:AlternateContent xmlns:mc="http://schemas.openxmlformats.org/markup-compatibility/2006">
-    <mc:Choice xmlns:p14="http://schemas.microsoft.com/office/powerpoint/2010/main" Requires="p14">
+    <mc:Choice xmlns:p14="http://schemas.microsoft.com/office/powerpoint/2010/main" xmlns="" Requires="p14">
       <p:transition spd="med" p14:dur="700">
         <p:fade/>
       </p:transition>
@@ -3194,7 +3194,7 @@
         </p:nvSpPr>
         <p:spPr>
           <a:xfrm>
-            <a:off x="1838325" y="2767281"/>
+            <a:off x="1857356" y="1928802"/>
             <a:ext cx="5467350" cy="1323439"/>
           </a:xfrm>
           <a:prstGeom prst="rect">
@@ -3213,6 +3213,63 @@
               <a:t>LIVEDEMO</a:t>
             </a:r>
             <a:endParaRPr lang="de-DE" dirty="0"/>
+          </a:p>
+        </p:txBody>
+      </p:sp>
+      <p:sp>
+        <p:nvSpPr>
+          <p:cNvPr id="4" name="Textfeld 3"/>
+          <p:cNvSpPr txBox="1"/>
+          <p:nvPr/>
+        </p:nvSpPr>
+        <p:spPr>
+          <a:xfrm>
+            <a:off x="428596" y="3571876"/>
+            <a:ext cx="8358246" cy="1077218"/>
+          </a:xfrm>
+          <a:prstGeom prst="rect">
+            <a:avLst/>
+          </a:prstGeom>
+          <a:noFill/>
+        </p:spPr>
+        <p:txBody>
+          <a:bodyPr wrap="square" rtlCol="0">
+            <a:spAutoFit/>
+          </a:bodyPr>
+          <a:lstStyle/>
+          <a:p>
+            <a:pPr algn="ctr"/>
+            <a:r>
+              <a:rPr lang="de-DE" dirty="0" smtClean="0"/>
+              <a:t>Mitmachen! .</a:t>
+            </a:r>
+            <a:r>
+              <a:rPr lang="de-DE" dirty="0" err="1" smtClean="0"/>
+              <a:t>apk</a:t>
+            </a:r>
+            <a:r>
+              <a:rPr lang="de-DE" dirty="0" smtClean="0"/>
+              <a:t> herunterladen unter:</a:t>
+            </a:r>
+          </a:p>
+          <a:p>
+            <a:pPr algn="ctr"/>
+            <a:r>
+              <a:rPr lang="de-DE" dirty="0" smtClean="0"/>
+              <a:t> </a:t>
+            </a:r>
+          </a:p>
+          <a:p>
+            <a:pPr algn="ctr"/>
+            <a:r>
+              <a:rPr lang="de-DE" sz="2800" b="1" dirty="0" smtClean="0"/>
+              <a:t>http</a:t>
+            </a:r>
+            <a:r>
+              <a:rPr lang="de-DE" sz="2800" b="1" dirty="0" smtClean="0"/>
+              <a:t>://tinyurl.com/d53gm24</a:t>
+            </a:r>
+            <a:endParaRPr lang="de-DE" sz="2800" dirty="0"/>
           </a:p>
         </p:txBody>
       </p:sp>
@@ -4056,11 +4113,7 @@
             </a:r>
             <a:r>
               <a:rPr lang="de-DE" sz="2000" dirty="0" smtClean="0"/>
-              <a:t>elbstständige </a:t>
-            </a:r>
-            <a:r>
-              <a:rPr lang="de-DE" sz="2000" dirty="0" smtClean="0"/>
-              <a:t>Konfiguration zwischen mobilen Geräten </a:t>
+              <a:t>elbstständige Konfiguration zwischen mobilen Geräten </a:t>
             </a:r>
             <a:br>
               <a:rPr lang="de-DE" sz="2000" dirty="0" smtClean="0"/>
@@ -4073,11 +4126,7 @@
             </a:pPr>
             <a:r>
               <a:rPr lang="de-DE" sz="2000" dirty="0" smtClean="0"/>
-              <a:t>Perfekt</a:t>
-            </a:r>
-            <a:r>
-              <a:rPr lang="de-DE" sz="2000" dirty="0" smtClean="0"/>
-              <a:t>! Aber? </a:t>
+              <a:t>Perfekt! Aber? </a:t>
             </a:r>
             <a:br>
               <a:rPr lang="de-DE" sz="2000" dirty="0" smtClean="0"/>
@@ -4090,15 +4139,7 @@
             </a:pPr>
             <a:r>
               <a:rPr lang="de-DE" sz="2000" dirty="0" smtClean="0"/>
-              <a:t>Ad-hoc </a:t>
-            </a:r>
-            <a:r>
-              <a:rPr lang="de-DE" sz="2000" dirty="0" smtClean="0"/>
-              <a:t>wird nur </a:t>
-            </a:r>
-            <a:r>
-              <a:rPr lang="de-DE" sz="2000" dirty="0" smtClean="0"/>
-              <a:t>von wenigen Android-Geräten unterstützt </a:t>
+              <a:t>Ad-hoc wird nur von wenigen Android-Geräten unterstützt </a:t>
             </a:r>
           </a:p>
           <a:p>
@@ -4117,13 +4158,8 @@
             </a:r>
             <a:r>
               <a:rPr lang="de-DE" sz="2000" dirty="0" smtClean="0"/>
-              <a:t> </a:t>
-            </a:r>
-            <a:r>
-              <a:rPr lang="de-DE" sz="2000" dirty="0" smtClean="0"/>
-              <a:t>kompatibler Wi-Fi-Treiber nötigt </a:t>
-            </a:r>
-            <a:endParaRPr lang="de-DE" sz="2000" dirty="0" smtClean="0"/>
+              <a:t> kompatibler Wi-Fi-Treiber nötigt </a:t>
+            </a:r>
           </a:p>
           <a:p>
             <a:pPr lvl="1">
@@ -4138,23 +4174,7 @@
             </a:pPr>
             <a:r>
               <a:rPr lang="de-DE" sz="2000" dirty="0" smtClean="0"/>
-              <a:t>	=&gt;</a:t>
-            </a:r>
-            <a:r>
-              <a:rPr lang="de-DE" sz="2000" dirty="0" smtClean="0"/>
-              <a:t> </a:t>
-            </a:r>
-            <a:r>
-              <a:rPr lang="de-DE" sz="2000" dirty="0" smtClean="0"/>
-              <a:t>vorerst Kommunikation </a:t>
-            </a:r>
-            <a:r>
-              <a:rPr lang="de-DE" sz="2000" dirty="0" smtClean="0"/>
-              <a:t>über Infrastruktur </a:t>
-            </a:r>
-            <a:r>
-              <a:rPr lang="de-DE" sz="2000" dirty="0" smtClean="0"/>
-              <a:t>Netzwerk</a:t>
+              <a:t>	=&gt; vorerst Kommunikation über Infrastruktur Netzwerk</a:t>
             </a:r>
             <a:endParaRPr lang="de-DE" sz="2000" dirty="0"/>
           </a:p>
@@ -4244,11 +4264,7 @@
             </a:r>
             <a:r>
               <a:rPr lang="de-DE" sz="2000" dirty="0" smtClean="0"/>
-              <a:t>eder </a:t>
-            </a:r>
-            <a:r>
-              <a:rPr lang="de-DE" sz="2000" dirty="0" smtClean="0"/>
-              <a:t>TrackMe-Teilnehmer registriert sich für den Group-Endpoint "dtn://trackme.dtn/presence" </a:t>
+              <a:t>eder TrackMe-Teilnehmer registriert sich für den Group-Endpoint "dtn://trackme.dtn/presence" </a:t>
             </a:r>
           </a:p>
           <a:p>
@@ -4271,13 +4287,8 @@
             </a:r>
             <a:r>
               <a:rPr lang="de-DE" sz="2000" dirty="0" smtClean="0"/>
-              <a:t> </a:t>
-            </a:r>
-            <a:r>
-              <a:rPr lang="de-DE" sz="2000" dirty="0" smtClean="0"/>
-              <a:t>in zeitl. Intervall</a:t>
-            </a:r>
-            <a:endParaRPr lang="de-DE" sz="2000" dirty="0" smtClean="0"/>
+              <a:t> in zeitl. Intervall</a:t>
+            </a:r>
           </a:p>
           <a:p>
             <a:pPr lvl="3">
@@ -4285,11 +4296,7 @@
             </a:pPr>
             <a:r>
               <a:rPr lang="de-DE" dirty="0" smtClean="0"/>
-              <a:t>Konfigurierbar </a:t>
-            </a:r>
-            <a:r>
-              <a:rPr lang="de-DE" dirty="0" smtClean="0"/>
-              <a:t>als "Presence-</a:t>
+              <a:t>Konfigurierbar als "Presence-</a:t>
             </a:r>
             <a:r>
               <a:rPr lang="de-DE" dirty="0" err="1" smtClean="0"/>
@@ -4297,11 +4304,7 @@
             </a:r>
             <a:r>
               <a:rPr lang="de-DE" dirty="0" smtClean="0"/>
-              <a:t>-Delay</a:t>
-            </a:r>
-            <a:r>
-              <a:rPr lang="de-DE" dirty="0" smtClean="0"/>
-              <a:t>"</a:t>
+              <a:t>-Delay"</a:t>
             </a:r>
             <a:endParaRPr lang="de-DE" sz="2000" dirty="0" smtClean="0"/>
           </a:p>
@@ -4312,15 +4315,7 @@
             </a:pPr>
             <a:r>
               <a:rPr lang="de-DE" dirty="0" smtClean="0"/>
-              <a:t>=&gt; </a:t>
-            </a:r>
-            <a:r>
-              <a:rPr lang="de-DE" dirty="0" smtClean="0"/>
-              <a:t>Jeder </a:t>
-            </a:r>
-            <a:r>
-              <a:rPr lang="de-DE" dirty="0" smtClean="0"/>
-              <a:t>TrackMe Teilnehmer im Netzwerk bekommt diese Ankündigung </a:t>
+              <a:t>=&gt; Jeder TrackMe Teilnehmer im Netzwerk bekommt diese Ankündigung </a:t>
             </a:r>
           </a:p>
           <a:p>
@@ -4429,11 +4424,7 @@
             </a:pPr>
             <a:r>
               <a:rPr lang="de-DE" dirty="0" smtClean="0"/>
-              <a:t>Konfigurierbar </a:t>
-            </a:r>
-            <a:r>
-              <a:rPr lang="de-DE" dirty="0" smtClean="0"/>
-              <a:t>als "Data-</a:t>
+              <a:t>Konfigurierbar als "Data-</a:t>
             </a:r>
             <a:r>
               <a:rPr lang="de-DE" dirty="0" err="1" smtClean="0"/>
@@ -4441,11 +4432,7 @@
             </a:r>
             <a:r>
               <a:rPr lang="de-DE" dirty="0" smtClean="0"/>
-              <a:t>-Delay</a:t>
-            </a:r>
-            <a:r>
-              <a:rPr lang="de-DE" dirty="0" smtClean="0"/>
-              <a:t>"</a:t>
+              <a:t>-Delay"</a:t>
             </a:r>
             <a:endParaRPr lang="de-DE" sz="2000" dirty="0" smtClean="0"/>
           </a:p>
@@ -4476,11 +4463,7 @@
             </a:pPr>
             <a:r>
               <a:rPr lang="de-DE" sz="2000" dirty="0" smtClean="0"/>
-              <a:t>Die </a:t>
-            </a:r>
-            <a:r>
-              <a:rPr lang="de-DE" sz="2000" dirty="0" smtClean="0"/>
-              <a:t>Time-</a:t>
+              <a:t>Die Time-</a:t>
             </a:r>
             <a:r>
               <a:rPr lang="de-DE" sz="2000" dirty="0" err="1" smtClean="0"/>
@@ -4488,11 +4471,7 @@
             </a:r>
             <a:r>
               <a:rPr lang="de-DE" sz="2000" dirty="0" smtClean="0"/>
-              <a:t>-Live </a:t>
-            </a:r>
-            <a:r>
-              <a:rPr lang="de-DE" sz="2000" dirty="0" smtClean="0"/>
-              <a:t>für Presence- und Data-Nachrichten ebenfalls konfigurierbar als Presence-TTL und Data-TTL</a:t>
+              <a:t>-Live für Presence- und Data-Nachrichten ebenfalls konfigurierbar als Presence-TTL und Data-TTL</a:t>
             </a:r>
             <a:endParaRPr lang="de-DE" sz="1200" dirty="0"/>
           </a:p>
@@ -4553,233 +4532,38 @@
           </a:p>
         </p:txBody>
       </p:sp>
-      <mc:AlternateContent xmlns:mc="http://schemas.openxmlformats.org/markup-compatibility/2006">
-        <mc:Choice xmlns:a14="http://schemas.microsoft.com/office/drawing/2010/main" Requires="a14">
-          <p:sp>
-            <p:nvSpPr>
-              <p:cNvPr id="3" name="Inhaltsplatzhalter 2"/>
-              <p:cNvSpPr>
-                <a:spLocks noGrp="1"/>
-              </p:cNvSpPr>
-              <p:nvPr>
-                <p:ph idx="1"/>
-              </p:nvPr>
-            </p:nvSpPr>
-            <p:spPr>
-              <a:xfrm>
-                <a:off x="431800" y="1042988"/>
-                <a:ext cx="8229600" cy="4772025"/>
-              </a:xfrm>
-            </p:spPr>
-            <p:txBody>
-              <a:bodyPr anchor="ctr"/>
-              <a:lstStyle/>
-              <a:p>
-                <a:pPr lvl="1">
-                  <a:buSzPct val="100000"/>
-                </a:pPr>
-                <a:r>
-                  <a:rPr lang="de-DE" sz="2000" dirty="0" smtClean="0"/>
-                  <a:t>Header 4 Bytes</a:t>
-                </a:r>
-              </a:p>
-              <a:p>
-                <a:pPr lvl="2">
-                  <a:buSzPct val="100000"/>
-                </a:pPr>
-                <a:r>
-                  <a:rPr lang="de-DE" dirty="0" smtClean="0"/>
-                  <a:t>Kodiert den Typ des Bundles (0 – Presence, Data – 1, </a:t>
-                </a:r>
-                <a14:m>
-                  <m:oMath xmlns:m="http://schemas.openxmlformats.org/officeDocument/2006/math">
-                    <m:sSup>
-                      <m:sSupPr>
-                        <m:ctrlPr>
-                          <a:rPr lang="de-DE" i="1" dirty="0" smtClean="0">
-                            <a:latin typeface="Cambria Math"/>
-                          </a:rPr>
-                        </m:ctrlPr>
-                      </m:sSupPr>
-                      <m:e>
-                        <m:r>
-                          <a:rPr lang="de-DE" b="0" i="1" dirty="0" smtClean="0">
-                            <a:latin typeface="Cambria Math"/>
-                          </a:rPr>
-                          <m:t>2</m:t>
-                        </m:r>
-                      </m:e>
-                      <m:sup>
-                        <m:r>
-                          <a:rPr lang="de-DE" b="0" i="1" dirty="0" smtClean="0">
-                            <a:latin typeface="Cambria Math"/>
-                          </a:rPr>
-                          <m:t>32</m:t>
-                        </m:r>
-                      </m:sup>
-                    </m:sSup>
-                  </m:oMath>
-                </a14:m>
-                <a:r>
-                  <a:rPr lang="de-DE" dirty="0" smtClean="0"/>
-                  <a:t>-2 weitere möglich ..)</a:t>
-                </a:r>
-              </a:p>
-              <a:p>
-                <a:pPr marL="192087" lvl="2" indent="0">
-                  <a:buSzPct val="100000"/>
-                  <a:buNone/>
-                </a:pPr>
-                <a:endParaRPr lang="de-DE" sz="1800" dirty="0" smtClean="0"/>
-              </a:p>
-              <a:p>
-                <a:pPr lvl="1">
-                  <a:buSzPct val="100000"/>
-                </a:pPr>
-                <a:r>
-                  <a:rPr lang="de-DE" sz="2000" dirty="0" smtClean="0"/>
-                  <a:t>Payload </a:t>
-                </a:r>
-                <a:endParaRPr lang="de-DE" sz="2000" dirty="0" smtClean="0"/>
-              </a:p>
-              <a:p>
-                <a:pPr lvl="3">
-                  <a:buSzPct val="100000"/>
-                </a:pPr>
-                <a:r>
-                  <a:rPr lang="de-DE" sz="1800" dirty="0" smtClean="0"/>
-                  <a:t>Sender</a:t>
-                </a:r>
-                <a:endParaRPr lang="de-DE" sz="1800" dirty="0" smtClean="0"/>
-              </a:p>
-              <a:p>
-                <a:pPr lvl="4">
-                  <a:buSzPct val="100000"/>
-                </a:pPr>
-                <a:r>
-                  <a:rPr lang="de-DE" sz="1800" dirty="0" smtClean="0"/>
-                  <a:t>Daten </a:t>
-                </a:r>
-                <a:r>
-                  <a:rPr lang="de-DE" sz="1800" dirty="0" smtClean="0"/>
-                  <a:t>werden </a:t>
-                </a:r>
-                <a:r>
-                  <a:rPr lang="de-DE" sz="1800" dirty="0" smtClean="0"/>
-                  <a:t>als Zeichenketten von</a:t>
-                </a:r>
-                <a:r>
-                  <a:rPr lang="de-DE" sz="1800" dirty="0" smtClean="0"/>
-                  <a:t> Komponente Datenbank übergeben</a:t>
-                </a:r>
-                <a:endParaRPr lang="de-DE" sz="1800" dirty="0" smtClean="0"/>
-              </a:p>
-              <a:p>
-                <a:pPr lvl="4">
-                  <a:buSzPct val="100000"/>
-                </a:pPr>
-                <a:r>
-                  <a:rPr lang="de-DE" sz="1800" dirty="0" smtClean="0"/>
-                  <a:t>Einzelne Strings </a:t>
-                </a:r>
-                <a:r>
-                  <a:rPr lang="de-DE" sz="1800" dirty="0" smtClean="0"/>
-                  <a:t>werden </a:t>
-                </a:r>
-                <a:r>
-                  <a:rPr lang="de-DE" sz="1800" dirty="0" smtClean="0"/>
-                  <a:t>mit Trennzeichen '$' konkateniert</a:t>
-                </a:r>
-              </a:p>
-              <a:p>
-                <a:pPr lvl="4">
-                  <a:buSzPct val="100000"/>
-                </a:pPr>
-                <a:r>
-                  <a:rPr lang="de-DE" sz="1800" dirty="0" smtClean="0"/>
-                  <a:t>möglich </a:t>
-                </a:r>
-                <a:r>
-                  <a:rPr lang="de-DE" sz="1800" dirty="0" smtClean="0"/>
-                  <a:t>da weder Hash noch Zeitstempel und Positionsdaten dieses Zeichen enthalten </a:t>
-                </a:r>
-                <a:endParaRPr lang="de-DE" sz="1800" dirty="0"/>
-              </a:p>
-              <a:p>
-                <a:pPr lvl="3">
-                  <a:buSzPct val="100000"/>
-                </a:pPr>
-                <a:r>
-                  <a:rPr lang="de-DE" sz="1800" dirty="0" smtClean="0"/>
-                  <a:t>Empfänger</a:t>
-                </a:r>
-                <a:endParaRPr lang="de-DE" sz="1800" dirty="0" smtClean="0"/>
-              </a:p>
-              <a:p>
-                <a:pPr lvl="4">
-                  <a:buSzPct val="100000"/>
-                </a:pPr>
-                <a:r>
-                  <a:rPr lang="de-DE" sz="1800" dirty="0" smtClean="0"/>
-                  <a:t>Payload wird über Trennzeichen '$' </a:t>
-                </a:r>
-                <a:r>
-                  <a:rPr lang="de-DE" sz="1800" dirty="0" smtClean="0"/>
-                  <a:t>auseinandergenommen</a:t>
-                </a:r>
-                <a:endParaRPr lang="de-DE" sz="1800" dirty="0" smtClean="0"/>
-              </a:p>
-              <a:p>
-                <a:pPr lvl="4">
-                  <a:buSzPct val="100000"/>
-                </a:pPr>
-                <a:r>
-                  <a:rPr lang="de-DE" sz="1800" dirty="0" smtClean="0"/>
-                  <a:t>Aufteilung in ursprüngliche Zeichenketten und Übergabe an Datenbank</a:t>
-                </a:r>
-                <a:endParaRPr lang="de-DE" sz="1800" dirty="0" smtClean="0"/>
-              </a:p>
-            </p:txBody>
-          </p:sp>
-        </mc:Choice>
-        <mc:Fallback>
-          <p:sp>
-            <p:nvSpPr>
-              <p:cNvPr id="3" name="Inhaltsplatzhalter 2"/>
-              <p:cNvSpPr>
-                <a:spLocks noGrp="1" noRot="1" noChangeAspect="1" noMove="1" noResize="1" noEditPoints="1" noAdjustHandles="1" noChangeArrowheads="1" noChangeShapeType="1" noTextEdit="1"/>
-              </p:cNvSpPr>
-              <p:nvPr>
-                <p:ph idx="1"/>
-              </p:nvPr>
-            </p:nvSpPr>
-            <p:spPr>
-              <a:xfrm>
-                <a:off x="431800" y="1042988"/>
-                <a:ext cx="8229600" cy="4772025"/>
-              </a:xfrm>
-              <a:blipFill rotWithShape="1">
-                <a:blip r:embed="rId2"/>
-                <a:stretch>
-                  <a:fillRect l="-1778" r="-444"/>
-                </a:stretch>
-              </a:blipFill>
-            </p:spPr>
-            <p:txBody>
-              <a:bodyPr/>
-              <a:lstStyle/>
-              <a:p>
-                <a:r>
-                  <a:rPr lang="de-DE">
-                    <a:noFill/>
-                  </a:rPr>
-                  <a:t> </a:t>
-                </a:r>
-              </a:p>
-            </p:txBody>
-          </p:sp>
-        </mc:Fallback>
-      </mc:AlternateContent>
+      <p:sp>
+        <p:nvSpPr>
+          <p:cNvPr id="3" name="Inhaltsplatzhalter 2"/>
+          <p:cNvSpPr>
+            <a:spLocks noGrp="1" noRot="1" noChangeAspect="1" noMove="1" noResize="1" noEditPoints="1" noAdjustHandles="1" noChangeArrowheads="1" noChangeShapeType="1" noTextEdit="1"/>
+          </p:cNvSpPr>
+          <p:nvPr>
+            <p:ph idx="1"/>
+          </p:nvPr>
+        </p:nvSpPr>
+        <p:spPr>
+          <a:xfrm>
+            <a:off x="431800" y="1042988"/>
+            <a:ext cx="8229600" cy="4772025"/>
+          </a:xfrm>
+          <a:blipFill rotWithShape="1">
+            <a:blip r:embed="rId2"/>
+            <a:stretch>
+              <a:fillRect l="-1778" r="-444"/>
+            </a:stretch>
+          </a:blipFill>
+        </p:spPr>
+        <p:txBody>
+          <a:bodyPr/>
+          <a:lstStyle/>
+          <a:p>
+            <a:endParaRPr lang="de-DE" dirty="0" smtClean="0">
+              <a:noFill/>
+            </a:endParaRPr>
+          </a:p>
+        </p:txBody>
+      </p:sp>
     </p:spTree>
   </p:cSld>
   <p:clrMapOvr>
@@ -4847,7 +4631,7 @@
           <a:blip r:embed="rId2" cstate="print">
             <a:extLst>
               <a:ext uri="{28A0092B-C50C-407E-A947-70E740481C1C}">
-                <a14:useLocalDpi xmlns:a14="http://schemas.microsoft.com/office/drawing/2010/main" val="0"/>
+                <a14:useLocalDpi xmlns:a14="http://schemas.microsoft.com/office/drawing/2010/main" xmlns="" val="0"/>
               </a:ext>
             </a:extLst>
           </a:blip>
@@ -4866,7 +4650,7 @@
           <a:noFill/>
           <a:extLst>
             <a:ext uri="{909E8E84-426E-40DD-AFC4-6F175D3DCCD1}">
-              <a14:hiddenFill xmlns:a14="http://schemas.microsoft.com/office/drawing/2010/main">
+              <a14:hiddenFill xmlns:a14="http://schemas.microsoft.com/office/drawing/2010/main" xmlns="">
                 <a:solidFill>
                   <a:srgbClr val="FFFFFF"/>
                 </a:solidFill>
@@ -4926,7 +4710,7 @@
     </p:spTree>
     <p:extLst>
       <p:ext uri="{BB962C8B-B14F-4D97-AF65-F5344CB8AC3E}">
-        <p14:creationId xmlns:p14="http://schemas.microsoft.com/office/powerpoint/2010/main" val="1119031326"/>
+        <p14:creationId xmlns:p14="http://schemas.microsoft.com/office/powerpoint/2010/main" xmlns="" val="1119031326"/>
       </p:ext>
     </p:extLst>
   </p:cSld>
@@ -4934,7 +4718,7 @@
     <a:masterClrMapping/>
   </p:clrMapOvr>
   <mc:AlternateContent xmlns:mc="http://schemas.openxmlformats.org/markup-compatibility/2006">
-    <mc:Choice xmlns:p14="http://schemas.microsoft.com/office/powerpoint/2010/main" Requires="p14">
+    <mc:Choice xmlns:p14="http://schemas.microsoft.com/office/powerpoint/2010/main" xmlns="" Requires="p14">
       <p:transition p14:dur="0"/>
     </mc:Choice>
     <mc:Fallback>
@@ -5003,7 +4787,7 @@
           <a:blip r:embed="rId2" cstate="print">
             <a:extLst>
               <a:ext uri="{28A0092B-C50C-407E-A947-70E740481C1C}">
-                <a14:useLocalDpi xmlns:a14="http://schemas.microsoft.com/office/drawing/2010/main" val="0"/>
+                <a14:useLocalDpi xmlns:a14="http://schemas.microsoft.com/office/drawing/2010/main" xmlns="" val="0"/>
               </a:ext>
             </a:extLst>
           </a:blip>
@@ -5022,7 +4806,7 @@
           <a:noFill/>
           <a:extLst>
             <a:ext uri="{909E8E84-426E-40DD-AFC4-6F175D3DCCD1}">
-              <a14:hiddenFill xmlns:a14="http://schemas.microsoft.com/office/drawing/2010/main">
+              <a14:hiddenFill xmlns:a14="http://schemas.microsoft.com/office/drawing/2010/main" xmlns="">
                 <a:solidFill>
                   <a:srgbClr val="FFFFFF"/>
                 </a:solidFill>
@@ -5082,7 +4866,7 @@
     </p:spTree>
     <p:extLst>
       <p:ext uri="{BB962C8B-B14F-4D97-AF65-F5344CB8AC3E}">
-        <p14:creationId xmlns:p14="http://schemas.microsoft.com/office/powerpoint/2010/main" val="1618051733"/>
+        <p14:creationId xmlns:p14="http://schemas.microsoft.com/office/powerpoint/2010/main" xmlns="" val="1618051733"/>
       </p:ext>
     </p:extLst>
   </p:cSld>
@@ -5090,7 +4874,7 @@
     <a:masterClrMapping/>
   </p:clrMapOvr>
   <mc:AlternateContent xmlns:mc="http://schemas.openxmlformats.org/markup-compatibility/2006">
-    <mc:Choice xmlns:p14="http://schemas.microsoft.com/office/powerpoint/2010/main" Requires="p14">
+    <mc:Choice xmlns:p14="http://schemas.microsoft.com/office/powerpoint/2010/main" xmlns="" Requires="p14">
       <p:transition spd="med" p14:dur="700">
         <p:fade/>
       </p:transition>

</xml_diff>